<commit_message>
slides - version 4
</commit_message>
<xml_diff>
--- a/doc/judcon_SeamArquillian.pptx
+++ b/doc/judcon_SeamArquillian.pptx
@@ -5,24 +5,25 @@
     <p:sldMasterId id="2147483648" r:id="rId4"/>
   </p:sldMasterIdLst>
   <p:notesMasterIdLst>
-    <p:notesMasterId r:id="rId20"/>
+    <p:notesMasterId r:id="rId21"/>
   </p:notesMasterIdLst>
   <p:sldIdLst>
-    <p:sldId id="419" r:id="rId5"/>
-    <p:sldId id="417" r:id="rId6"/>
-    <p:sldId id="422" r:id="rId7"/>
-    <p:sldId id="423" r:id="rId8"/>
-    <p:sldId id="424" r:id="rId9"/>
-    <p:sldId id="425" r:id="rId10"/>
-    <p:sldId id="426" r:id="rId11"/>
-    <p:sldId id="427" r:id="rId12"/>
-    <p:sldId id="434" r:id="rId13"/>
-    <p:sldId id="435" r:id="rId14"/>
-    <p:sldId id="429" r:id="rId15"/>
-    <p:sldId id="430" r:id="rId16"/>
-    <p:sldId id="431" r:id="rId17"/>
-    <p:sldId id="432" r:id="rId18"/>
-    <p:sldId id="433" r:id="rId19"/>
+    <p:sldId id="436" r:id="rId5"/>
+    <p:sldId id="419" r:id="rId6"/>
+    <p:sldId id="417" r:id="rId7"/>
+    <p:sldId id="422" r:id="rId8"/>
+    <p:sldId id="423" r:id="rId9"/>
+    <p:sldId id="424" r:id="rId10"/>
+    <p:sldId id="425" r:id="rId11"/>
+    <p:sldId id="426" r:id="rId12"/>
+    <p:sldId id="427" r:id="rId13"/>
+    <p:sldId id="434" r:id="rId14"/>
+    <p:sldId id="435" r:id="rId15"/>
+    <p:sldId id="429" r:id="rId16"/>
+    <p:sldId id="430" r:id="rId17"/>
+    <p:sldId id="431" r:id="rId18"/>
+    <p:sldId id="432" r:id="rId19"/>
+    <p:sldId id="433" r:id="rId20"/>
   </p:sldIdLst>
   <p:sldSz cx="9144000" cy="6858000" type="screen4x3"/>
   <p:notesSz cx="7099300" cy="10234613"/>
@@ -294,7 +295,7 @@
           </a:ln>
           <a:extLst>
             <a:ext uri="{909E8E84-426E-40DD-AFC4-6F175D3DCCD1}">
-              <a14:hiddenFill xmlns:a14="http://schemas.microsoft.com/office/drawing/2010/main" xmlns="">
+              <a14:hiddenFill xmlns="" xmlns:a14="http://schemas.microsoft.com/office/drawing/2010/main">
                 <a:solidFill>
                   <a:srgbClr val="FFFFFF"/>
                 </a:solidFill>
@@ -468,7 +469,7 @@
     </p:spTree>
     <p:extLst>
       <p:ext uri="{BB962C8B-B14F-4D97-AF65-F5344CB8AC3E}">
-        <p14:creationId xmlns:p14="http://schemas.microsoft.com/office/powerpoint/2010/main" xmlns="" val="2567890474"/>
+        <p14:creationId xmlns="" xmlns:p14="http://schemas.microsoft.com/office/powerpoint/2010/main" val="2567890474"/>
       </p:ext>
     </p:extLst>
   </p:cSld>
@@ -647,7 +648,7 @@
           </a:ln>
           <a:extLst>
             <a:ext uri="{91240B29-F687-4F45-9708-019B960494DF}">
-              <a14:hiddenLine xmlns:a14="http://schemas.microsoft.com/office/drawing/2010/main" xmlns="" w="9525">
+              <a14:hiddenLine xmlns="" xmlns:a14="http://schemas.microsoft.com/office/drawing/2010/main" w="9525">
                 <a:solidFill>
                   <a:srgbClr val="000000"/>
                 </a:solidFill>
@@ -683,7 +684,7 @@
           </a:xfrm>
           <a:extLst>
             <a:ext uri="{91240B29-F687-4F45-9708-019B960494DF}">
-              <a14:hiddenLine xmlns:a14="http://schemas.microsoft.com/office/drawing/2010/main" xmlns="" w="9525" algn="ctr">
+              <a14:hiddenLine xmlns="" xmlns:a14="http://schemas.microsoft.com/office/drawing/2010/main" w="9525" algn="ctr">
                 <a:solidFill>
                   <a:srgbClr val="000000"/>
                 </a:solidFill>
@@ -693,7 +694,7 @@
               </a14:hiddenLine>
             </a:ext>
             <a:ext uri="{AF507438-7753-43E0-B8FC-AC1667EBCBE1}">
-              <a14:hiddenEffects xmlns:a14="http://schemas.microsoft.com/office/drawing/2010/main" xmlns="">
+              <a14:hiddenEffects xmlns="" xmlns:a14="http://schemas.microsoft.com/office/drawing/2010/main">
                 <a:effectLst>
                   <a:outerShdw dist="35921" dir="2700000" algn="ctr" rotWithShape="0">
                     <a:srgbClr val="808080"/>
@@ -739,7 +740,7 @@
           </a:xfrm>
           <a:extLst>
             <a:ext uri="{91240B29-F687-4F45-9708-019B960494DF}">
-              <a14:hiddenLine xmlns:a14="http://schemas.microsoft.com/office/drawing/2010/main" xmlns="" w="9525" algn="ctr">
+              <a14:hiddenLine xmlns="" xmlns:a14="http://schemas.microsoft.com/office/drawing/2010/main" w="9525" algn="ctr">
                 <a:solidFill>
                   <a:srgbClr val="000000"/>
                 </a:solidFill>
@@ -749,7 +750,7 @@
               </a14:hiddenLine>
             </a:ext>
             <a:ext uri="{AF507438-7753-43E0-B8FC-AC1667EBCBE1}">
-              <a14:hiddenEffects xmlns:a14="http://schemas.microsoft.com/office/drawing/2010/main" xmlns="">
+              <a14:hiddenEffects xmlns="" xmlns:a14="http://schemas.microsoft.com/office/drawing/2010/main">
                 <a:effectLst>
                   <a:outerShdw dist="35921" dir="2700000" algn="ctr" rotWithShape="0">
                     <a:srgbClr val="808080"/>
@@ -789,7 +790,7 @@
           <a:blip r:embed="rId2" cstate="print">
             <a:extLst>
               <a:ext uri="{28A0092B-C50C-407E-A947-70E740481C1C}">
-                <a14:useLocalDpi xmlns:a14="http://schemas.microsoft.com/office/drawing/2010/main" xmlns="" val="0"/>
+                <a14:useLocalDpi xmlns="" xmlns:a14="http://schemas.microsoft.com/office/drawing/2010/main" val="0"/>
               </a:ext>
             </a:extLst>
           </a:blip>
@@ -812,14 +813,14 @@
           </a:ln>
           <a:extLst>
             <a:ext uri="{909E8E84-426E-40DD-AFC4-6F175D3DCCD1}">
-              <a14:hiddenFill xmlns:a14="http://schemas.microsoft.com/office/drawing/2010/main" xmlns="">
+              <a14:hiddenFill xmlns="" xmlns:a14="http://schemas.microsoft.com/office/drawing/2010/main">
                 <a:solidFill>
                   <a:srgbClr val="FFFFFF"/>
                 </a:solidFill>
               </a14:hiddenFill>
             </a:ext>
             <a:ext uri="{91240B29-F687-4F45-9708-019B960494DF}">
-              <a14:hiddenLine xmlns:a14="http://schemas.microsoft.com/office/drawing/2010/main" xmlns="" w="9525">
+              <a14:hiddenLine xmlns="" xmlns:a14="http://schemas.microsoft.com/office/drawing/2010/main" w="9525">
                 <a:solidFill>
                   <a:srgbClr val="000000"/>
                 </a:solidFill>
@@ -884,7 +885,7 @@
             <a:effectLst/>
             <a:extLst>
               <a:ext uri="{91240B29-F687-4F45-9708-019B960494DF}">
-                <a14:hiddenLine xmlns:a14="http://schemas.microsoft.com/office/drawing/2010/main" xmlns="" w="9525">
+                <a14:hiddenLine xmlns="" xmlns:a14="http://schemas.microsoft.com/office/drawing/2010/main" w="9525">
                   <a:solidFill>
                     <a:schemeClr val="tx1"/>
                   </a:solidFill>
@@ -894,7 +895,7 @@
                 </a14:hiddenLine>
               </a:ext>
               <a:ext uri="{AF507438-7753-43E0-B8FC-AC1667EBCBE1}">
-                <a14:hiddenEffects xmlns:a14="http://schemas.microsoft.com/office/drawing/2010/main" xmlns="">
+                <a14:hiddenEffects xmlns="" xmlns:a14="http://schemas.microsoft.com/office/drawing/2010/main">
                   <a:effectLst>
                     <a:outerShdw dist="35921" dir="2700000" algn="ctr" rotWithShape="0">
                       <a:schemeClr val="bg2"/>
@@ -986,7 +987,7 @@
             <a:effectLst/>
             <a:extLst>
               <a:ext uri="{91240B29-F687-4F45-9708-019B960494DF}">
-                <a14:hiddenLine xmlns:a14="http://schemas.microsoft.com/office/drawing/2010/main" xmlns="" w="9525">
+                <a14:hiddenLine xmlns="" xmlns:a14="http://schemas.microsoft.com/office/drawing/2010/main" w="9525">
                   <a:solidFill>
                     <a:schemeClr val="tx1"/>
                   </a:solidFill>
@@ -996,7 +997,7 @@
                 </a14:hiddenLine>
               </a:ext>
               <a:ext uri="{AF507438-7753-43E0-B8FC-AC1667EBCBE1}">
-                <a14:hiddenEffects xmlns:a14="http://schemas.microsoft.com/office/drawing/2010/main" xmlns="">
+                <a14:hiddenEffects xmlns="" xmlns:a14="http://schemas.microsoft.com/office/drawing/2010/main">
                   <a:effectLst>
                     <a:outerShdw dist="35921" dir="2700000" algn="ctr" rotWithShape="0">
                       <a:schemeClr val="bg2"/>
@@ -1088,7 +1089,7 @@
             <a:effectLst/>
             <a:extLst>
               <a:ext uri="{91240B29-F687-4F45-9708-019B960494DF}">
-                <a14:hiddenLine xmlns:a14="http://schemas.microsoft.com/office/drawing/2010/main" xmlns="" w="9525">
+                <a14:hiddenLine xmlns="" xmlns:a14="http://schemas.microsoft.com/office/drawing/2010/main" w="9525">
                   <a:solidFill>
                     <a:schemeClr val="tx1"/>
                   </a:solidFill>
@@ -1098,7 +1099,7 @@
                 </a14:hiddenLine>
               </a:ext>
               <a:ext uri="{AF507438-7753-43E0-B8FC-AC1667EBCBE1}">
-                <a14:hiddenEffects xmlns:a14="http://schemas.microsoft.com/office/drawing/2010/main" xmlns="">
+                <a14:hiddenEffects xmlns="" xmlns:a14="http://schemas.microsoft.com/office/drawing/2010/main">
                   <a:effectLst>
                     <a:outerShdw dist="35921" dir="2700000" algn="ctr" rotWithShape="0">
                       <a:schemeClr val="bg2"/>
@@ -1190,7 +1191,7 @@
             <a:effectLst/>
             <a:extLst>
               <a:ext uri="{91240B29-F687-4F45-9708-019B960494DF}">
-                <a14:hiddenLine xmlns:a14="http://schemas.microsoft.com/office/drawing/2010/main" xmlns="" w="9525">
+                <a14:hiddenLine xmlns="" xmlns:a14="http://schemas.microsoft.com/office/drawing/2010/main" w="9525">
                   <a:solidFill>
                     <a:schemeClr val="tx1"/>
                   </a:solidFill>
@@ -1200,7 +1201,7 @@
                 </a14:hiddenLine>
               </a:ext>
               <a:ext uri="{AF507438-7753-43E0-B8FC-AC1667EBCBE1}">
-                <a14:hiddenEffects xmlns:a14="http://schemas.microsoft.com/office/drawing/2010/main" xmlns="">
+                <a14:hiddenEffects xmlns="" xmlns:a14="http://schemas.microsoft.com/office/drawing/2010/main">
                   <a:effectLst>
                     <a:outerShdw dist="35921" dir="2700000" algn="ctr" rotWithShape="0">
                       <a:schemeClr val="bg2"/>
@@ -1292,7 +1293,7 @@
             <a:effectLst/>
             <a:extLst>
               <a:ext uri="{91240B29-F687-4F45-9708-019B960494DF}">
-                <a14:hiddenLine xmlns:a14="http://schemas.microsoft.com/office/drawing/2010/main" xmlns="" w="9525">
+                <a14:hiddenLine xmlns="" xmlns:a14="http://schemas.microsoft.com/office/drawing/2010/main" w="9525">
                   <a:solidFill>
                     <a:schemeClr val="tx1"/>
                   </a:solidFill>
@@ -1302,7 +1303,7 @@
                 </a14:hiddenLine>
               </a:ext>
               <a:ext uri="{AF507438-7753-43E0-B8FC-AC1667EBCBE1}">
-                <a14:hiddenEffects xmlns:a14="http://schemas.microsoft.com/office/drawing/2010/main" xmlns="">
+                <a14:hiddenEffects xmlns="" xmlns:a14="http://schemas.microsoft.com/office/drawing/2010/main">
                   <a:effectLst>
                     <a:outerShdw dist="35921" dir="2700000" algn="ctr" rotWithShape="0">
                       <a:schemeClr val="bg2"/>
@@ -1395,7 +1396,7 @@
             <a:effectLst/>
             <a:extLst>
               <a:ext uri="{91240B29-F687-4F45-9708-019B960494DF}">
-                <a14:hiddenLine xmlns:a14="http://schemas.microsoft.com/office/drawing/2010/main" xmlns="" w="9525">
+                <a14:hiddenLine xmlns="" xmlns:a14="http://schemas.microsoft.com/office/drawing/2010/main" w="9525">
                   <a:solidFill>
                     <a:schemeClr val="tx1"/>
                   </a:solidFill>
@@ -1405,7 +1406,7 @@
                 </a14:hiddenLine>
               </a:ext>
               <a:ext uri="{AF507438-7753-43E0-B8FC-AC1667EBCBE1}">
-                <a14:hiddenEffects xmlns:a14="http://schemas.microsoft.com/office/drawing/2010/main" xmlns="">
+                <a14:hiddenEffects xmlns="" xmlns:a14="http://schemas.microsoft.com/office/drawing/2010/main">
                   <a:effectLst>
                     <a:outerShdw dist="35921" dir="2700000" algn="ctr" rotWithShape="0">
                       <a:schemeClr val="bg2"/>
@@ -1989,7 +1990,7 @@
     </p:spTree>
     <p:extLst>
       <p:ext uri="{BB962C8B-B14F-4D97-AF65-F5344CB8AC3E}">
-        <p14:creationId xmlns:p14="http://schemas.microsoft.com/office/powerpoint/2010/main" xmlns="" val="4188007517"/>
+        <p14:creationId xmlns="" xmlns:p14="http://schemas.microsoft.com/office/powerpoint/2010/main" val="4188007517"/>
       </p:ext>
     </p:extLst>
   </p:cSld>
@@ -2049,7 +2050,7 @@
           </a:ln>
           <a:extLst>
             <a:ext uri="{91240B29-F687-4F45-9708-019B960494DF}">
-              <a14:hiddenLine xmlns:a14="http://schemas.microsoft.com/office/drawing/2010/main" xmlns="" w="9525" algn="ctr">
+              <a14:hiddenLine xmlns="" xmlns:a14="http://schemas.microsoft.com/office/drawing/2010/main" w="9525" algn="ctr">
                 <a:solidFill>
                   <a:srgbClr val="000000"/>
                 </a:solidFill>
@@ -2144,14 +2145,14 @@
           </a:ln>
           <a:extLst>
             <a:ext uri="{909E8E84-426E-40DD-AFC4-6F175D3DCCD1}">
-              <a14:hiddenFill xmlns:a14="http://schemas.microsoft.com/office/drawing/2010/main" xmlns="">
+              <a14:hiddenFill xmlns="" xmlns:a14="http://schemas.microsoft.com/office/drawing/2010/main">
                 <a:solidFill>
                   <a:srgbClr val="FFFFFF"/>
                 </a:solidFill>
               </a14:hiddenFill>
             </a:ext>
             <a:ext uri="{91240B29-F687-4F45-9708-019B960494DF}">
-              <a14:hiddenLine xmlns:a14="http://schemas.microsoft.com/office/drawing/2010/main" xmlns="" w="9525">
+              <a14:hiddenLine xmlns="" xmlns:a14="http://schemas.microsoft.com/office/drawing/2010/main" w="9525">
                 <a:solidFill>
                   <a:srgbClr val="000000"/>
                 </a:solidFill>
@@ -2202,14 +2203,14 @@
           </a:ln>
           <a:extLst>
             <a:ext uri="{909E8E84-426E-40DD-AFC4-6F175D3DCCD1}">
-              <a14:hiddenFill xmlns:a14="http://schemas.microsoft.com/office/drawing/2010/main" xmlns="">
+              <a14:hiddenFill xmlns="" xmlns:a14="http://schemas.microsoft.com/office/drawing/2010/main">
                 <a:solidFill>
                   <a:srgbClr val="FFFFFF"/>
                 </a:solidFill>
               </a14:hiddenFill>
             </a:ext>
             <a:ext uri="{91240B29-F687-4F45-9708-019B960494DF}">
-              <a14:hiddenLine xmlns:a14="http://schemas.microsoft.com/office/drawing/2010/main" xmlns="" w="9525">
+              <a14:hiddenLine xmlns="" xmlns:a14="http://schemas.microsoft.com/office/drawing/2010/main" w="9525">
                 <a:solidFill>
                   <a:srgbClr val="000000"/>
                 </a:solidFill>
@@ -2637,7 +2638,7 @@
           <a:blip r:embed="rId4" cstate="print">
             <a:extLst>
               <a:ext uri="{28A0092B-C50C-407E-A947-70E740481C1C}">
-                <a14:useLocalDpi xmlns:a14="http://schemas.microsoft.com/office/drawing/2010/main" xmlns="" val="0"/>
+                <a14:useLocalDpi xmlns="" xmlns:a14="http://schemas.microsoft.com/office/drawing/2010/main" val="0"/>
               </a:ext>
             </a:extLst>
           </a:blip>
@@ -2660,14 +2661,14 @@
           </a:ln>
           <a:extLst>
             <a:ext uri="{909E8E84-426E-40DD-AFC4-6F175D3DCCD1}">
-              <a14:hiddenFill xmlns:a14="http://schemas.microsoft.com/office/drawing/2010/main" xmlns="">
+              <a14:hiddenFill xmlns="" xmlns:a14="http://schemas.microsoft.com/office/drawing/2010/main">
                 <a:solidFill>
                   <a:srgbClr val="FFFFFF"/>
                 </a:solidFill>
               </a14:hiddenFill>
             </a:ext>
             <a:ext uri="{91240B29-F687-4F45-9708-019B960494DF}">
-              <a14:hiddenLine xmlns:a14="http://schemas.microsoft.com/office/drawing/2010/main" xmlns="" w="9525">
+              <a14:hiddenLine xmlns="" xmlns:a14="http://schemas.microsoft.com/office/drawing/2010/main" w="9525">
                 <a:solidFill>
                   <a:srgbClr val="000000"/>
                 </a:solidFill>
@@ -2732,7 +2733,7 @@
             <a:effectLst/>
             <a:extLst>
               <a:ext uri="{91240B29-F687-4F45-9708-019B960494DF}">
-                <a14:hiddenLine xmlns:a14="http://schemas.microsoft.com/office/drawing/2010/main" xmlns="" w="9525">
+                <a14:hiddenLine xmlns="" xmlns:a14="http://schemas.microsoft.com/office/drawing/2010/main" w="9525">
                   <a:solidFill>
                     <a:schemeClr val="tx1"/>
                   </a:solidFill>
@@ -2742,7 +2743,7 @@
                 </a14:hiddenLine>
               </a:ext>
               <a:ext uri="{AF507438-7753-43E0-B8FC-AC1667EBCBE1}">
-                <a14:hiddenEffects xmlns:a14="http://schemas.microsoft.com/office/drawing/2010/main" xmlns="">
+                <a14:hiddenEffects xmlns="" xmlns:a14="http://schemas.microsoft.com/office/drawing/2010/main">
                   <a:effectLst>
                     <a:outerShdw dist="35921" dir="2700000" algn="ctr" rotWithShape="0">
                       <a:schemeClr val="bg2"/>
@@ -2834,7 +2835,7 @@
             <a:effectLst/>
             <a:extLst>
               <a:ext uri="{91240B29-F687-4F45-9708-019B960494DF}">
-                <a14:hiddenLine xmlns:a14="http://schemas.microsoft.com/office/drawing/2010/main" xmlns="" w="9525">
+                <a14:hiddenLine xmlns="" xmlns:a14="http://schemas.microsoft.com/office/drawing/2010/main" w="9525">
                   <a:solidFill>
                     <a:schemeClr val="tx1"/>
                   </a:solidFill>
@@ -2844,7 +2845,7 @@
                 </a14:hiddenLine>
               </a:ext>
               <a:ext uri="{AF507438-7753-43E0-B8FC-AC1667EBCBE1}">
-                <a14:hiddenEffects xmlns:a14="http://schemas.microsoft.com/office/drawing/2010/main" xmlns="">
+                <a14:hiddenEffects xmlns="" xmlns:a14="http://schemas.microsoft.com/office/drawing/2010/main">
                   <a:effectLst>
                     <a:outerShdw dist="35921" dir="2700000" algn="ctr" rotWithShape="0">
                       <a:schemeClr val="bg2"/>
@@ -2936,7 +2937,7 @@
             <a:effectLst/>
             <a:extLst>
               <a:ext uri="{91240B29-F687-4F45-9708-019B960494DF}">
-                <a14:hiddenLine xmlns:a14="http://schemas.microsoft.com/office/drawing/2010/main" xmlns="" w="9525">
+                <a14:hiddenLine xmlns="" xmlns:a14="http://schemas.microsoft.com/office/drawing/2010/main" w="9525">
                   <a:solidFill>
                     <a:schemeClr val="tx1"/>
                   </a:solidFill>
@@ -2946,7 +2947,7 @@
                 </a14:hiddenLine>
               </a:ext>
               <a:ext uri="{AF507438-7753-43E0-B8FC-AC1667EBCBE1}">
-                <a14:hiddenEffects xmlns:a14="http://schemas.microsoft.com/office/drawing/2010/main" xmlns="">
+                <a14:hiddenEffects xmlns="" xmlns:a14="http://schemas.microsoft.com/office/drawing/2010/main">
                   <a:effectLst>
                     <a:outerShdw dist="35921" dir="2700000" algn="ctr" rotWithShape="0">
                       <a:schemeClr val="bg2"/>
@@ -3038,7 +3039,7 @@
             <a:effectLst/>
             <a:extLst>
               <a:ext uri="{91240B29-F687-4F45-9708-019B960494DF}">
-                <a14:hiddenLine xmlns:a14="http://schemas.microsoft.com/office/drawing/2010/main" xmlns="" w="9525">
+                <a14:hiddenLine xmlns="" xmlns:a14="http://schemas.microsoft.com/office/drawing/2010/main" w="9525">
                   <a:solidFill>
                     <a:schemeClr val="tx1"/>
                   </a:solidFill>
@@ -3048,7 +3049,7 @@
                 </a14:hiddenLine>
               </a:ext>
               <a:ext uri="{AF507438-7753-43E0-B8FC-AC1667EBCBE1}">
-                <a14:hiddenEffects xmlns:a14="http://schemas.microsoft.com/office/drawing/2010/main" xmlns="">
+                <a14:hiddenEffects xmlns="" xmlns:a14="http://schemas.microsoft.com/office/drawing/2010/main">
                   <a:effectLst>
                     <a:outerShdw dist="35921" dir="2700000" algn="ctr" rotWithShape="0">
                       <a:schemeClr val="bg2"/>
@@ -3140,7 +3141,7 @@
             <a:effectLst/>
             <a:extLst>
               <a:ext uri="{91240B29-F687-4F45-9708-019B960494DF}">
-                <a14:hiddenLine xmlns:a14="http://schemas.microsoft.com/office/drawing/2010/main" xmlns="" w="9525">
+                <a14:hiddenLine xmlns="" xmlns:a14="http://schemas.microsoft.com/office/drawing/2010/main" w="9525">
                   <a:solidFill>
                     <a:schemeClr val="tx1"/>
                   </a:solidFill>
@@ -3150,7 +3151,7 @@
                 </a14:hiddenLine>
               </a:ext>
               <a:ext uri="{AF507438-7753-43E0-B8FC-AC1667EBCBE1}">
-                <a14:hiddenEffects xmlns:a14="http://schemas.microsoft.com/office/drawing/2010/main" xmlns="">
+                <a14:hiddenEffects xmlns="" xmlns:a14="http://schemas.microsoft.com/office/drawing/2010/main">
                   <a:effectLst>
                     <a:outerShdw dist="35921" dir="2700000" algn="ctr" rotWithShape="0">
                       <a:schemeClr val="bg2"/>
@@ -3243,7 +3244,7 @@
             <a:effectLst/>
             <a:extLst>
               <a:ext uri="{91240B29-F687-4F45-9708-019B960494DF}">
-                <a14:hiddenLine xmlns:a14="http://schemas.microsoft.com/office/drawing/2010/main" xmlns="" w="9525">
+                <a14:hiddenLine xmlns="" xmlns:a14="http://schemas.microsoft.com/office/drawing/2010/main" w="9525">
                   <a:solidFill>
                     <a:schemeClr val="tx1"/>
                   </a:solidFill>
@@ -3253,7 +3254,7 @@
                 </a14:hiddenLine>
               </a:ext>
               <a:ext uri="{AF507438-7753-43E0-B8FC-AC1667EBCBE1}">
-                <a14:hiddenEffects xmlns:a14="http://schemas.microsoft.com/office/drawing/2010/main" xmlns="">
+                <a14:hiddenEffects xmlns="" xmlns:a14="http://schemas.microsoft.com/office/drawing/2010/main">
                   <a:effectLst>
                     <a:outerShdw dist="35921" dir="2700000" algn="ctr" rotWithShape="0">
                       <a:schemeClr val="bg2"/>
@@ -3757,111 +3758,9 @@
           <a:chExt cx="0" cy="0"/>
         </a:xfrm>
       </p:grpSpPr>
-      <p:sp>
-        <p:nvSpPr>
-          <p:cNvPr id="4107" name="Rectangle 11"/>
-          <p:cNvSpPr>
-            <a:spLocks noGrp="1" noChangeArrowheads="1"/>
-          </p:cNvSpPr>
-          <p:nvPr>
-            <p:ph type="ctrTitle"/>
-          </p:nvPr>
-        </p:nvSpPr>
-        <p:spPr>
-          <a:xfrm>
-            <a:off x="323851" y="1916113"/>
-            <a:ext cx="8556904" cy="2088951"/>
-          </a:xfrm>
-        </p:spPr>
-        <p:txBody>
-          <a:bodyPr/>
-          <a:lstStyle/>
-          <a:p>
-            <a:r>
-              <a:rPr lang="en-US" dirty="0" smtClean="0"/>
-              <a:t>Seam 2</a:t>
-            </a:r>
-            <a:r>
-              <a:rPr lang="en-US" dirty="0"/>
-              <a:t>: </a:t>
-            </a:r>
-            <a:r>
-              <a:rPr lang="en-US" dirty="0" smtClean="0"/>
-              <a:t/>
-            </a:r>
-            <a:br>
-              <a:rPr lang="en-US" dirty="0" smtClean="0"/>
-            </a:br>
-            <a:r>
-              <a:rPr lang="en-US" dirty="0" smtClean="0"/>
-              <a:t>Real </a:t>
-            </a:r>
-            <a:r>
-              <a:rPr lang="en-US" dirty="0"/>
-              <a:t>I</a:t>
-            </a:r>
-            <a:r>
-              <a:rPr lang="en-US" dirty="0" smtClean="0"/>
-              <a:t>ntegration </a:t>
-            </a:r>
-            <a:r>
-              <a:rPr lang="en-US" dirty="0"/>
-              <a:t>T</a:t>
-            </a:r>
-            <a:r>
-              <a:rPr lang="en-US" dirty="0" smtClean="0"/>
-              <a:t>esting </a:t>
-            </a:r>
-            <a:r>
-              <a:rPr lang="en-US" dirty="0"/>
-              <a:t>with </a:t>
-            </a:r>
-            <a:r>
-              <a:rPr lang="en-US" dirty="0" err="1"/>
-              <a:t>Arquillian</a:t>
-            </a:r>
-            <a:r>
-              <a:rPr lang="en-US" dirty="0"/>
-              <a:t> </a:t>
-            </a:r>
-            <a:endParaRPr lang="de-DE" dirty="0"/>
-          </a:p>
-        </p:txBody>
-      </p:sp>
-      <p:sp>
-        <p:nvSpPr>
-          <p:cNvPr id="4108" name="Rectangle 12"/>
-          <p:cNvSpPr>
-            <a:spLocks noGrp="1" noChangeArrowheads="1"/>
-          </p:cNvSpPr>
-          <p:nvPr>
-            <p:ph type="subTitle" idx="1"/>
-          </p:nvPr>
-        </p:nvSpPr>
-        <p:spPr>
-          <a:xfrm>
-            <a:off x="323850" y="3717032"/>
-            <a:ext cx="8031163" cy="609600"/>
-          </a:xfrm>
-        </p:spPr>
-        <p:txBody>
-          <a:bodyPr/>
-          <a:lstStyle/>
-          <a:p>
-            <a:r>
-              <a:rPr lang="de-DE" dirty="0"/>
-              <a:t>Michael </a:t>
-            </a:r>
-            <a:r>
-              <a:rPr lang="de-DE" dirty="0" smtClean="0"/>
-              <a:t>Schütz </a:t>
-            </a:r>
-          </a:p>
-        </p:txBody>
-      </p:sp>
       <p:pic>
         <p:nvPicPr>
-          <p:cNvPr id="1026" name="Picture 2"/>
+          <p:cNvPr id="4" name="Picture 2"/>
           <p:cNvPicPr>
             <a:picLocks noChangeAspect="1" noChangeArrowheads="1"/>
           </p:cNvPicPr>
@@ -3876,8 +3775,8 @@
         </p:blipFill>
         <p:spPr bwMode="auto">
           <a:xfrm>
-            <a:off x="6049916" y="1442715"/>
-            <a:ext cx="2830839" cy="762149"/>
+            <a:off x="827584" y="2060848"/>
+            <a:ext cx="7221373" cy="1944216"/>
           </a:xfrm>
           <a:prstGeom prst="rect">
             <a:avLst/>
@@ -3891,9 +3790,459 @@
           </a:ln>
         </p:spPr>
       </p:pic>
+    </p:spTree>
+  </p:cSld>
+  <p:clrMapOvr>
+    <a:masterClrMapping/>
+  </p:clrMapOvr>
+  <p:transition advClick="0"/>
+  <p:timing>
+    <p:tnLst>
+      <p:par>
+        <p:cTn id="1" dur="indefinite" restart="never" nodeType="tmRoot"/>
+      </p:par>
+    </p:tnLst>
+  </p:timing>
+</p:sld>
+</file>
+
+<file path=ppt/slides/slide10.xml><?xml version="1.0" encoding="utf-8"?>
+<p:sld xmlns:a="http://schemas.openxmlformats.org/drawingml/2006/main" xmlns:r="http://schemas.openxmlformats.org/officeDocument/2006/relationships" xmlns:p="http://schemas.openxmlformats.org/presentationml/2006/main">
+  <p:cSld>
+    <p:spTree>
+      <p:nvGrpSpPr>
+        <p:cNvPr id="1" name=""/>
+        <p:cNvGrpSpPr/>
+        <p:nvPr/>
+      </p:nvGrpSpPr>
+      <p:grpSpPr>
+        <a:xfrm>
+          <a:off x="0" y="0"/>
+          <a:ext cx="0" cy="0"/>
+          <a:chOff x="0" y="0"/>
+          <a:chExt cx="0" cy="0"/>
+        </a:xfrm>
+      </p:grpSpPr>
+      <p:sp>
+        <p:nvSpPr>
+          <p:cNvPr id="10" name="Rechteck 9"/>
+          <p:cNvSpPr/>
+          <p:nvPr/>
+        </p:nvSpPr>
+        <p:spPr>
+          <a:xfrm>
+            <a:off x="428597" y="1571612"/>
+            <a:ext cx="5357850" cy="2071702"/>
+          </a:xfrm>
+          <a:prstGeom prst="rect">
+            <a:avLst/>
+          </a:prstGeom>
+          <a:solidFill>
+            <a:schemeClr val="bg1">
+              <a:lumMod val="95000"/>
+              <a:alpha val="15000"/>
+            </a:schemeClr>
+          </a:solidFill>
+          <a:ln/>
+        </p:spPr>
+        <p:style>
+          <a:lnRef idx="1">
+            <a:schemeClr val="accent1"/>
+          </a:lnRef>
+          <a:fillRef idx="3">
+            <a:schemeClr val="accent1"/>
+          </a:fillRef>
+          <a:effectRef idx="2">
+            <a:schemeClr val="accent1"/>
+          </a:effectRef>
+          <a:fontRef idx="minor">
+            <a:schemeClr val="lt1"/>
+          </a:fontRef>
+        </p:style>
+      </p:sp>
+      <p:sp>
+        <p:nvSpPr>
+          <p:cNvPr id="5129" name="Rectangle 9"/>
+          <p:cNvSpPr>
+            <a:spLocks noGrp="1" noChangeArrowheads="1"/>
+          </p:cNvSpPr>
+          <p:nvPr>
+            <p:ph type="title"/>
+          </p:nvPr>
+        </p:nvSpPr>
+        <p:spPr/>
+        <p:txBody>
+          <a:bodyPr/>
+          <a:lstStyle/>
+          <a:p>
+            <a:r>
+              <a:rPr lang="en-US" dirty="0" smtClean="0"/>
+              <a:t>Practice – Seam 2-Integration</a:t>
+            </a:r>
+            <a:endParaRPr lang="de-DE" dirty="0" smtClean="0"/>
+          </a:p>
+        </p:txBody>
+      </p:sp>
+      <p:sp>
+        <p:nvSpPr>
+          <p:cNvPr id="4" name="Foliennummernplatzhalter 3"/>
+          <p:cNvSpPr>
+            <a:spLocks noGrp="1"/>
+          </p:cNvSpPr>
+          <p:nvPr>
+            <p:ph type="sldNum" sz="quarter" idx="4"/>
+          </p:nvPr>
+        </p:nvSpPr>
+        <p:spPr/>
+        <p:txBody>
+          <a:bodyPr/>
+          <a:lstStyle/>
+          <a:p>
+            <a:fld id="{45DCE98C-4068-43B5-93A3-A24C7A23A2DB}" type="slidenum">
+              <a:rPr lang="de-DE" smtClean="0"/>
+              <a:pPr/>
+              <a:t>10</a:t>
+            </a:fld>
+            <a:endParaRPr lang="de-DE"/>
+          </a:p>
+        </p:txBody>
+      </p:sp>
+      <p:sp>
+        <p:nvSpPr>
+          <p:cNvPr id="5" name="Datumsplatzhalter 4"/>
+          <p:cNvSpPr>
+            <a:spLocks noGrp="1"/>
+          </p:cNvSpPr>
+          <p:nvPr>
+            <p:ph type="dt" sz="half" idx="2"/>
+          </p:nvPr>
+        </p:nvSpPr>
+        <p:spPr/>
+        <p:txBody>
+          <a:bodyPr/>
+          <a:lstStyle/>
+          <a:p>
+            <a:fld id="{98405E6C-AB5C-49C6-8300-E0D31946C0F1}" type="datetime1">
+              <a:rPr lang="de-DE" smtClean="0"/>
+              <a:pPr/>
+              <a:t>07.10.2010</a:t>
+            </a:fld>
+            <a:endParaRPr lang="de-DE"/>
+          </a:p>
+        </p:txBody>
+      </p:sp>
+      <p:sp>
+        <p:nvSpPr>
+          <p:cNvPr id="6" name="Fußzeilenplatzhalter 5"/>
+          <p:cNvSpPr>
+            <a:spLocks noGrp="1"/>
+          </p:cNvSpPr>
+          <p:nvPr>
+            <p:ph type="ftr" sz="quarter" idx="3"/>
+          </p:nvPr>
+        </p:nvSpPr>
+        <p:spPr/>
+        <p:txBody>
+          <a:bodyPr/>
+          <a:lstStyle/>
+          <a:p>
+            <a:r>
+              <a:rPr lang="de-DE" smtClean="0"/>
+              <a:t>Copyright © 2010 – akquinet AG</a:t>
+            </a:r>
+            <a:endParaRPr lang="de-DE" dirty="0"/>
+          </a:p>
+        </p:txBody>
+      </p:sp>
+      <p:sp>
+        <p:nvSpPr>
+          <p:cNvPr id="12" name="Textfeld 11"/>
+          <p:cNvSpPr txBox="1"/>
+          <p:nvPr/>
+        </p:nvSpPr>
+        <p:spPr>
+          <a:xfrm>
+            <a:off x="357158" y="1214422"/>
+            <a:ext cx="4572032" cy="400110"/>
+          </a:xfrm>
+          <a:prstGeom prst="rect">
+            <a:avLst/>
+          </a:prstGeom>
+          <a:noFill/>
+        </p:spPr>
+        <p:txBody>
+          <a:bodyPr wrap="square" rtlCol="0">
+            <a:spAutoFit/>
+          </a:bodyPr>
+          <a:lstStyle/>
+          <a:p>
+            <a:r>
+              <a:rPr lang="de-DE" sz="2000" b="1" i="0" dirty="0" err="1" smtClean="0">
+                <a:solidFill>
+                  <a:schemeClr val="bg2">
+                    <a:lumMod val="50000"/>
+                  </a:schemeClr>
+                </a:solidFill>
+              </a:rPr>
+              <a:t>Local</a:t>
+            </a:r>
+            <a:r>
+              <a:rPr lang="de-DE" sz="2000" b="1" i="0" dirty="0" smtClean="0">
+                <a:solidFill>
+                  <a:schemeClr val="bg2">
+                    <a:lumMod val="50000"/>
+                  </a:schemeClr>
+                </a:solidFill>
+              </a:rPr>
+              <a:t> </a:t>
+            </a:r>
+            <a:r>
+              <a:rPr lang="de-DE" sz="2000" b="1" i="0" dirty="0" err="1" smtClean="0">
+                <a:solidFill>
+                  <a:schemeClr val="bg2">
+                    <a:lumMod val="50000"/>
+                  </a:schemeClr>
+                </a:solidFill>
+              </a:rPr>
+              <a:t>development</a:t>
+            </a:r>
+            <a:endParaRPr lang="de-DE" sz="2000" b="1" i="0" dirty="0" smtClean="0">
+              <a:solidFill>
+                <a:schemeClr val="bg2">
+                  <a:lumMod val="50000"/>
+                </a:schemeClr>
+              </a:solidFill>
+            </a:endParaRPr>
+          </a:p>
+        </p:txBody>
+      </p:sp>
+      <p:sp>
+        <p:nvSpPr>
+          <p:cNvPr id="7" name="Rechteck 6"/>
+          <p:cNvSpPr/>
+          <p:nvPr/>
+        </p:nvSpPr>
+        <p:spPr>
+          <a:xfrm>
+            <a:off x="642910" y="1714488"/>
+            <a:ext cx="1847047" cy="1781326"/>
+          </a:xfrm>
+          <a:prstGeom prst="rect">
+            <a:avLst/>
+          </a:prstGeom>
+          <a:ln/>
+          <a:effectLst>
+            <a:glow rad="63500">
+              <a:schemeClr val="accent1">
+                <a:alpha val="75000"/>
+              </a:schemeClr>
+            </a:glow>
+            <a:outerShdw blurRad="50800" dist="38100" dir="2700000" algn="br" rotWithShape="0">
+              <a:srgbClr val="000000">
+                <a:alpha val="43000"/>
+              </a:srgbClr>
+            </a:outerShdw>
+          </a:effectLst>
+        </p:spPr>
+        <p:style>
+          <a:lnRef idx="1">
+            <a:schemeClr val="accent3"/>
+          </a:lnRef>
+          <a:fillRef idx="3">
+            <a:schemeClr val="accent3"/>
+          </a:fillRef>
+          <a:effectRef idx="2">
+            <a:schemeClr val="accent3"/>
+          </a:effectRef>
+          <a:fontRef idx="minor">
+            <a:schemeClr val="lt1"/>
+          </a:fontRef>
+        </p:style>
+        <p:txBody>
+          <a:bodyPr/>
+          <a:lstStyle/>
+          <a:p>
+            <a:endParaRPr lang="de-DE" sz="2400" dirty="0" smtClean="0"/>
+          </a:p>
+          <a:p>
+            <a:endParaRPr lang="de-DE" sz="2400" dirty="0"/>
+          </a:p>
+        </p:txBody>
+      </p:sp>
+      <p:sp>
+        <p:nvSpPr>
+          <p:cNvPr id="8" name="Textfeld 7"/>
+          <p:cNvSpPr txBox="1"/>
+          <p:nvPr/>
+        </p:nvSpPr>
+        <p:spPr>
+          <a:xfrm>
+            <a:off x="614848" y="3095704"/>
+            <a:ext cx="1875109" cy="400110"/>
+          </a:xfrm>
+          <a:prstGeom prst="rect">
+            <a:avLst/>
+          </a:prstGeom>
+          <a:noFill/>
+        </p:spPr>
+        <p:txBody>
+          <a:bodyPr wrap="square" rtlCol="0">
+            <a:spAutoFit/>
+          </a:bodyPr>
+          <a:lstStyle/>
+          <a:p>
+            <a:pPr algn="ctr"/>
+            <a:r>
+              <a:rPr lang="de-DE" sz="2000" b="1" i="0" dirty="0" smtClean="0"/>
+              <a:t>AS5.1/</a:t>
+            </a:r>
+            <a:r>
+              <a:rPr lang="de-DE" sz="2000" b="1" i="0" dirty="0" err="1" smtClean="0"/>
+              <a:t>GateIn</a:t>
+            </a:r>
+            <a:endParaRPr lang="de-DE" sz="2000" b="1" i="0" dirty="0" smtClean="0"/>
+          </a:p>
+        </p:txBody>
+      </p:sp>
+      <p:sp>
+        <p:nvSpPr>
+          <p:cNvPr id="20" name="Rechteck 19"/>
+          <p:cNvSpPr/>
+          <p:nvPr/>
+        </p:nvSpPr>
+        <p:spPr>
+          <a:xfrm>
+            <a:off x="795311" y="1866888"/>
+            <a:ext cx="1562112" cy="847732"/>
+          </a:xfrm>
+          <a:prstGeom prst="rect">
+            <a:avLst/>
+          </a:prstGeom>
+          <a:ln/>
+          <a:effectLst>
+            <a:glow rad="63500">
+              <a:schemeClr val="accent1">
+                <a:alpha val="75000"/>
+              </a:schemeClr>
+            </a:glow>
+            <a:outerShdw blurRad="50800" dist="38100" dir="2700000" algn="br" rotWithShape="0">
+              <a:srgbClr val="000000">
+                <a:alpha val="43000"/>
+              </a:srgbClr>
+            </a:outerShdw>
+          </a:effectLst>
+        </p:spPr>
+        <p:style>
+          <a:lnRef idx="1">
+            <a:schemeClr val="accent3"/>
+          </a:lnRef>
+          <a:fillRef idx="3">
+            <a:schemeClr val="accent3"/>
+          </a:fillRef>
+          <a:effectRef idx="2">
+            <a:schemeClr val="accent3"/>
+          </a:effectRef>
+          <a:fontRef idx="minor">
+            <a:schemeClr val="lt1"/>
+          </a:fontRef>
+        </p:style>
+        <p:txBody>
+          <a:bodyPr/>
+          <a:lstStyle/>
+          <a:p>
+            <a:endParaRPr lang="de-DE" sz="2400" dirty="0" smtClean="0"/>
+          </a:p>
+          <a:p>
+            <a:endParaRPr lang="de-DE" sz="2400" dirty="0"/>
+          </a:p>
+        </p:txBody>
+      </p:sp>
+      <p:sp>
+        <p:nvSpPr>
+          <p:cNvPr id="22" name="Textfeld 21"/>
+          <p:cNvSpPr txBox="1"/>
+          <p:nvPr/>
+        </p:nvSpPr>
+        <p:spPr>
+          <a:xfrm>
+            <a:off x="614848" y="2085937"/>
+            <a:ext cx="1875109" cy="400110"/>
+          </a:xfrm>
+          <a:prstGeom prst="rect">
+            <a:avLst/>
+          </a:prstGeom>
+          <a:noFill/>
+        </p:spPr>
+        <p:txBody>
+          <a:bodyPr wrap="square" rtlCol="0">
+            <a:spAutoFit/>
+          </a:bodyPr>
+          <a:lstStyle/>
+          <a:p>
+            <a:pPr algn="ctr"/>
+            <a:r>
+              <a:rPr lang="de-DE" sz="2000" b="1" i="0" dirty="0" err="1" smtClean="0"/>
+              <a:t>Seam</a:t>
+            </a:r>
+            <a:endParaRPr lang="de-DE" sz="2000" b="1" i="0" dirty="0" smtClean="0"/>
+          </a:p>
+        </p:txBody>
+      </p:sp>
       <p:pic>
         <p:nvPicPr>
-          <p:cNvPr id="5" name="Picture 3"/>
+          <p:cNvPr id="34" name="Picture 2" descr="C:\users\nicole\projects_txtr\txtr_praesi\pfeil-links.png"/>
+          <p:cNvPicPr>
+            <a:picLocks noChangeAspect="1" noChangeArrowheads="1"/>
+          </p:cNvPicPr>
+          <p:nvPr/>
+        </p:nvPicPr>
+        <p:blipFill>
+          <a:blip r:embed="rId2" cstate="print"/>
+          <a:srcRect/>
+          <a:stretch>
+            <a:fillRect/>
+          </a:stretch>
+        </p:blipFill>
+        <p:spPr bwMode="auto">
+          <a:xfrm>
+            <a:off x="2489957" y="2220758"/>
+            <a:ext cx="2255512" cy="948642"/>
+          </a:xfrm>
+          <a:prstGeom prst="rect">
+            <a:avLst/>
+          </a:prstGeom>
+          <a:noFill/>
+        </p:spPr>
+      </p:pic>
+      <p:pic>
+        <p:nvPicPr>
+          <p:cNvPr id="35" name="Picture 2" descr="C:\users\nicole\projects_txtr\txtr_praesi\pfeil-links.png"/>
+          <p:cNvPicPr>
+            <a:picLocks noChangeAspect="1" noChangeArrowheads="1"/>
+          </p:cNvPicPr>
+          <p:nvPr/>
+        </p:nvPicPr>
+        <p:blipFill>
+          <a:blip r:embed="rId2" cstate="print"/>
+          <a:srcRect/>
+          <a:stretch>
+            <a:fillRect/>
+          </a:stretch>
+        </p:blipFill>
+        <p:spPr bwMode="auto">
+          <a:xfrm rot="10800000">
+            <a:off x="2928926" y="2220758"/>
+            <a:ext cx="2255512" cy="948642"/>
+          </a:xfrm>
+          <a:prstGeom prst="rect">
+            <a:avLst/>
+          </a:prstGeom>
+          <a:noFill/>
+        </p:spPr>
+      </p:pic>
+      <p:pic>
+        <p:nvPicPr>
+          <p:cNvPr id="36" name="Grafik 35" descr="ear-package.png"/>
           <p:cNvPicPr>
             <a:picLocks noChangeAspect="1"/>
           </p:cNvPicPr>
@@ -3907,8 +4256,8 @@
         </p:blipFill>
         <p:spPr>
           <a:xfrm>
-            <a:off x="323851" y="4941168"/>
-            <a:ext cx="4470370" cy="1641872"/>
+            <a:off x="3143240" y="1928802"/>
+            <a:ext cx="1424940" cy="1385976"/>
           </a:xfrm>
           <a:prstGeom prst="rect">
             <a:avLst/>
@@ -3917,7 +4266,7 @@
       </p:pic>
       <p:pic>
         <p:nvPicPr>
-          <p:cNvPr id="7" name="Grafik 6" descr="seam-logo.png"/>
+          <p:cNvPr id="24" name="Grafik 23" descr="developer.png"/>
           <p:cNvPicPr>
             <a:picLocks noChangeAspect="1"/>
           </p:cNvPicPr>
@@ -3931,14 +4280,110 @@
         </p:blipFill>
         <p:spPr>
           <a:xfrm>
-            <a:off x="7164288" y="5085184"/>
-            <a:ext cx="1722883" cy="1406435"/>
+            <a:off x="4832888" y="1571612"/>
+            <a:ext cx="2382318" cy="1998253"/>
           </a:xfrm>
           <a:prstGeom prst="rect">
             <a:avLst/>
           </a:prstGeom>
         </p:spPr>
       </p:pic>
+      <p:sp>
+        <p:nvSpPr>
+          <p:cNvPr id="47" name="Rectangle 10"/>
+          <p:cNvSpPr>
+            <a:spLocks noGrp="1" noChangeArrowheads="1"/>
+          </p:cNvSpPr>
+          <p:nvPr>
+            <p:ph idx="1"/>
+          </p:nvPr>
+        </p:nvSpPr>
+        <p:spPr>
+          <a:xfrm>
+            <a:off x="428597" y="4005064"/>
+            <a:ext cx="4752528" cy="1728614"/>
+          </a:xfrm>
+        </p:spPr>
+        <p:txBody>
+          <a:bodyPr/>
+          <a:lstStyle/>
+          <a:p>
+            <a:pPr lvl="1"/>
+            <a:r>
+              <a:rPr lang="de-DE" sz="2000" dirty="0" smtClean="0"/>
+              <a:t>Remote </a:t>
+            </a:r>
+            <a:r>
+              <a:rPr lang="de-DE" sz="2000" dirty="0" err="1" smtClean="0"/>
+              <a:t>container</a:t>
+            </a:r>
+            <a:endParaRPr lang="de-DE" sz="2000" dirty="0" smtClean="0"/>
+          </a:p>
+          <a:p>
+            <a:pPr lvl="1"/>
+            <a:r>
+              <a:rPr lang="de-DE" sz="2000" dirty="0" err="1" smtClean="0"/>
+              <a:t>Deployment</a:t>
+            </a:r>
+            <a:r>
+              <a:rPr lang="de-DE" sz="2000" dirty="0" smtClean="0"/>
+              <a:t> </a:t>
+            </a:r>
+            <a:r>
+              <a:rPr lang="de-DE" sz="2000" dirty="0" err="1" smtClean="0"/>
+              <a:t>against</a:t>
+            </a:r>
+            <a:r>
+              <a:rPr lang="de-DE" sz="2000" dirty="0" smtClean="0"/>
+              <a:t> </a:t>
+            </a:r>
+            <a:r>
+              <a:rPr lang="de-DE" sz="2000" dirty="0" err="1" smtClean="0"/>
+              <a:t>running</a:t>
+            </a:r>
+            <a:r>
+              <a:rPr lang="de-DE" sz="2000" dirty="0" smtClean="0"/>
+              <a:t> </a:t>
+            </a:r>
+            <a:r>
+              <a:rPr lang="de-DE" sz="2000" dirty="0" err="1" smtClean="0"/>
+              <a:t>instance</a:t>
+            </a:r>
+            <a:endParaRPr lang="de-DE" sz="2000" dirty="0" smtClean="0"/>
+          </a:p>
+          <a:p>
+            <a:pPr lvl="1"/>
+            <a:r>
+              <a:rPr lang="de-DE" sz="2000" dirty="0" smtClean="0"/>
+              <a:t>Fast </a:t>
+            </a:r>
+            <a:r>
+              <a:rPr lang="de-DE" sz="2000" dirty="0" err="1" smtClean="0"/>
+              <a:t>feedback</a:t>
+            </a:r>
+            <a:endParaRPr lang="de-DE" sz="2000" dirty="0" smtClean="0"/>
+          </a:p>
+          <a:p>
+            <a:pPr lvl="1"/>
+            <a:r>
+              <a:rPr lang="de-DE" sz="2000" b="1" dirty="0" err="1" smtClean="0"/>
+              <a:t>mvn</a:t>
+            </a:r>
+            <a:r>
+              <a:rPr lang="de-DE" sz="2000" b="1" dirty="0" smtClean="0"/>
+              <a:t> </a:t>
+            </a:r>
+            <a:r>
+              <a:rPr lang="de-DE" sz="2000" b="1" dirty="0" err="1" smtClean="0"/>
+              <a:t>verify</a:t>
+            </a:r>
+            <a:r>
+              <a:rPr lang="de-DE" sz="2000" b="1" dirty="0" smtClean="0"/>
+              <a:t> -Pit,jbossas51_remote</a:t>
+            </a:r>
+          </a:p>
+        </p:txBody>
+      </p:sp>
     </p:spTree>
   </p:cSld>
   <p:clrMapOvr>
@@ -3957,7 +4402,7 @@
 </p:sld>
 </file>
 
-<file path=ppt/slides/slide10.xml><?xml version="1.0" encoding="utf-8"?>
+<file path=ppt/slides/slide11.xml><?xml version="1.0" encoding="utf-8"?>
 <p:sld xmlns:a="http://schemas.openxmlformats.org/drawingml/2006/main" xmlns:r="http://schemas.openxmlformats.org/officeDocument/2006/relationships" xmlns:p="http://schemas.openxmlformats.org/presentationml/2006/main">
   <p:cSld>
     <p:spTree>
@@ -4015,7 +4460,7 @@
             <a:fld id="{45DCE98C-4068-43B5-93A3-A24C7A23A2DB}" type="slidenum">
               <a:rPr lang="de-DE" smtClean="0"/>
               <a:pPr/>
-              <a:t>10</a:t>
+              <a:t>11</a:t>
             </a:fld>
             <a:endParaRPr lang="de-DE"/>
           </a:p>
@@ -4649,7 +5094,7 @@
 </p:sld>
 </file>
 
-<file path=ppt/slides/slide11.xml><?xml version="1.0" encoding="utf-8"?>
+<file path=ppt/slides/slide12.xml><?xml version="1.0" encoding="utf-8"?>
 <p:sld xmlns:a="http://schemas.openxmlformats.org/drawingml/2006/main" xmlns:r="http://schemas.openxmlformats.org/officeDocument/2006/relationships" xmlns:p="http://schemas.openxmlformats.org/presentationml/2006/main">
   <p:cSld>
     <p:spTree>
@@ -4811,7 +5256,7 @@
             <a:fld id="{45DCE98C-4068-43B5-93A3-A24C7A23A2DB}" type="slidenum">
               <a:rPr lang="de-DE" smtClean="0"/>
               <a:pPr/>
-              <a:t>11</a:t>
+              <a:t>12</a:t>
             </a:fld>
             <a:endParaRPr lang="de-DE"/>
           </a:p>
@@ -4882,221 +5327,6 @@
           <a:xfrm>
             <a:off x="323850" y="1285860"/>
             <a:ext cx="2382318" cy="1998253"/>
-          </a:xfrm>
-          <a:prstGeom prst="rect">
-            <a:avLst/>
-          </a:prstGeom>
-        </p:spPr>
-      </p:pic>
-    </p:spTree>
-  </p:cSld>
-  <p:clrMapOvr>
-    <a:masterClrMapping/>
-  </p:clrMapOvr>
-  <p:transition spd="med" advClick="0">
-    <p:wipe dir="r"/>
-  </p:transition>
-  <p:timing>
-    <p:tnLst>
-      <p:par>
-        <p:cTn id="1" dur="indefinite" restart="never" nodeType="tmRoot"/>
-      </p:par>
-    </p:tnLst>
-  </p:timing>
-</p:sld>
-</file>
-
-<file path=ppt/slides/slide12.xml><?xml version="1.0" encoding="utf-8"?>
-<p:sld xmlns:a="http://schemas.openxmlformats.org/drawingml/2006/main" xmlns:r="http://schemas.openxmlformats.org/officeDocument/2006/relationships" xmlns:p="http://schemas.openxmlformats.org/presentationml/2006/main">
-  <p:cSld>
-    <p:spTree>
-      <p:nvGrpSpPr>
-        <p:cNvPr id="1" name=""/>
-        <p:cNvGrpSpPr/>
-        <p:nvPr/>
-      </p:nvGrpSpPr>
-      <p:grpSpPr>
-        <a:xfrm>
-          <a:off x="0" y="0"/>
-          <a:ext cx="0" cy="0"/>
-          <a:chOff x="0" y="0"/>
-          <a:chExt cx="0" cy="0"/>
-        </a:xfrm>
-      </p:grpSpPr>
-      <p:sp>
-        <p:nvSpPr>
-          <p:cNvPr id="5129" name="Rectangle 9"/>
-          <p:cNvSpPr>
-            <a:spLocks noGrp="1" noChangeArrowheads="1"/>
-          </p:cNvSpPr>
-          <p:nvPr>
-            <p:ph type="title"/>
-          </p:nvPr>
-        </p:nvSpPr>
-        <p:spPr/>
-        <p:txBody>
-          <a:bodyPr/>
-          <a:lstStyle/>
-          <a:p>
-            <a:r>
-              <a:rPr lang="en-US" dirty="0" smtClean="0"/>
-              <a:t>Seam 2 and </a:t>
-            </a:r>
-            <a:r>
-              <a:rPr lang="en-US" dirty="0" err="1" smtClean="0"/>
-              <a:t>Arquillian</a:t>
-            </a:r>
-            <a:r>
-              <a:rPr lang="en-US" dirty="0" smtClean="0"/>
-              <a:t> Roadmap</a:t>
-            </a:r>
-            <a:endParaRPr lang="de-DE" dirty="0" smtClean="0"/>
-          </a:p>
-        </p:txBody>
-      </p:sp>
-      <p:sp>
-        <p:nvSpPr>
-          <p:cNvPr id="5130" name="Rectangle 10"/>
-          <p:cNvSpPr>
-            <a:spLocks noGrp="1" noChangeArrowheads="1"/>
-          </p:cNvSpPr>
-          <p:nvPr>
-            <p:ph idx="1"/>
-          </p:nvPr>
-        </p:nvSpPr>
-        <p:spPr/>
-        <p:txBody>
-          <a:bodyPr/>
-          <a:lstStyle/>
-          <a:p>
-            <a:pPr>
-              <a:spcAft>
-                <a:spcPts val="1800"/>
-              </a:spcAft>
-            </a:pPr>
-            <a:endParaRPr lang="de-DE" sz="2000" dirty="0" smtClean="0"/>
-          </a:p>
-          <a:p>
-            <a:pPr lvl="1"/>
-            <a:r>
-              <a:rPr lang="en-US" sz="2000" dirty="0" smtClean="0"/>
-              <a:t>API support --&gt; where to put it? </a:t>
-            </a:r>
-          </a:p>
-          <a:p>
-            <a:pPr lvl="1"/>
-            <a:r>
-              <a:rPr lang="en-US" sz="2000" dirty="0" smtClean="0"/>
-              <a:t>Extending --&gt; @In </a:t>
-            </a:r>
-            <a:r>
-              <a:rPr lang="en-US" sz="2000" dirty="0" err="1" smtClean="0"/>
-              <a:t>Enricher</a:t>
-            </a:r>
-            <a:r>
-              <a:rPr lang="en-US" sz="2000" dirty="0" smtClean="0"/>
-              <a:t> </a:t>
-            </a:r>
-          </a:p>
-          <a:p>
-            <a:pPr lvl="1"/>
-            <a:r>
-              <a:rPr lang="en-US" sz="2000" dirty="0" err="1" smtClean="0"/>
-              <a:t>JSFUnit</a:t>
-            </a:r>
-            <a:endParaRPr lang="de-DE" sz="2000" dirty="0" smtClean="0"/>
-          </a:p>
-        </p:txBody>
-      </p:sp>
-      <p:sp>
-        <p:nvSpPr>
-          <p:cNvPr id="4" name="Foliennummernplatzhalter 3"/>
-          <p:cNvSpPr>
-            <a:spLocks noGrp="1"/>
-          </p:cNvSpPr>
-          <p:nvPr>
-            <p:ph type="sldNum" sz="quarter" idx="4"/>
-          </p:nvPr>
-        </p:nvSpPr>
-        <p:spPr/>
-        <p:txBody>
-          <a:bodyPr/>
-          <a:lstStyle/>
-          <a:p>
-            <a:fld id="{45DCE98C-4068-43B5-93A3-A24C7A23A2DB}" type="slidenum">
-              <a:rPr lang="de-DE" smtClean="0"/>
-              <a:pPr/>
-              <a:t>12</a:t>
-            </a:fld>
-            <a:endParaRPr lang="de-DE"/>
-          </a:p>
-        </p:txBody>
-      </p:sp>
-      <p:sp>
-        <p:nvSpPr>
-          <p:cNvPr id="5" name="Datumsplatzhalter 4"/>
-          <p:cNvSpPr>
-            <a:spLocks noGrp="1"/>
-          </p:cNvSpPr>
-          <p:nvPr>
-            <p:ph type="dt" sz="half" idx="2"/>
-          </p:nvPr>
-        </p:nvSpPr>
-        <p:spPr/>
-        <p:txBody>
-          <a:bodyPr/>
-          <a:lstStyle/>
-          <a:p>
-            <a:fld id="{98405E6C-AB5C-49C6-8300-E0D31946C0F1}" type="datetime1">
-              <a:rPr lang="de-DE" smtClean="0"/>
-              <a:pPr/>
-              <a:t>07.10.2010</a:t>
-            </a:fld>
-            <a:endParaRPr lang="de-DE"/>
-          </a:p>
-        </p:txBody>
-      </p:sp>
-      <p:sp>
-        <p:nvSpPr>
-          <p:cNvPr id="6" name="Fußzeilenplatzhalter 5"/>
-          <p:cNvSpPr>
-            <a:spLocks noGrp="1"/>
-          </p:cNvSpPr>
-          <p:nvPr>
-            <p:ph type="ftr" sz="quarter" idx="3"/>
-          </p:nvPr>
-        </p:nvSpPr>
-        <p:spPr/>
-        <p:txBody>
-          <a:bodyPr/>
-          <a:lstStyle/>
-          <a:p>
-            <a:r>
-              <a:rPr lang="de-DE" smtClean="0"/>
-              <a:t>Copyright © 2010 – akquinet AG</a:t>
-            </a:r>
-            <a:endParaRPr lang="de-DE" dirty="0"/>
-          </a:p>
-        </p:txBody>
-      </p:sp>
-      <p:pic>
-        <p:nvPicPr>
-          <p:cNvPr id="11" name="Grafik 10" descr="roadmap.jpg"/>
-          <p:cNvPicPr>
-            <a:picLocks noChangeAspect="1"/>
-          </p:cNvPicPr>
-          <p:nvPr/>
-        </p:nvPicPr>
-        <p:blipFill>
-          <a:blip r:embed="rId2" cstate="print"/>
-          <a:stretch>
-            <a:fillRect/>
-          </a:stretch>
-        </p:blipFill>
-        <p:spPr>
-          <a:xfrm>
-            <a:off x="323850" y="3573016"/>
-            <a:ext cx="7848550" cy="2336457"/>
           </a:xfrm>
           <a:prstGeom prst="rect">
             <a:avLst/>
@@ -5154,14 +5384,72 @@
           <a:lstStyle/>
           <a:p>
             <a:r>
-              <a:rPr lang="de-DE" dirty="0" smtClean="0"/>
-              <a:t>Multiple </a:t>
-            </a:r>
-            <a:r>
-              <a:rPr lang="de-DE" dirty="0" err="1" smtClean="0"/>
-              <a:t>containers</a:t>
+              <a:rPr lang="en-US" dirty="0" smtClean="0"/>
+              <a:t>Seam 2 and </a:t>
+            </a:r>
+            <a:r>
+              <a:rPr lang="en-US" dirty="0" err="1" smtClean="0"/>
+              <a:t>Arquillian</a:t>
+            </a:r>
+            <a:r>
+              <a:rPr lang="en-US" dirty="0" smtClean="0"/>
+              <a:t> Roadmap</a:t>
             </a:r>
             <a:endParaRPr lang="de-DE" dirty="0" smtClean="0"/>
+          </a:p>
+        </p:txBody>
+      </p:sp>
+      <p:sp>
+        <p:nvSpPr>
+          <p:cNvPr id="5130" name="Rectangle 10"/>
+          <p:cNvSpPr>
+            <a:spLocks noGrp="1" noChangeArrowheads="1"/>
+          </p:cNvSpPr>
+          <p:nvPr>
+            <p:ph idx="1"/>
+          </p:nvPr>
+        </p:nvSpPr>
+        <p:spPr/>
+        <p:txBody>
+          <a:bodyPr/>
+          <a:lstStyle/>
+          <a:p>
+            <a:pPr>
+              <a:spcAft>
+                <a:spcPts val="1800"/>
+              </a:spcAft>
+            </a:pPr>
+            <a:endParaRPr lang="de-DE" sz="2000" dirty="0" smtClean="0"/>
+          </a:p>
+          <a:p>
+            <a:pPr lvl="1"/>
+            <a:r>
+              <a:rPr lang="en-US" sz="2000" dirty="0" smtClean="0"/>
+              <a:t>API support --&gt; where to put it? </a:t>
+            </a:r>
+          </a:p>
+          <a:p>
+            <a:pPr lvl="1"/>
+            <a:r>
+              <a:rPr lang="en-US" sz="2000" dirty="0" smtClean="0"/>
+              <a:t>Extending --&gt; @In </a:t>
+            </a:r>
+            <a:r>
+              <a:rPr lang="en-US" sz="2000" dirty="0" err="1" smtClean="0"/>
+              <a:t>Enricher</a:t>
+            </a:r>
+            <a:r>
+              <a:rPr lang="en-US" sz="2000" dirty="0" smtClean="0"/>
+              <a:t> </a:t>
+            </a:r>
+          </a:p>
+          <a:p>
+            <a:pPr lvl="1"/>
+            <a:r>
+              <a:rPr lang="en-US" sz="2000" dirty="0" err="1" smtClean="0"/>
+              <a:t>JSFUnit</a:t>
+            </a:r>
+            <a:endParaRPr lang="de-DE" sz="2000" dirty="0" smtClean="0"/>
           </a:p>
         </p:txBody>
       </p:sp>
@@ -5184,6 +5472,163 @@
               <a:rPr lang="de-DE" smtClean="0"/>
               <a:pPr/>
               <a:t>13</a:t>
+            </a:fld>
+            <a:endParaRPr lang="de-DE"/>
+          </a:p>
+        </p:txBody>
+      </p:sp>
+      <p:sp>
+        <p:nvSpPr>
+          <p:cNvPr id="5" name="Datumsplatzhalter 4"/>
+          <p:cNvSpPr>
+            <a:spLocks noGrp="1"/>
+          </p:cNvSpPr>
+          <p:nvPr>
+            <p:ph type="dt" sz="half" idx="2"/>
+          </p:nvPr>
+        </p:nvSpPr>
+        <p:spPr/>
+        <p:txBody>
+          <a:bodyPr/>
+          <a:lstStyle/>
+          <a:p>
+            <a:fld id="{98405E6C-AB5C-49C6-8300-E0D31946C0F1}" type="datetime1">
+              <a:rPr lang="de-DE" smtClean="0"/>
+              <a:pPr/>
+              <a:t>07.10.2010</a:t>
+            </a:fld>
+            <a:endParaRPr lang="de-DE"/>
+          </a:p>
+        </p:txBody>
+      </p:sp>
+      <p:sp>
+        <p:nvSpPr>
+          <p:cNvPr id="6" name="Fußzeilenplatzhalter 5"/>
+          <p:cNvSpPr>
+            <a:spLocks noGrp="1"/>
+          </p:cNvSpPr>
+          <p:nvPr>
+            <p:ph type="ftr" sz="quarter" idx="3"/>
+          </p:nvPr>
+        </p:nvSpPr>
+        <p:spPr/>
+        <p:txBody>
+          <a:bodyPr/>
+          <a:lstStyle/>
+          <a:p>
+            <a:r>
+              <a:rPr lang="de-DE" smtClean="0"/>
+              <a:t>Copyright © 2010 – akquinet AG</a:t>
+            </a:r>
+            <a:endParaRPr lang="de-DE" dirty="0"/>
+          </a:p>
+        </p:txBody>
+      </p:sp>
+      <p:pic>
+        <p:nvPicPr>
+          <p:cNvPr id="11" name="Grafik 10" descr="roadmap.jpg"/>
+          <p:cNvPicPr>
+            <a:picLocks noChangeAspect="1"/>
+          </p:cNvPicPr>
+          <p:nvPr/>
+        </p:nvPicPr>
+        <p:blipFill>
+          <a:blip r:embed="rId2" cstate="print"/>
+          <a:stretch>
+            <a:fillRect/>
+          </a:stretch>
+        </p:blipFill>
+        <p:spPr>
+          <a:xfrm>
+            <a:off x="323850" y="3573016"/>
+            <a:ext cx="7848550" cy="2336457"/>
+          </a:xfrm>
+          <a:prstGeom prst="rect">
+            <a:avLst/>
+          </a:prstGeom>
+        </p:spPr>
+      </p:pic>
+    </p:spTree>
+  </p:cSld>
+  <p:clrMapOvr>
+    <a:masterClrMapping/>
+  </p:clrMapOvr>
+  <p:transition spd="med" advClick="0">
+    <p:wipe dir="r"/>
+  </p:transition>
+  <p:timing>
+    <p:tnLst>
+      <p:par>
+        <p:cTn id="1" dur="indefinite" restart="never" nodeType="tmRoot"/>
+      </p:par>
+    </p:tnLst>
+  </p:timing>
+</p:sld>
+</file>
+
+<file path=ppt/slides/slide14.xml><?xml version="1.0" encoding="utf-8"?>
+<p:sld xmlns:a="http://schemas.openxmlformats.org/drawingml/2006/main" xmlns:r="http://schemas.openxmlformats.org/officeDocument/2006/relationships" xmlns:p="http://schemas.openxmlformats.org/presentationml/2006/main">
+  <p:cSld>
+    <p:spTree>
+      <p:nvGrpSpPr>
+        <p:cNvPr id="1" name=""/>
+        <p:cNvGrpSpPr/>
+        <p:nvPr/>
+      </p:nvGrpSpPr>
+      <p:grpSpPr>
+        <a:xfrm>
+          <a:off x="0" y="0"/>
+          <a:ext cx="0" cy="0"/>
+          <a:chOff x="0" y="0"/>
+          <a:chExt cx="0" cy="0"/>
+        </a:xfrm>
+      </p:grpSpPr>
+      <p:sp>
+        <p:nvSpPr>
+          <p:cNvPr id="5129" name="Rectangle 9"/>
+          <p:cNvSpPr>
+            <a:spLocks noGrp="1" noChangeArrowheads="1"/>
+          </p:cNvSpPr>
+          <p:nvPr>
+            <p:ph type="title"/>
+          </p:nvPr>
+        </p:nvSpPr>
+        <p:spPr/>
+        <p:txBody>
+          <a:bodyPr/>
+          <a:lstStyle/>
+          <a:p>
+            <a:r>
+              <a:rPr lang="de-DE" dirty="0" smtClean="0"/>
+              <a:t>Multiple </a:t>
+            </a:r>
+            <a:r>
+              <a:rPr lang="de-DE" dirty="0" err="1" smtClean="0"/>
+              <a:t>containers</a:t>
+            </a:r>
+            <a:endParaRPr lang="de-DE" dirty="0" smtClean="0"/>
+          </a:p>
+        </p:txBody>
+      </p:sp>
+      <p:sp>
+        <p:nvSpPr>
+          <p:cNvPr id="4" name="Foliennummernplatzhalter 3"/>
+          <p:cNvSpPr>
+            <a:spLocks noGrp="1"/>
+          </p:cNvSpPr>
+          <p:nvPr>
+            <p:ph type="sldNum" sz="quarter" idx="4"/>
+          </p:nvPr>
+        </p:nvSpPr>
+        <p:spPr/>
+        <p:txBody>
+          <a:bodyPr/>
+          <a:lstStyle/>
+          <a:p>
+            <a:fld id="{45DCE98C-4068-43B5-93A3-A24C7A23A2DB}" type="slidenum">
+              <a:rPr lang="de-DE" smtClean="0"/>
+              <a:pPr/>
+              <a:t>14</a:t>
             </a:fld>
             <a:endParaRPr lang="de-DE"/>
           </a:p>
@@ -5406,314 +5851,6 @@
 </p:sld>
 </file>
 
-<file path=ppt/slides/slide14.xml><?xml version="1.0" encoding="utf-8"?>
-<p:sld xmlns:a="http://schemas.openxmlformats.org/drawingml/2006/main" xmlns:r="http://schemas.openxmlformats.org/officeDocument/2006/relationships" xmlns:p="http://schemas.openxmlformats.org/presentationml/2006/main">
-  <p:cSld>
-    <p:spTree>
-      <p:nvGrpSpPr>
-        <p:cNvPr id="1" name=""/>
-        <p:cNvGrpSpPr/>
-        <p:nvPr/>
-      </p:nvGrpSpPr>
-      <p:grpSpPr>
-        <a:xfrm>
-          <a:off x="0" y="0"/>
-          <a:ext cx="0" cy="0"/>
-          <a:chOff x="0" y="0"/>
-          <a:chExt cx="0" cy="0"/>
-        </a:xfrm>
-      </p:grpSpPr>
-      <p:sp>
-        <p:nvSpPr>
-          <p:cNvPr id="5129" name="Rectangle 9"/>
-          <p:cNvSpPr>
-            <a:spLocks noGrp="1" noChangeArrowheads="1"/>
-          </p:cNvSpPr>
-          <p:nvPr>
-            <p:ph type="title"/>
-          </p:nvPr>
-        </p:nvSpPr>
-        <p:spPr/>
-        <p:txBody>
-          <a:bodyPr/>
-          <a:lstStyle/>
-          <a:p>
-            <a:r>
-              <a:rPr lang="de-DE" dirty="0" smtClean="0"/>
-              <a:t>The </a:t>
-            </a:r>
-            <a:r>
-              <a:rPr lang="de-DE" dirty="0" err="1" smtClean="0"/>
-              <a:t>future</a:t>
-            </a:r>
-            <a:endParaRPr lang="de-DE" dirty="0" smtClean="0"/>
-          </a:p>
-        </p:txBody>
-      </p:sp>
-      <p:sp>
-        <p:nvSpPr>
-          <p:cNvPr id="5130" name="Rectangle 10"/>
-          <p:cNvSpPr>
-            <a:spLocks noGrp="1" noChangeArrowheads="1"/>
-          </p:cNvSpPr>
-          <p:nvPr>
-            <p:ph idx="1"/>
-          </p:nvPr>
-        </p:nvSpPr>
-        <p:spPr/>
-        <p:txBody>
-          <a:bodyPr/>
-          <a:lstStyle/>
-          <a:p>
-            <a:pPr>
-              <a:spcAft>
-                <a:spcPts val="1800"/>
-              </a:spcAft>
-            </a:pPr>
-            <a:endParaRPr lang="de-DE" sz="2000" dirty="0" smtClean="0"/>
-          </a:p>
-          <a:p>
-            <a:pPr lvl="1"/>
-            <a:r>
-              <a:rPr lang="de-DE" sz="2000" b="1" dirty="0" smtClean="0"/>
-              <a:t>1.0.0.Alpha4 out</a:t>
-            </a:r>
-            <a:r>
-              <a:rPr lang="de-DE" sz="2000" dirty="0" smtClean="0"/>
-              <a:t>, 1.0.0.Beta1 </a:t>
-            </a:r>
-            <a:r>
-              <a:rPr lang="de-DE" sz="2000" dirty="0" err="1" smtClean="0"/>
-              <a:t>late</a:t>
-            </a:r>
-            <a:r>
-              <a:rPr lang="de-DE" sz="2000" dirty="0" smtClean="0"/>
-              <a:t> </a:t>
-            </a:r>
-            <a:r>
-              <a:rPr lang="de-DE" sz="2000" dirty="0" err="1" smtClean="0"/>
-              <a:t>October</a:t>
-            </a:r>
-            <a:endParaRPr lang="de-DE" sz="2000" dirty="0" smtClean="0"/>
-          </a:p>
-          <a:p>
-            <a:pPr lvl="1"/>
-            <a:r>
-              <a:rPr lang="de-DE" sz="2000" dirty="0" smtClean="0"/>
-              <a:t>More </a:t>
-            </a:r>
-            <a:r>
-              <a:rPr lang="de-DE" sz="2000" dirty="0" err="1" smtClean="0"/>
-              <a:t>containers</a:t>
-            </a:r>
-            <a:r>
-              <a:rPr lang="de-DE" sz="2000" dirty="0" smtClean="0"/>
-              <a:t> – </a:t>
-            </a:r>
-            <a:r>
-              <a:rPr lang="de-DE" sz="2000" dirty="0" err="1" smtClean="0"/>
-              <a:t>Weblogic</a:t>
-            </a:r>
-            <a:r>
-              <a:rPr lang="de-DE" sz="2000" dirty="0" smtClean="0"/>
-              <a:t>, Spring, Hibernate, </a:t>
-            </a:r>
-            <a:r>
-              <a:rPr lang="de-DE" sz="2000" dirty="0" err="1" smtClean="0"/>
-              <a:t>Drools</a:t>
-            </a:r>
-            <a:r>
-              <a:rPr lang="de-DE" sz="2000" dirty="0" smtClean="0"/>
-              <a:t>... </a:t>
-            </a:r>
-          </a:p>
-          <a:p>
-            <a:pPr lvl="1"/>
-            <a:r>
-              <a:rPr lang="de-DE" sz="2000" dirty="0" smtClean="0"/>
-              <a:t>Frameworks: </a:t>
-            </a:r>
-            <a:r>
-              <a:rPr lang="de-DE" sz="2000" dirty="0" err="1" smtClean="0"/>
-              <a:t>Selenium</a:t>
-            </a:r>
-            <a:r>
-              <a:rPr lang="de-DE" sz="2000" dirty="0" smtClean="0"/>
-              <a:t>, </a:t>
-            </a:r>
-            <a:r>
-              <a:rPr lang="de-DE" sz="2000" dirty="0" err="1" smtClean="0"/>
-              <a:t>DBUnit</a:t>
-            </a:r>
-            <a:endParaRPr lang="de-DE" sz="2000" dirty="0" smtClean="0"/>
-          </a:p>
-          <a:p>
-            <a:pPr lvl="1"/>
-            <a:r>
-              <a:rPr lang="de-DE" sz="2000" dirty="0" smtClean="0"/>
-              <a:t>M</a:t>
-            </a:r>
-            <a:r>
-              <a:rPr lang="de-DE" sz="2000" dirty="0" smtClean="0"/>
-              <a:t>ultiple </a:t>
-            </a:r>
-            <a:r>
-              <a:rPr lang="de-DE" sz="2000" dirty="0" err="1" smtClean="0"/>
-              <a:t>deploy</a:t>
-            </a:r>
-            <a:r>
-              <a:rPr lang="de-DE" sz="2000" dirty="0" smtClean="0"/>
-              <a:t> </a:t>
-            </a:r>
-            <a:r>
-              <a:rPr lang="de-DE" sz="2000" dirty="0" err="1" smtClean="0"/>
-              <a:t>against</a:t>
-            </a:r>
-            <a:r>
-              <a:rPr lang="de-DE" sz="2000" dirty="0" smtClean="0"/>
-              <a:t> </a:t>
-            </a:r>
-            <a:r>
-              <a:rPr lang="de-DE" sz="2000" dirty="0" err="1" smtClean="0"/>
-              <a:t>containers</a:t>
-            </a:r>
-            <a:endParaRPr lang="de-DE" sz="2000" dirty="0" smtClean="0"/>
-          </a:p>
-          <a:p>
-            <a:pPr lvl="1"/>
-            <a:r>
-              <a:rPr lang="de-DE" sz="2000" dirty="0" smtClean="0"/>
-              <a:t>C</a:t>
-            </a:r>
-            <a:r>
-              <a:rPr lang="de-DE" sz="2000" dirty="0" smtClean="0"/>
-              <a:t>loud </a:t>
-            </a:r>
-            <a:r>
-              <a:rPr lang="de-DE" sz="2000" dirty="0" err="1" smtClean="0"/>
-              <a:t>deployment</a:t>
-            </a:r>
-            <a:r>
-              <a:rPr lang="de-DE" sz="2000" dirty="0" smtClean="0"/>
-              <a:t> (</a:t>
-            </a:r>
-            <a:r>
-              <a:rPr lang="de-DE" sz="2000" dirty="0" err="1" smtClean="0"/>
-              <a:t>jClouds</a:t>
-            </a:r>
-            <a:r>
-              <a:rPr lang="de-DE" sz="2000" dirty="0" smtClean="0"/>
-              <a:t>, </a:t>
-            </a:r>
-            <a:r>
-              <a:rPr lang="de-DE" sz="2000" dirty="0" err="1" smtClean="0"/>
-              <a:t>Steamcannon</a:t>
-            </a:r>
-            <a:r>
-              <a:rPr lang="de-DE" sz="2000" dirty="0" smtClean="0"/>
-              <a:t>/</a:t>
-            </a:r>
-            <a:r>
-              <a:rPr lang="de-DE" sz="2000" dirty="0" smtClean="0"/>
-              <a:t>DeltaCloud</a:t>
-            </a:r>
-            <a:r>
-              <a:rPr lang="de-DE" sz="2000" dirty="0" smtClean="0"/>
-              <a:t>)</a:t>
-            </a:r>
-            <a:endParaRPr lang="de-DE" sz="2000" dirty="0" smtClean="0"/>
-          </a:p>
-        </p:txBody>
-      </p:sp>
-      <p:sp>
-        <p:nvSpPr>
-          <p:cNvPr id="4" name="Foliennummernplatzhalter 3"/>
-          <p:cNvSpPr>
-            <a:spLocks noGrp="1"/>
-          </p:cNvSpPr>
-          <p:nvPr>
-            <p:ph type="sldNum" sz="quarter" idx="4"/>
-          </p:nvPr>
-        </p:nvSpPr>
-        <p:spPr/>
-        <p:txBody>
-          <a:bodyPr/>
-          <a:lstStyle/>
-          <a:p>
-            <a:fld id="{45DCE98C-4068-43B5-93A3-A24C7A23A2DB}" type="slidenum">
-              <a:rPr lang="de-DE" smtClean="0"/>
-              <a:pPr/>
-              <a:t>14</a:t>
-            </a:fld>
-            <a:endParaRPr lang="de-DE"/>
-          </a:p>
-        </p:txBody>
-      </p:sp>
-      <p:sp>
-        <p:nvSpPr>
-          <p:cNvPr id="5" name="Datumsplatzhalter 4"/>
-          <p:cNvSpPr>
-            <a:spLocks noGrp="1"/>
-          </p:cNvSpPr>
-          <p:nvPr>
-            <p:ph type="dt" sz="half" idx="2"/>
-          </p:nvPr>
-        </p:nvSpPr>
-        <p:spPr/>
-        <p:txBody>
-          <a:bodyPr/>
-          <a:lstStyle/>
-          <a:p>
-            <a:fld id="{98405E6C-AB5C-49C6-8300-E0D31946C0F1}" type="datetime1">
-              <a:rPr lang="de-DE" smtClean="0"/>
-              <a:pPr/>
-              <a:t>07.10.2010</a:t>
-            </a:fld>
-            <a:endParaRPr lang="de-DE"/>
-          </a:p>
-        </p:txBody>
-      </p:sp>
-      <p:sp>
-        <p:nvSpPr>
-          <p:cNvPr id="6" name="Fußzeilenplatzhalter 5"/>
-          <p:cNvSpPr>
-            <a:spLocks noGrp="1"/>
-          </p:cNvSpPr>
-          <p:nvPr>
-            <p:ph type="ftr" sz="quarter" idx="3"/>
-          </p:nvPr>
-        </p:nvSpPr>
-        <p:spPr/>
-        <p:txBody>
-          <a:bodyPr/>
-          <a:lstStyle/>
-          <a:p>
-            <a:r>
-              <a:rPr lang="de-DE" smtClean="0"/>
-              <a:t>Copyright © 2010 – akquinet AG</a:t>
-            </a:r>
-            <a:endParaRPr lang="de-DE" dirty="0"/>
-          </a:p>
-        </p:txBody>
-      </p:sp>
-    </p:spTree>
-  </p:cSld>
-  <p:clrMapOvr>
-    <a:masterClrMapping/>
-  </p:clrMapOvr>
-  <p:transition spd="med" advClick="0">
-    <p:wipe dir="r"/>
-  </p:transition>
-  <p:timing>
-    <p:tnLst>
-      <p:par>
-        <p:cTn id="1" dur="indefinite" restart="never" nodeType="tmRoot"/>
-      </p:par>
-    </p:tnLst>
-  </p:timing>
-</p:sld>
-</file>
-
 <file path=ppt/slides/slide15.xml><?xml version="1.0" encoding="utf-8"?>
 <p:sld xmlns:a="http://schemas.openxmlformats.org/drawingml/2006/main" xmlns:r="http://schemas.openxmlformats.org/officeDocument/2006/relationships" xmlns:p="http://schemas.openxmlformats.org/presentationml/2006/main">
   <p:cSld>
@@ -5747,16 +5884,12 @@
           <a:lstStyle/>
           <a:p>
             <a:r>
+              <a:rPr lang="de-DE" dirty="0" smtClean="0"/>
+              <a:t>The </a:t>
+            </a:r>
+            <a:r>
               <a:rPr lang="de-DE" dirty="0" err="1" smtClean="0"/>
-              <a:t>Thank</a:t>
-            </a:r>
-            <a:r>
-              <a:rPr lang="de-DE" dirty="0" smtClean="0"/>
-              <a:t> </a:t>
-            </a:r>
-            <a:r>
-              <a:rPr lang="de-DE" dirty="0" err="1" smtClean="0"/>
-              <a:t>you</a:t>
+              <a:t>future</a:t>
             </a:r>
             <a:endParaRPr lang="de-DE" dirty="0" smtClean="0"/>
           </a:p>
@@ -5788,67 +5921,135 @@
             <a:pPr lvl="1"/>
             <a:r>
               <a:rPr lang="de-DE" sz="2000" b="1" dirty="0" smtClean="0"/>
-              <a:t>Email</a:t>
-            </a:r>
-          </a:p>
-          <a:p>
-            <a:pPr lvl="2"/>
+              <a:t>1.0.0.Alpha4 out</a:t>
+            </a:r>
             <a:r>
               <a:rPr lang="de-DE" sz="2000" dirty="0" smtClean="0"/>
-              <a:t>michael.schuetz@akquinet.de</a:t>
-            </a:r>
+              <a:t>, 1.0.0.Beta1 </a:t>
+            </a:r>
+            <a:r>
+              <a:rPr lang="de-DE" sz="2000" dirty="0" err="1" smtClean="0"/>
+              <a:t>late</a:t>
+            </a:r>
+            <a:r>
+              <a:rPr lang="de-DE" sz="2000" dirty="0" smtClean="0"/>
+              <a:t> </a:t>
+            </a:r>
+            <a:r>
+              <a:rPr lang="de-DE" sz="2000" dirty="0" err="1" smtClean="0"/>
+              <a:t>October</a:t>
+            </a:r>
+            <a:endParaRPr lang="de-DE" sz="2000" dirty="0" smtClean="0"/>
           </a:p>
           <a:p>
             <a:pPr lvl="1"/>
             <a:r>
-              <a:rPr lang="de-DE" sz="2000" b="1" dirty="0" err="1" smtClean="0"/>
-              <a:t>Twitter</a:t>
-            </a:r>
-            <a:endParaRPr lang="de-DE" sz="2000" b="1" dirty="0" smtClean="0"/>
-          </a:p>
-          <a:p>
-            <a:pPr lvl="2"/>
-            <a:r>
               <a:rPr lang="de-DE" sz="2000" dirty="0" smtClean="0"/>
-              <a:t>@</a:t>
+              <a:t>More </a:t>
             </a:r>
             <a:r>
               <a:rPr lang="de-DE" sz="2000" dirty="0" err="1" smtClean="0"/>
-              <a:t>michaelschuetz</a:t>
+              <a:t>containers</a:t>
+            </a:r>
+            <a:r>
+              <a:rPr lang="de-DE" sz="2000" dirty="0" smtClean="0"/>
+              <a:t> – </a:t>
+            </a:r>
+            <a:r>
+              <a:rPr lang="de-DE" sz="2000" dirty="0" err="1" smtClean="0"/>
+              <a:t>Weblogic</a:t>
+            </a:r>
+            <a:r>
+              <a:rPr lang="de-DE" sz="2000" dirty="0" smtClean="0"/>
+              <a:t>, Spring, Hibernate, </a:t>
+            </a:r>
+            <a:r>
+              <a:rPr lang="de-DE" sz="2000" dirty="0" err="1" smtClean="0"/>
+              <a:t>Drools</a:t>
+            </a:r>
+            <a:r>
+              <a:rPr lang="de-DE" sz="2000" dirty="0" smtClean="0"/>
+              <a:t>... </a:t>
+            </a:r>
+          </a:p>
+          <a:p>
+            <a:pPr lvl="1"/>
+            <a:r>
+              <a:rPr lang="de-DE" sz="2000" dirty="0" smtClean="0"/>
+              <a:t>Frameworks: </a:t>
+            </a:r>
+            <a:r>
+              <a:rPr lang="de-DE" sz="2000" dirty="0" err="1" smtClean="0"/>
+              <a:t>Selenium</a:t>
+            </a:r>
+            <a:r>
+              <a:rPr lang="de-DE" sz="2000" dirty="0" smtClean="0"/>
+              <a:t>, </a:t>
+            </a:r>
+            <a:r>
+              <a:rPr lang="de-DE" sz="2000" dirty="0" err="1" smtClean="0"/>
+              <a:t>DBUnit</a:t>
             </a:r>
             <a:endParaRPr lang="de-DE" sz="2000" dirty="0" smtClean="0"/>
           </a:p>
           <a:p>
             <a:pPr lvl="1"/>
             <a:r>
-              <a:rPr lang="de-DE" sz="2000" b="1" dirty="0" smtClean="0"/>
-              <a:t>Source </a:t>
-            </a:r>
-            <a:r>
-              <a:rPr lang="de-DE" sz="2000" b="1" dirty="0" smtClean="0"/>
-              <a:t>Code</a:t>
-            </a:r>
-          </a:p>
-          <a:p>
-            <a:pPr lvl="2"/>
-            <a:r>
               <a:rPr lang="de-DE" sz="2000" dirty="0" smtClean="0"/>
-              <a:t>http</a:t>
+              <a:t>Multiple </a:t>
+            </a:r>
+            <a:r>
+              <a:rPr lang="de-DE" sz="2000" dirty="0" err="1" smtClean="0"/>
+              <a:t>deploy</a:t>
             </a:r>
             <a:r>
               <a:rPr lang="de-DE" sz="2000" dirty="0" smtClean="0"/>
-              <a:t>://</a:t>
+              <a:t> </a:t>
+            </a:r>
+            <a:r>
+              <a:rPr lang="de-DE" sz="2000" dirty="0" err="1" smtClean="0"/>
+              <a:t>against</a:t>
             </a:r>
             <a:r>
               <a:rPr lang="de-DE" sz="2000" dirty="0" smtClean="0"/>
-              <a:t>github.com/michaelschuetz/seamArquillian-judcon2010</a:t>
-            </a:r>
-          </a:p>
-          <a:p>
-            <a:pPr lvl="1">
-              <a:buNone/>
-            </a:pPr>
+              <a:t> </a:t>
+            </a:r>
+            <a:r>
+              <a:rPr lang="de-DE" sz="2000" dirty="0" err="1" smtClean="0"/>
+              <a:t>containers</a:t>
+            </a:r>
             <a:endParaRPr lang="de-DE" sz="2000" dirty="0" smtClean="0"/>
+          </a:p>
+          <a:p>
+            <a:pPr lvl="1"/>
+            <a:r>
+              <a:rPr lang="de-DE" sz="2000" dirty="0" smtClean="0"/>
+              <a:t>Cloud </a:t>
+            </a:r>
+            <a:r>
+              <a:rPr lang="de-DE" sz="2000" dirty="0" err="1" smtClean="0"/>
+              <a:t>deployment</a:t>
+            </a:r>
+            <a:r>
+              <a:rPr lang="de-DE" sz="2000" dirty="0" smtClean="0"/>
+              <a:t> (</a:t>
+            </a:r>
+            <a:r>
+              <a:rPr lang="de-DE" sz="2000" dirty="0" err="1" smtClean="0"/>
+              <a:t>jClouds</a:t>
+            </a:r>
+            <a:r>
+              <a:rPr lang="de-DE" sz="2000" dirty="0" smtClean="0"/>
+              <a:t>, </a:t>
+            </a:r>
+            <a:r>
+              <a:rPr lang="de-DE" sz="2000" dirty="0" err="1" smtClean="0"/>
+              <a:t>Steamcannon</a:t>
+            </a:r>
+            <a:r>
+              <a:rPr lang="de-DE" sz="2000" dirty="0" smtClean="0"/>
+              <a:t>/DeltaCloud)</a:t>
+            </a:r>
           </a:p>
         </p:txBody>
       </p:sp>
@@ -5871,6 +6072,221 @@
               <a:rPr lang="de-DE" smtClean="0"/>
               <a:pPr/>
               <a:t>15</a:t>
+            </a:fld>
+            <a:endParaRPr lang="de-DE"/>
+          </a:p>
+        </p:txBody>
+      </p:sp>
+      <p:sp>
+        <p:nvSpPr>
+          <p:cNvPr id="5" name="Datumsplatzhalter 4"/>
+          <p:cNvSpPr>
+            <a:spLocks noGrp="1"/>
+          </p:cNvSpPr>
+          <p:nvPr>
+            <p:ph type="dt" sz="half" idx="2"/>
+          </p:nvPr>
+        </p:nvSpPr>
+        <p:spPr/>
+        <p:txBody>
+          <a:bodyPr/>
+          <a:lstStyle/>
+          <a:p>
+            <a:fld id="{98405E6C-AB5C-49C6-8300-E0D31946C0F1}" type="datetime1">
+              <a:rPr lang="de-DE" smtClean="0"/>
+              <a:pPr/>
+              <a:t>07.10.2010</a:t>
+            </a:fld>
+            <a:endParaRPr lang="de-DE"/>
+          </a:p>
+        </p:txBody>
+      </p:sp>
+      <p:sp>
+        <p:nvSpPr>
+          <p:cNvPr id="6" name="Fußzeilenplatzhalter 5"/>
+          <p:cNvSpPr>
+            <a:spLocks noGrp="1"/>
+          </p:cNvSpPr>
+          <p:nvPr>
+            <p:ph type="ftr" sz="quarter" idx="3"/>
+          </p:nvPr>
+        </p:nvSpPr>
+        <p:spPr/>
+        <p:txBody>
+          <a:bodyPr/>
+          <a:lstStyle/>
+          <a:p>
+            <a:r>
+              <a:rPr lang="de-DE" smtClean="0"/>
+              <a:t>Copyright © 2010 – akquinet AG</a:t>
+            </a:r>
+            <a:endParaRPr lang="de-DE" dirty="0"/>
+          </a:p>
+        </p:txBody>
+      </p:sp>
+    </p:spTree>
+  </p:cSld>
+  <p:clrMapOvr>
+    <a:masterClrMapping/>
+  </p:clrMapOvr>
+  <p:transition spd="med" advClick="0">
+    <p:wipe dir="r"/>
+  </p:transition>
+  <p:timing>
+    <p:tnLst>
+      <p:par>
+        <p:cTn id="1" dur="indefinite" restart="never" nodeType="tmRoot"/>
+      </p:par>
+    </p:tnLst>
+  </p:timing>
+</p:sld>
+</file>
+
+<file path=ppt/slides/slide16.xml><?xml version="1.0" encoding="utf-8"?>
+<p:sld xmlns:a="http://schemas.openxmlformats.org/drawingml/2006/main" xmlns:r="http://schemas.openxmlformats.org/officeDocument/2006/relationships" xmlns:p="http://schemas.openxmlformats.org/presentationml/2006/main">
+  <p:cSld>
+    <p:spTree>
+      <p:nvGrpSpPr>
+        <p:cNvPr id="1" name=""/>
+        <p:cNvGrpSpPr/>
+        <p:nvPr/>
+      </p:nvGrpSpPr>
+      <p:grpSpPr>
+        <a:xfrm>
+          <a:off x="0" y="0"/>
+          <a:ext cx="0" cy="0"/>
+          <a:chOff x="0" y="0"/>
+          <a:chExt cx="0" cy="0"/>
+        </a:xfrm>
+      </p:grpSpPr>
+      <p:sp>
+        <p:nvSpPr>
+          <p:cNvPr id="5129" name="Rectangle 9"/>
+          <p:cNvSpPr>
+            <a:spLocks noGrp="1" noChangeArrowheads="1"/>
+          </p:cNvSpPr>
+          <p:nvPr>
+            <p:ph type="title"/>
+          </p:nvPr>
+        </p:nvSpPr>
+        <p:spPr/>
+        <p:txBody>
+          <a:bodyPr/>
+          <a:lstStyle/>
+          <a:p>
+            <a:r>
+              <a:rPr lang="de-DE" dirty="0" err="1" smtClean="0"/>
+              <a:t>Thank</a:t>
+            </a:r>
+            <a:r>
+              <a:rPr lang="de-DE" dirty="0" smtClean="0"/>
+              <a:t> </a:t>
+            </a:r>
+            <a:r>
+              <a:rPr lang="de-DE" dirty="0" err="1" smtClean="0"/>
+              <a:t>you</a:t>
+            </a:r>
+            <a:endParaRPr lang="de-DE" dirty="0" smtClean="0"/>
+          </a:p>
+        </p:txBody>
+      </p:sp>
+      <p:sp>
+        <p:nvSpPr>
+          <p:cNvPr id="5130" name="Rectangle 10"/>
+          <p:cNvSpPr>
+            <a:spLocks noGrp="1" noChangeArrowheads="1"/>
+          </p:cNvSpPr>
+          <p:nvPr>
+            <p:ph idx="1"/>
+          </p:nvPr>
+        </p:nvSpPr>
+        <p:spPr/>
+        <p:txBody>
+          <a:bodyPr/>
+          <a:lstStyle/>
+          <a:p>
+            <a:pPr>
+              <a:spcAft>
+                <a:spcPts val="1800"/>
+              </a:spcAft>
+            </a:pPr>
+            <a:endParaRPr lang="de-DE" sz="2000" dirty="0" smtClean="0"/>
+          </a:p>
+          <a:p>
+            <a:pPr lvl="1"/>
+            <a:r>
+              <a:rPr lang="de-DE" sz="2000" b="1" dirty="0" smtClean="0"/>
+              <a:t>Email</a:t>
+            </a:r>
+          </a:p>
+          <a:p>
+            <a:pPr lvl="2"/>
+            <a:r>
+              <a:rPr lang="de-DE" sz="2000" dirty="0" smtClean="0"/>
+              <a:t>michael.schuetz@akquinet.de</a:t>
+            </a:r>
+          </a:p>
+          <a:p>
+            <a:pPr lvl="1"/>
+            <a:r>
+              <a:rPr lang="de-DE" sz="2000" b="1" dirty="0" err="1" smtClean="0"/>
+              <a:t>Twitter</a:t>
+            </a:r>
+            <a:endParaRPr lang="de-DE" sz="2000" b="1" dirty="0" smtClean="0"/>
+          </a:p>
+          <a:p>
+            <a:pPr lvl="2"/>
+            <a:r>
+              <a:rPr lang="de-DE" sz="2000" dirty="0" smtClean="0"/>
+              <a:t>@</a:t>
+            </a:r>
+            <a:r>
+              <a:rPr lang="de-DE" sz="2000" dirty="0" err="1" smtClean="0"/>
+              <a:t>michaelschuetz</a:t>
+            </a:r>
+            <a:endParaRPr lang="de-DE" sz="2000" dirty="0" smtClean="0"/>
+          </a:p>
+          <a:p>
+            <a:pPr lvl="1"/>
+            <a:r>
+              <a:rPr lang="de-DE" sz="2000" b="1" dirty="0" smtClean="0"/>
+              <a:t>Source Code</a:t>
+            </a:r>
+          </a:p>
+          <a:p>
+            <a:pPr lvl="2"/>
+            <a:r>
+              <a:rPr lang="de-DE" sz="2000" dirty="0" smtClean="0"/>
+              <a:t>http://github.com/michaelschuetz/seamArquillian-judcon2010</a:t>
+            </a:r>
+          </a:p>
+          <a:p>
+            <a:pPr lvl="1">
+              <a:buNone/>
+            </a:pPr>
+            <a:endParaRPr lang="de-DE" sz="2000" dirty="0" smtClean="0"/>
+          </a:p>
+        </p:txBody>
+      </p:sp>
+      <p:sp>
+        <p:nvSpPr>
+          <p:cNvPr id="4" name="Foliennummernplatzhalter 3"/>
+          <p:cNvSpPr>
+            <a:spLocks noGrp="1"/>
+          </p:cNvSpPr>
+          <p:nvPr>
+            <p:ph type="sldNum" sz="quarter" idx="4"/>
+          </p:nvPr>
+        </p:nvSpPr>
+        <p:spPr/>
+        <p:txBody>
+          <a:bodyPr/>
+          <a:lstStyle/>
+          <a:p>
+            <a:fld id="{45DCE98C-4068-43B5-93A3-A24C7A23A2DB}" type="slidenum">
+              <a:rPr lang="de-DE" smtClean="0"/>
+              <a:pPr/>
+              <a:t>16</a:t>
             </a:fld>
             <a:endParaRPr lang="de-DE"/>
           </a:p>
@@ -5960,6 +6376,223 @@
       </p:grpSpPr>
       <p:sp>
         <p:nvSpPr>
+          <p:cNvPr id="4107" name="Rectangle 11"/>
+          <p:cNvSpPr>
+            <a:spLocks noGrp="1" noChangeArrowheads="1"/>
+          </p:cNvSpPr>
+          <p:nvPr>
+            <p:ph type="ctrTitle"/>
+          </p:nvPr>
+        </p:nvSpPr>
+        <p:spPr>
+          <a:xfrm>
+            <a:off x="323851" y="1916113"/>
+            <a:ext cx="8556904" cy="2088951"/>
+          </a:xfrm>
+        </p:spPr>
+        <p:txBody>
+          <a:bodyPr/>
+          <a:lstStyle/>
+          <a:p>
+            <a:r>
+              <a:rPr lang="en-US" dirty="0" smtClean="0"/>
+              <a:t>Seam 2</a:t>
+            </a:r>
+            <a:r>
+              <a:rPr lang="en-US" dirty="0"/>
+              <a:t>: </a:t>
+            </a:r>
+            <a:r>
+              <a:rPr lang="en-US" dirty="0" smtClean="0"/>
+              <a:t/>
+            </a:r>
+            <a:br>
+              <a:rPr lang="en-US" dirty="0" smtClean="0"/>
+            </a:br>
+            <a:r>
+              <a:rPr lang="en-US" dirty="0" smtClean="0"/>
+              <a:t>Real </a:t>
+            </a:r>
+            <a:r>
+              <a:rPr lang="en-US" dirty="0"/>
+              <a:t>I</a:t>
+            </a:r>
+            <a:r>
+              <a:rPr lang="en-US" dirty="0" smtClean="0"/>
+              <a:t>ntegration </a:t>
+            </a:r>
+            <a:r>
+              <a:rPr lang="en-US" dirty="0"/>
+              <a:t>T</a:t>
+            </a:r>
+            <a:r>
+              <a:rPr lang="en-US" dirty="0" smtClean="0"/>
+              <a:t>esting </a:t>
+            </a:r>
+            <a:r>
+              <a:rPr lang="en-US" dirty="0"/>
+              <a:t>with </a:t>
+            </a:r>
+            <a:r>
+              <a:rPr lang="en-US" dirty="0" err="1"/>
+              <a:t>Arquillian</a:t>
+            </a:r>
+            <a:r>
+              <a:rPr lang="en-US" dirty="0"/>
+              <a:t> </a:t>
+            </a:r>
+            <a:endParaRPr lang="de-DE" dirty="0"/>
+          </a:p>
+        </p:txBody>
+      </p:sp>
+      <p:sp>
+        <p:nvSpPr>
+          <p:cNvPr id="4108" name="Rectangle 12"/>
+          <p:cNvSpPr>
+            <a:spLocks noGrp="1" noChangeArrowheads="1"/>
+          </p:cNvSpPr>
+          <p:nvPr>
+            <p:ph type="subTitle" idx="1"/>
+          </p:nvPr>
+        </p:nvSpPr>
+        <p:spPr>
+          <a:xfrm>
+            <a:off x="323850" y="3717032"/>
+            <a:ext cx="8031163" cy="609600"/>
+          </a:xfrm>
+        </p:spPr>
+        <p:txBody>
+          <a:bodyPr/>
+          <a:lstStyle/>
+          <a:p>
+            <a:r>
+              <a:rPr lang="de-DE" dirty="0"/>
+              <a:t>Michael </a:t>
+            </a:r>
+            <a:r>
+              <a:rPr lang="de-DE" dirty="0" smtClean="0"/>
+              <a:t>Schütz </a:t>
+            </a:r>
+          </a:p>
+        </p:txBody>
+      </p:sp>
+      <p:pic>
+        <p:nvPicPr>
+          <p:cNvPr id="1026" name="Picture 2"/>
+          <p:cNvPicPr>
+            <a:picLocks noChangeAspect="1" noChangeArrowheads="1"/>
+          </p:cNvPicPr>
+          <p:nvPr/>
+        </p:nvPicPr>
+        <p:blipFill>
+          <a:blip r:embed="rId2" cstate="print"/>
+          <a:srcRect/>
+          <a:stretch>
+            <a:fillRect/>
+          </a:stretch>
+        </p:blipFill>
+        <p:spPr bwMode="auto">
+          <a:xfrm>
+            <a:off x="6049916" y="1442715"/>
+            <a:ext cx="2830839" cy="762149"/>
+          </a:xfrm>
+          <a:prstGeom prst="rect">
+            <a:avLst/>
+          </a:prstGeom>
+          <a:noFill/>
+          <a:ln w="9525">
+            <a:noFill/>
+            <a:miter lim="800000"/>
+            <a:headEnd/>
+            <a:tailEnd/>
+          </a:ln>
+        </p:spPr>
+      </p:pic>
+      <p:pic>
+        <p:nvPicPr>
+          <p:cNvPr id="5" name="Picture 3"/>
+          <p:cNvPicPr>
+            <a:picLocks noChangeAspect="1"/>
+          </p:cNvPicPr>
+          <p:nvPr/>
+        </p:nvPicPr>
+        <p:blipFill>
+          <a:blip r:embed="rId3" cstate="print"/>
+          <a:stretch>
+            <a:fillRect/>
+          </a:stretch>
+        </p:blipFill>
+        <p:spPr>
+          <a:xfrm>
+            <a:off x="323851" y="4941168"/>
+            <a:ext cx="4470370" cy="1641872"/>
+          </a:xfrm>
+          <a:prstGeom prst="rect">
+            <a:avLst/>
+          </a:prstGeom>
+        </p:spPr>
+      </p:pic>
+      <p:pic>
+        <p:nvPicPr>
+          <p:cNvPr id="7" name="Grafik 6" descr="seam-logo.png"/>
+          <p:cNvPicPr>
+            <a:picLocks noChangeAspect="1"/>
+          </p:cNvPicPr>
+          <p:nvPr/>
+        </p:nvPicPr>
+        <p:blipFill>
+          <a:blip r:embed="rId4" cstate="print"/>
+          <a:stretch>
+            <a:fillRect/>
+          </a:stretch>
+        </p:blipFill>
+        <p:spPr>
+          <a:xfrm>
+            <a:off x="7164288" y="5085184"/>
+            <a:ext cx="1722883" cy="1406435"/>
+          </a:xfrm>
+          <a:prstGeom prst="rect">
+            <a:avLst/>
+          </a:prstGeom>
+        </p:spPr>
+      </p:pic>
+    </p:spTree>
+  </p:cSld>
+  <p:clrMapOvr>
+    <a:masterClrMapping/>
+  </p:clrMapOvr>
+  <p:transition spd="med" advClick="0">
+    <p:wipe dir="r"/>
+  </p:transition>
+  <p:timing>
+    <p:tnLst>
+      <p:par>
+        <p:cTn id="1" dur="indefinite" restart="never" nodeType="tmRoot"/>
+      </p:par>
+    </p:tnLst>
+  </p:timing>
+</p:sld>
+</file>
+
+<file path=ppt/slides/slide3.xml><?xml version="1.0" encoding="utf-8"?>
+<p:sld xmlns:a="http://schemas.openxmlformats.org/drawingml/2006/main" xmlns:r="http://schemas.openxmlformats.org/officeDocument/2006/relationships" xmlns:p="http://schemas.openxmlformats.org/presentationml/2006/main">
+  <p:cSld>
+    <p:spTree>
+      <p:nvGrpSpPr>
+        <p:cNvPr id="1" name=""/>
+        <p:cNvGrpSpPr/>
+        <p:nvPr/>
+      </p:nvGrpSpPr>
+      <p:grpSpPr>
+        <a:xfrm>
+          <a:off x="0" y="0"/>
+          <a:ext cx="0" cy="0"/>
+          <a:chOff x="0" y="0"/>
+          <a:chExt cx="0" cy="0"/>
+        </a:xfrm>
+      </p:grpSpPr>
+      <p:sp>
+        <p:nvSpPr>
           <p:cNvPr id="5129" name="Rectangle 9"/>
           <p:cNvSpPr>
             <a:spLocks noGrp="1" noChangeArrowheads="1"/>
@@ -6026,7 +6659,7 @@
             <a:fld id="{45DCE98C-4068-43B5-93A3-A24C7A23A2DB}" type="slidenum">
               <a:rPr lang="de-DE" smtClean="0"/>
               <a:pPr/>
-              <a:t>2</a:t>
+              <a:t>3</a:t>
             </a:fld>
             <a:endParaRPr lang="de-DE"/>
           </a:p>
@@ -6163,14 +6796,14 @@
           </a:ln>
           <a:extLst>
             <a:ext uri="{909E8E84-426E-40DD-AFC4-6F175D3DCCD1}">
-              <a14:hiddenFill xmlns:a14="http://schemas.microsoft.com/office/drawing/2010/main" xmlns="">
+              <a14:hiddenFill xmlns="" xmlns:a14="http://schemas.microsoft.com/office/drawing/2010/main">
                 <a:solidFill>
                   <a:srgbClr val="FFFFFF"/>
                 </a:solidFill>
               </a14:hiddenFill>
             </a:ext>
             <a:ext uri="{91240B29-F687-4F45-9708-019B960494DF}">
-              <a14:hiddenLine xmlns:a14="http://schemas.microsoft.com/office/drawing/2010/main" xmlns="" w="9525">
+              <a14:hiddenLine xmlns="" xmlns:a14="http://schemas.microsoft.com/office/drawing/2010/main" w="9525">
                 <a:solidFill>
                   <a:srgbClr val="000000"/>
                 </a:solidFill>
@@ -6260,14 +6893,14 @@
           </a:ln>
           <a:extLst>
             <a:ext uri="{909E8E84-426E-40DD-AFC4-6F175D3DCCD1}">
-              <a14:hiddenFill xmlns:a14="http://schemas.microsoft.com/office/drawing/2010/main" xmlns="">
+              <a14:hiddenFill xmlns="" xmlns:a14="http://schemas.microsoft.com/office/drawing/2010/main">
                 <a:solidFill>
                   <a:srgbClr val="FFFFFF"/>
                 </a:solidFill>
               </a14:hiddenFill>
             </a:ext>
             <a:ext uri="{91240B29-F687-4F45-9708-019B960494DF}">
-              <a14:hiddenLine xmlns:a14="http://schemas.microsoft.com/office/drawing/2010/main" xmlns="" w="9525">
+              <a14:hiddenLine xmlns="" xmlns:a14="http://schemas.microsoft.com/office/drawing/2010/main" w="9525">
                 <a:solidFill>
                   <a:srgbClr val="000000"/>
                 </a:solidFill>
@@ -6344,14 +6977,14 @@
           </a:ln>
           <a:extLst>
             <a:ext uri="{909E8E84-426E-40DD-AFC4-6F175D3DCCD1}">
-              <a14:hiddenFill xmlns:a14="http://schemas.microsoft.com/office/drawing/2010/main" xmlns="">
+              <a14:hiddenFill xmlns="" xmlns:a14="http://schemas.microsoft.com/office/drawing/2010/main">
                 <a:solidFill>
                   <a:srgbClr val="FFFFFF"/>
                 </a:solidFill>
               </a14:hiddenFill>
             </a:ext>
             <a:ext uri="{91240B29-F687-4F45-9708-019B960494DF}">
-              <a14:hiddenLine xmlns:a14="http://schemas.microsoft.com/office/drawing/2010/main" xmlns="" w="9525">
+              <a14:hiddenLine xmlns="" xmlns:a14="http://schemas.microsoft.com/office/drawing/2010/main" w="9525">
                 <a:solidFill>
                   <a:srgbClr val="000000"/>
                 </a:solidFill>
@@ -6457,14 +7090,14 @@
           </a:ln>
           <a:extLst>
             <a:ext uri="{909E8E84-426E-40DD-AFC4-6F175D3DCCD1}">
-              <a14:hiddenFill xmlns:a14="http://schemas.microsoft.com/office/drawing/2010/main" xmlns="">
+              <a14:hiddenFill xmlns="" xmlns:a14="http://schemas.microsoft.com/office/drawing/2010/main">
                 <a:solidFill>
                   <a:srgbClr val="FFFFFF"/>
                 </a:solidFill>
               </a14:hiddenFill>
             </a:ext>
             <a:ext uri="{91240B29-F687-4F45-9708-019B960494DF}">
-              <a14:hiddenLine xmlns:a14="http://schemas.microsoft.com/office/drawing/2010/main" xmlns="" w="9525">
+              <a14:hiddenLine xmlns="" xmlns:a14="http://schemas.microsoft.com/office/drawing/2010/main" w="9525">
                 <a:solidFill>
                   <a:srgbClr val="000000"/>
                 </a:solidFill>
@@ -6935,7 +7568,7 @@
 </p:sld>
 </file>
 
-<file path=ppt/slides/slide3.xml><?xml version="1.0" encoding="utf-8"?>
+<file path=ppt/slides/slide4.xml><?xml version="1.0" encoding="utf-8"?>
 <p:sld xmlns:a="http://schemas.openxmlformats.org/drawingml/2006/main" xmlns:r="http://schemas.openxmlformats.org/officeDocument/2006/relationships" xmlns:p="http://schemas.openxmlformats.org/presentationml/2006/main">
   <p:cSld>
     <p:spTree>
@@ -7056,13 +7689,8 @@
             <a:pPr lvl="1"/>
             <a:r>
               <a:rPr lang="en-US" sz="2000" dirty="0" smtClean="0"/>
-              <a:t>Live </a:t>
-            </a:r>
-            <a:r>
-              <a:rPr lang="en-US" sz="2000" dirty="0" smtClean="0"/>
-              <a:t>coding</a:t>
-            </a:r>
-            <a:endParaRPr lang="en-US" sz="2000" dirty="0" smtClean="0"/>
+              <a:t>Live coding</a:t>
+            </a:r>
           </a:p>
           <a:p>
             <a:pPr lvl="1"/>
@@ -7092,7 +7720,7 @@
             <a:fld id="{45DCE98C-4068-43B5-93A3-A24C7A23A2DB}" type="slidenum">
               <a:rPr lang="de-DE" smtClean="0"/>
               <a:pPr/>
-              <a:t>3</a:t>
+              <a:t>4</a:t>
             </a:fld>
             <a:endParaRPr lang="de-DE"/>
           </a:p>
@@ -7458,7 +8086,7 @@
 </p:sld>
 </file>
 
-<file path=ppt/slides/slide4.xml><?xml version="1.0" encoding="utf-8"?>
+<file path=ppt/slides/slide5.xml><?xml version="1.0" encoding="utf-8"?>
 <p:sld xmlns:a="http://schemas.openxmlformats.org/drawingml/2006/main" xmlns:r="http://schemas.openxmlformats.org/officeDocument/2006/relationships" xmlns:p="http://schemas.openxmlformats.org/presentationml/2006/main">
   <p:cSld>
     <p:spTree>
@@ -7559,7 +8187,7 @@
             </a:r>
             <a:r>
               <a:rPr lang="de-DE" sz="2000" dirty="0" err="1" smtClean="0"/>
-              <a:t>using</a:t>
+              <a:t>are</a:t>
             </a:r>
             <a:r>
               <a:rPr lang="de-DE" sz="2000" dirty="0" smtClean="0"/>
@@ -7567,17 +8195,28 @@
             </a:r>
             <a:r>
               <a:rPr lang="de-DE" sz="2000" dirty="0" err="1" smtClean="0"/>
-              <a:t>Seam</a:t>
+              <a:t>we</a:t>
             </a:r>
             <a:r>
               <a:rPr lang="de-DE" sz="2000" dirty="0" smtClean="0"/>
               <a:t> </a:t>
             </a:r>
             <a:r>
+              <a:rPr lang="de-DE" sz="2000" dirty="0" err="1" smtClean="0"/>
+              <a:t>using</a:t>
+            </a:r>
+            <a:r>
               <a:rPr lang="de-DE" sz="2000" dirty="0" smtClean="0"/>
-              <a:t>2 still?</a:t>
-            </a:r>
-            <a:endParaRPr lang="de-DE" sz="2000" dirty="0" smtClean="0"/>
+              <a:t> </a:t>
+            </a:r>
+            <a:r>
+              <a:rPr lang="de-DE" sz="2000" dirty="0" err="1" smtClean="0"/>
+              <a:t>Seam</a:t>
+            </a:r>
+            <a:r>
+              <a:rPr lang="de-DE" sz="2000" dirty="0" smtClean="0"/>
+              <a:t> 2 still?</a:t>
+            </a:r>
           </a:p>
           <a:p>
             <a:pPr lvl="1"/>
@@ -7598,28 +8237,15 @@
             <a:pPr lvl="1"/>
             <a:r>
               <a:rPr lang="en-US" sz="2000" dirty="0" smtClean="0"/>
-              <a:t>Seam </a:t>
-            </a:r>
+              <a:t>Seam 3 – bunch of independent modules</a:t>
+            </a:r>
+          </a:p>
+          <a:p>
+            <a:pPr lvl="2"/>
             <a:r>
               <a:rPr lang="en-US" sz="2000" dirty="0" smtClean="0"/>
-              <a:t>3 – bunch of </a:t>
-            </a:r>
-            <a:r>
-              <a:rPr lang="en-US" sz="2000" dirty="0" smtClean="0"/>
-              <a:t>independent modules</a:t>
-            </a:r>
-          </a:p>
-          <a:p>
-            <a:pPr lvl="2"/>
-            <a:r>
-              <a:rPr lang="en-US" sz="2000" dirty="0" smtClean="0"/>
-              <a:t>No </a:t>
-            </a:r>
-            <a:r>
-              <a:rPr lang="en-US" sz="2000" dirty="0" smtClean="0"/>
-              <a:t>release of hole bundle, yet</a:t>
-            </a:r>
-            <a:endParaRPr lang="en-US" sz="2000" dirty="0" smtClean="0"/>
+              <a:t>No release of hole bundle, yet</a:t>
+            </a:r>
           </a:p>
           <a:p>
             <a:pPr lvl="2"/>
@@ -7640,19 +8266,7 @@
             <a:pPr lvl="2"/>
             <a:r>
               <a:rPr lang="en-US" sz="2000" dirty="0" smtClean="0"/>
-              <a:t>Alpha</a:t>
-            </a:r>
-            <a:r>
-              <a:rPr lang="en-US" sz="2000" dirty="0" smtClean="0"/>
-              <a:t>: </a:t>
-            </a:r>
-            <a:r>
-              <a:rPr lang="en-US" sz="2000" dirty="0" smtClean="0"/>
-              <a:t>Seam Faces</a:t>
-            </a:r>
-            <a:r>
-              <a:rPr lang="en-US" sz="2000" dirty="0" smtClean="0"/>
-              <a:t>, International, JMS, XML </a:t>
+              <a:t>Alpha: Seam Faces, International, JMS, XML </a:t>
             </a:r>
             <a:r>
               <a:rPr lang="en-US" sz="2000" dirty="0" err="1" smtClean="0"/>
@@ -7664,11 +8278,7 @@
             <a:pPr lvl="2"/>
             <a:r>
               <a:rPr lang="en-US" sz="2000" dirty="0" smtClean="0"/>
-              <a:t>No release: Drools, Persistence, </a:t>
-            </a:r>
-            <a:r>
-              <a:rPr lang="en-US" sz="2000" dirty="0" smtClean="0"/>
-              <a:t>Security, …</a:t>
+              <a:t>No release: Drools, Persistence, Security, …</a:t>
             </a:r>
           </a:p>
           <a:p>
@@ -7679,13 +8289,8 @@
             <a:pPr lvl="1"/>
             <a:r>
               <a:rPr lang="en-US" sz="2000" dirty="0" smtClean="0"/>
-              <a:t>JBossAS6M5 – final about end of </a:t>
-            </a:r>
-            <a:r>
-              <a:rPr lang="en-US" sz="2000" dirty="0" smtClean="0"/>
-              <a:t>year</a:t>
-            </a:r>
-            <a:endParaRPr lang="en-US" sz="2000" dirty="0" smtClean="0"/>
+              <a:t>JBossAS6M5 – final about end of year</a:t>
+            </a:r>
           </a:p>
         </p:txBody>
       </p:sp>
@@ -7707,7 +8312,7 @@
             <a:fld id="{45DCE98C-4068-43B5-93A3-A24C7A23A2DB}" type="slidenum">
               <a:rPr lang="de-DE" smtClean="0"/>
               <a:pPr/>
-              <a:t>4</a:t>
+              <a:t>5</a:t>
             </a:fld>
             <a:endParaRPr lang="de-DE"/>
           </a:p>
@@ -8177,367 +8782,6 @@
 </p:sld>
 </file>
 
-<file path=ppt/slides/slide5.xml><?xml version="1.0" encoding="utf-8"?>
-<p:sld xmlns:a="http://schemas.openxmlformats.org/drawingml/2006/main" xmlns:r="http://schemas.openxmlformats.org/officeDocument/2006/relationships" xmlns:p="http://schemas.openxmlformats.org/presentationml/2006/main">
-  <p:cSld>
-    <p:spTree>
-      <p:nvGrpSpPr>
-        <p:cNvPr id="1" name=""/>
-        <p:cNvGrpSpPr/>
-        <p:nvPr/>
-      </p:nvGrpSpPr>
-      <p:grpSpPr>
-        <a:xfrm>
-          <a:off x="0" y="0"/>
-          <a:ext cx="0" cy="0"/>
-          <a:chOff x="0" y="0"/>
-          <a:chExt cx="0" cy="0"/>
-        </a:xfrm>
-      </p:grpSpPr>
-      <p:sp>
-        <p:nvSpPr>
-          <p:cNvPr id="5129" name="Rectangle 9"/>
-          <p:cNvSpPr>
-            <a:spLocks noGrp="1" noChangeArrowheads="1"/>
-          </p:cNvSpPr>
-          <p:nvPr>
-            <p:ph type="title"/>
-          </p:nvPr>
-        </p:nvSpPr>
-        <p:spPr/>
-        <p:txBody>
-          <a:bodyPr/>
-          <a:lstStyle/>
-          <a:p>
-            <a:r>
-              <a:rPr lang="de-DE" dirty="0" err="1" smtClean="0"/>
-              <a:t>Arquillian</a:t>
-            </a:r>
-            <a:r>
-              <a:rPr lang="de-DE" dirty="0" smtClean="0"/>
-              <a:t> – </a:t>
-            </a:r>
-            <a:r>
-              <a:rPr lang="de-DE" dirty="0" err="1" smtClean="0"/>
-              <a:t>future</a:t>
-            </a:r>
-            <a:r>
-              <a:rPr lang="de-DE" dirty="0" smtClean="0"/>
-              <a:t> </a:t>
-            </a:r>
-            <a:r>
-              <a:rPr lang="de-DE" dirty="0" err="1" smtClean="0"/>
-              <a:t>of</a:t>
-            </a:r>
-            <a:r>
-              <a:rPr lang="de-DE" dirty="0" smtClean="0"/>
-              <a:t> Java EE </a:t>
-            </a:r>
-            <a:r>
-              <a:rPr lang="de-DE" dirty="0" err="1" smtClean="0"/>
-              <a:t>testing</a:t>
-            </a:r>
-            <a:r>
-              <a:rPr lang="de-DE" dirty="0" smtClean="0"/>
-              <a:t> </a:t>
-            </a:r>
-          </a:p>
-        </p:txBody>
-      </p:sp>
-      <p:sp>
-        <p:nvSpPr>
-          <p:cNvPr id="5130" name="Rectangle 10"/>
-          <p:cNvSpPr>
-            <a:spLocks noGrp="1" noChangeArrowheads="1"/>
-          </p:cNvSpPr>
-          <p:nvPr>
-            <p:ph idx="1"/>
-          </p:nvPr>
-        </p:nvSpPr>
-        <p:spPr/>
-        <p:txBody>
-          <a:bodyPr/>
-          <a:lstStyle/>
-          <a:p>
-            <a:pPr>
-              <a:spcAft>
-                <a:spcPts val="1800"/>
-              </a:spcAft>
-            </a:pPr>
-            <a:r>
-              <a:rPr lang="de-DE" sz="2000" dirty="0" err="1" smtClean="0"/>
-              <a:t>What</a:t>
-            </a:r>
-            <a:r>
-              <a:rPr lang="de-DE" sz="2000" dirty="0" smtClean="0"/>
-              <a:t> </a:t>
-            </a:r>
-            <a:r>
-              <a:rPr lang="de-DE" sz="2000" dirty="0" err="1" smtClean="0"/>
-              <a:t>are</a:t>
-            </a:r>
-            <a:r>
-              <a:rPr lang="de-DE" sz="2000" dirty="0" smtClean="0"/>
-              <a:t> </a:t>
-            </a:r>
-            <a:r>
-              <a:rPr lang="de-DE" sz="2000" dirty="0" err="1" smtClean="0"/>
-              <a:t>the</a:t>
-            </a:r>
-            <a:r>
-              <a:rPr lang="de-DE" sz="2000" dirty="0" smtClean="0"/>
-              <a:t> </a:t>
-            </a:r>
-            <a:r>
-              <a:rPr lang="de-DE" sz="2000" dirty="0" err="1" smtClean="0"/>
-              <a:t>key</a:t>
-            </a:r>
-            <a:r>
-              <a:rPr lang="de-DE" sz="2000" dirty="0" smtClean="0"/>
-              <a:t> </a:t>
-            </a:r>
-            <a:r>
-              <a:rPr lang="de-DE" sz="2000" dirty="0" err="1" smtClean="0"/>
-              <a:t>issues</a:t>
-            </a:r>
-            <a:r>
-              <a:rPr lang="de-DE" sz="2000" dirty="0" smtClean="0"/>
-              <a:t>?</a:t>
-            </a:r>
-          </a:p>
-          <a:p>
-            <a:pPr lvl="1"/>
-            <a:r>
-              <a:rPr lang="de-DE" sz="2000" dirty="0" smtClean="0"/>
-              <a:t>Project </a:t>
-            </a:r>
-            <a:r>
-              <a:rPr lang="de-DE" sz="2000" dirty="0" err="1" smtClean="0"/>
-              <a:t>lead</a:t>
-            </a:r>
-            <a:r>
-              <a:rPr lang="de-DE" sz="2000" dirty="0" smtClean="0"/>
-              <a:t>: </a:t>
-            </a:r>
-            <a:r>
-              <a:rPr lang="de-DE" sz="2000" dirty="0" err="1" smtClean="0"/>
-              <a:t>Aslak</a:t>
-            </a:r>
-            <a:r>
-              <a:rPr lang="de-DE" sz="2000" dirty="0" smtClean="0"/>
-              <a:t> </a:t>
-            </a:r>
-            <a:r>
-              <a:rPr lang="de-DE" sz="2000" dirty="0" err="1" smtClean="0"/>
-              <a:t>Knutsen</a:t>
-            </a:r>
-            <a:endParaRPr lang="de-DE" sz="2000" dirty="0" smtClean="0"/>
-          </a:p>
-          <a:p>
-            <a:pPr lvl="1"/>
-            <a:r>
-              <a:rPr lang="de-DE" sz="2000" dirty="0" smtClean="0"/>
-              <a:t>Archives</a:t>
-            </a:r>
-          </a:p>
-          <a:p>
-            <a:pPr lvl="2"/>
-            <a:r>
-              <a:rPr lang="de-DE" sz="2000" dirty="0" err="1" smtClean="0"/>
-              <a:t>ShrinkWrap</a:t>
-            </a:r>
-            <a:endParaRPr lang="de-DE" sz="2000" dirty="0" smtClean="0"/>
-          </a:p>
-          <a:p>
-            <a:pPr lvl="1"/>
-            <a:r>
-              <a:rPr lang="de-DE" sz="2000" dirty="0" smtClean="0"/>
-              <a:t>Multiple Test </a:t>
-            </a:r>
-            <a:r>
-              <a:rPr lang="de-DE" sz="2000" dirty="0" err="1" smtClean="0"/>
-              <a:t>frameworks</a:t>
-            </a:r>
-            <a:endParaRPr lang="de-DE" sz="2000" dirty="0" smtClean="0"/>
-          </a:p>
-          <a:p>
-            <a:pPr lvl="2"/>
-            <a:r>
-              <a:rPr lang="de-DE" sz="2000" dirty="0" err="1" smtClean="0"/>
-              <a:t>JUnit</a:t>
-            </a:r>
-            <a:r>
-              <a:rPr lang="de-DE" sz="2000" dirty="0" smtClean="0"/>
-              <a:t>, </a:t>
-            </a:r>
-            <a:r>
-              <a:rPr lang="de-DE" sz="2000" dirty="0" err="1" smtClean="0"/>
-              <a:t>TestNG</a:t>
-            </a:r>
-            <a:endParaRPr lang="de-DE" sz="2000" dirty="0" smtClean="0"/>
-          </a:p>
-          <a:p>
-            <a:pPr lvl="1"/>
-            <a:r>
-              <a:rPr lang="de-DE" sz="2000" dirty="0" smtClean="0"/>
-              <a:t>Multiple Run </a:t>
-            </a:r>
-            <a:r>
-              <a:rPr lang="de-DE" sz="2000" dirty="0" err="1" smtClean="0"/>
-              <a:t>modes</a:t>
-            </a:r>
-            <a:endParaRPr lang="de-DE" sz="2000" dirty="0" smtClean="0"/>
-          </a:p>
-          <a:p>
-            <a:pPr lvl="2"/>
-            <a:r>
-              <a:rPr lang="de-DE" sz="2000" dirty="0" smtClean="0"/>
-              <a:t>In </a:t>
-            </a:r>
-            <a:r>
-              <a:rPr lang="de-DE" sz="2000" dirty="0" err="1" smtClean="0"/>
-              <a:t>container</a:t>
-            </a:r>
-            <a:r>
-              <a:rPr lang="de-DE" sz="2000" dirty="0" smtClean="0"/>
-              <a:t>, </a:t>
-            </a:r>
-            <a:r>
-              <a:rPr lang="de-DE" sz="2000" dirty="0" err="1" smtClean="0"/>
-              <a:t>as</a:t>
-            </a:r>
-            <a:r>
-              <a:rPr lang="de-DE" sz="2000" dirty="0" smtClean="0"/>
-              <a:t> </a:t>
-            </a:r>
-            <a:r>
-              <a:rPr lang="de-DE" sz="2000" dirty="0" err="1" smtClean="0"/>
-              <a:t>client</a:t>
-            </a:r>
-            <a:endParaRPr lang="de-DE" sz="2000" dirty="0" smtClean="0"/>
-          </a:p>
-          <a:p>
-            <a:pPr lvl="1"/>
-            <a:r>
-              <a:rPr lang="de-DE" sz="2000" dirty="0" smtClean="0"/>
-              <a:t>Multiple </a:t>
-            </a:r>
-            <a:r>
-              <a:rPr lang="de-DE" sz="2000" dirty="0" err="1" smtClean="0"/>
-              <a:t>Enrichers</a:t>
-            </a:r>
-            <a:endParaRPr lang="de-DE" sz="2000" dirty="0" smtClean="0"/>
-          </a:p>
-          <a:p>
-            <a:pPr lvl="2"/>
-            <a:r>
-              <a:rPr lang="de-DE" sz="2000" dirty="0" smtClean="0"/>
-              <a:t>CDI, EJB, </a:t>
-            </a:r>
-            <a:r>
-              <a:rPr lang="de-DE" sz="2000" dirty="0" smtClean="0"/>
-              <a:t>Resources</a:t>
-            </a:r>
-            <a:endParaRPr lang="de-DE" sz="2000" dirty="0" smtClean="0"/>
-          </a:p>
-          <a:p>
-            <a:pPr lvl="1"/>
-            <a:r>
-              <a:rPr lang="de-DE" sz="2000" dirty="0" smtClean="0"/>
-              <a:t>Multiple Containers</a:t>
-            </a:r>
-          </a:p>
-        </p:txBody>
-      </p:sp>
-      <p:sp>
-        <p:nvSpPr>
-          <p:cNvPr id="4" name="Foliennummernplatzhalter 3"/>
-          <p:cNvSpPr>
-            <a:spLocks noGrp="1"/>
-          </p:cNvSpPr>
-          <p:nvPr>
-            <p:ph type="sldNum" sz="quarter" idx="4"/>
-          </p:nvPr>
-        </p:nvSpPr>
-        <p:spPr/>
-        <p:txBody>
-          <a:bodyPr/>
-          <a:lstStyle/>
-          <a:p>
-            <a:fld id="{45DCE98C-4068-43B5-93A3-A24C7A23A2DB}" type="slidenum">
-              <a:rPr lang="de-DE" smtClean="0"/>
-              <a:pPr/>
-              <a:t>5</a:t>
-            </a:fld>
-            <a:endParaRPr lang="de-DE"/>
-          </a:p>
-        </p:txBody>
-      </p:sp>
-      <p:sp>
-        <p:nvSpPr>
-          <p:cNvPr id="5" name="Datumsplatzhalter 4"/>
-          <p:cNvSpPr>
-            <a:spLocks noGrp="1"/>
-          </p:cNvSpPr>
-          <p:nvPr>
-            <p:ph type="dt" sz="half" idx="2"/>
-          </p:nvPr>
-        </p:nvSpPr>
-        <p:spPr/>
-        <p:txBody>
-          <a:bodyPr/>
-          <a:lstStyle/>
-          <a:p>
-            <a:fld id="{98405E6C-AB5C-49C6-8300-E0D31946C0F1}" type="datetime1">
-              <a:rPr lang="de-DE" smtClean="0"/>
-              <a:pPr/>
-              <a:t>07.10.2010</a:t>
-            </a:fld>
-            <a:endParaRPr lang="de-DE"/>
-          </a:p>
-        </p:txBody>
-      </p:sp>
-      <p:sp>
-        <p:nvSpPr>
-          <p:cNvPr id="6" name="Fußzeilenplatzhalter 5"/>
-          <p:cNvSpPr>
-            <a:spLocks noGrp="1"/>
-          </p:cNvSpPr>
-          <p:nvPr>
-            <p:ph type="ftr" sz="quarter" idx="3"/>
-          </p:nvPr>
-        </p:nvSpPr>
-        <p:spPr/>
-        <p:txBody>
-          <a:bodyPr/>
-          <a:lstStyle/>
-          <a:p>
-            <a:r>
-              <a:rPr lang="de-DE" smtClean="0"/>
-              <a:t>Copyright © 2010 – akquinet AG</a:t>
-            </a:r>
-            <a:endParaRPr lang="de-DE" dirty="0"/>
-          </a:p>
-        </p:txBody>
-      </p:sp>
-    </p:spTree>
-  </p:cSld>
-  <p:clrMapOvr>
-    <a:masterClrMapping/>
-  </p:clrMapOvr>
-  <p:transition spd="med" advClick="0">
-    <p:wipe dir="r"/>
-  </p:transition>
-  <p:timing>
-    <p:tnLst>
-      <p:par>
-        <p:cTn id="1" dur="indefinite" restart="never" nodeType="tmRoot"/>
-      </p:par>
-    </p:tnLst>
-  </p:timing>
-</p:sld>
-</file>
-
 <file path=ppt/slides/slide6.xml><?xml version="1.0" encoding="utf-8"?>
 <p:sld xmlns:a="http://schemas.openxmlformats.org/drawingml/2006/main" xmlns:r="http://schemas.openxmlformats.org/officeDocument/2006/relationships" xmlns:p="http://schemas.openxmlformats.org/presentationml/2006/main">
   <p:cSld>
@@ -8571,14 +8815,37 @@
           <a:lstStyle/>
           <a:p>
             <a:r>
-              <a:rPr lang="en-US" dirty="0" err="1" smtClean="0"/>
-              <a:t>ShrinkWrap</a:t>
-            </a:r>
-            <a:r>
-              <a:rPr lang="en-US" dirty="0" smtClean="0"/>
-              <a:t> – Skip the Build! </a:t>
-            </a:r>
-            <a:endParaRPr lang="de-DE" dirty="0" smtClean="0"/>
+              <a:rPr lang="de-DE" dirty="0" err="1" smtClean="0"/>
+              <a:t>Arquillian</a:t>
+            </a:r>
+            <a:r>
+              <a:rPr lang="de-DE" dirty="0" smtClean="0"/>
+              <a:t> – </a:t>
+            </a:r>
+            <a:r>
+              <a:rPr lang="de-DE" dirty="0" err="1" smtClean="0"/>
+              <a:t>future</a:t>
+            </a:r>
+            <a:r>
+              <a:rPr lang="de-DE" dirty="0" smtClean="0"/>
+              <a:t> </a:t>
+            </a:r>
+            <a:r>
+              <a:rPr lang="de-DE" dirty="0" err="1" smtClean="0"/>
+              <a:t>of</a:t>
+            </a:r>
+            <a:r>
+              <a:rPr lang="de-DE" dirty="0" smtClean="0"/>
+              <a:t> Java EE </a:t>
+            </a:r>
+            <a:r>
+              <a:rPr lang="de-DE" dirty="0" err="1" smtClean="0"/>
+              <a:t>testing</a:t>
+            </a:r>
+            <a:r>
+              <a:rPr lang="de-DE" dirty="0" smtClean="0"/>
+              <a:t> </a:t>
+            </a:r>
           </a:p>
         </p:txBody>
       </p:sp>
@@ -8604,67 +8871,181 @@
             </a:pPr>
             <a:r>
               <a:rPr lang="de-DE" sz="2000" dirty="0" err="1" smtClean="0"/>
-              <a:t>Saving</a:t>
+              <a:t>What</a:t>
             </a:r>
             <a:r>
               <a:rPr lang="de-DE" sz="2000" dirty="0" smtClean="0"/>
               <a:t> </a:t>
             </a:r>
             <a:r>
+              <a:rPr lang="de-DE" sz="2000" dirty="0" err="1" smtClean="0"/>
+              <a:t>are</a:t>
+            </a:r>
+            <a:r>
               <a:rPr lang="de-DE" sz="2000" dirty="0" smtClean="0"/>
-              <a:t>time</a:t>
+              <a:t> </a:t>
+            </a:r>
+            <a:r>
+              <a:rPr lang="de-DE" sz="2000" dirty="0" err="1" smtClean="0"/>
+              <a:t>the</a:t>
             </a:r>
             <a:r>
               <a:rPr lang="de-DE" sz="2000" dirty="0" smtClean="0"/>
-              <a:t>…</a:t>
+              <a:t> </a:t>
+            </a:r>
+            <a:r>
+              <a:rPr lang="de-DE" sz="2000" dirty="0" err="1" smtClean="0"/>
+              <a:t>key</a:t>
+            </a:r>
+            <a:r>
+              <a:rPr lang="de-DE" sz="2000" dirty="0" smtClean="0"/>
+              <a:t> </a:t>
+            </a:r>
+            <a:r>
+              <a:rPr lang="de-DE" sz="2000" dirty="0" err="1" smtClean="0"/>
+              <a:t>issues</a:t>
+            </a:r>
+            <a:r>
+              <a:rPr lang="de-DE" sz="2000" dirty="0" smtClean="0"/>
+              <a:t>?</a:t>
             </a:r>
           </a:p>
           <a:p>
             <a:pPr lvl="1"/>
             <a:r>
-              <a:rPr lang="en-US" sz="2000" dirty="0" err="1" smtClean="0"/>
+              <a:rPr lang="de-DE" sz="2000" dirty="0" smtClean="0"/>
+              <a:t>Project </a:t>
+            </a:r>
+            <a:r>
+              <a:rPr lang="de-DE" sz="2000" dirty="0" err="1" smtClean="0"/>
+              <a:t>lead</a:t>
+            </a:r>
+            <a:r>
+              <a:rPr lang="de-DE" sz="2000" dirty="0" smtClean="0"/>
+              <a:t>: </a:t>
+            </a:r>
+            <a:r>
+              <a:rPr lang="de-DE" sz="2000" dirty="0" err="1" smtClean="0"/>
+              <a:t>Aslak</a:t>
+            </a:r>
+            <a:r>
+              <a:rPr lang="de-DE" sz="2000" dirty="0" smtClean="0"/>
+              <a:t> </a:t>
+            </a:r>
+            <a:r>
+              <a:rPr lang="de-DE" sz="2000" dirty="0" err="1" smtClean="0"/>
+              <a:t>Knutsen</a:t>
+            </a:r>
+            <a:endParaRPr lang="de-DE" sz="2000" dirty="0" smtClean="0"/>
+          </a:p>
+          <a:p>
+            <a:pPr lvl="1"/>
+            <a:r>
+              <a:rPr lang="de-DE" sz="2000" dirty="0" smtClean="0"/>
+              <a:t>Archives</a:t>
+            </a:r>
+          </a:p>
+          <a:p>
+            <a:pPr lvl="2"/>
+            <a:r>
+              <a:rPr lang="de-DE" sz="2000" dirty="0" err="1" smtClean="0"/>
               <a:t>ShrinkWrap</a:t>
             </a:r>
-            <a:r>
-              <a:rPr lang="en-US" sz="2000" dirty="0" smtClean="0"/>
-              <a:t> – Programmatic  archive creation </a:t>
-            </a:r>
+            <a:endParaRPr lang="de-DE" sz="2000" dirty="0" smtClean="0"/>
           </a:p>
           <a:p>
             <a:pPr lvl="1"/>
             <a:r>
-              <a:rPr lang="en-US" sz="2000" dirty="0" smtClean="0"/>
-              <a:t>Simple API </a:t>
-            </a:r>
+              <a:rPr lang="de-DE" sz="2000" dirty="0" smtClean="0"/>
+              <a:t>Multiple Test </a:t>
+            </a:r>
+            <a:r>
+              <a:rPr lang="de-DE" sz="2000" dirty="0" err="1" smtClean="0"/>
+              <a:t>frameworks</a:t>
+            </a:r>
+            <a:endParaRPr lang="de-DE" sz="2000" dirty="0" smtClean="0"/>
+          </a:p>
+          <a:p>
+            <a:pPr lvl="2"/>
+            <a:r>
+              <a:rPr lang="de-DE" sz="2000" dirty="0" err="1" smtClean="0"/>
+              <a:t>JUnit</a:t>
+            </a:r>
+            <a:r>
+              <a:rPr lang="de-DE" sz="2000" dirty="0" smtClean="0"/>
+              <a:t>, </a:t>
+            </a:r>
+            <a:r>
+              <a:rPr lang="de-DE" sz="2000" dirty="0" err="1" smtClean="0"/>
+              <a:t>TestNG</a:t>
+            </a:r>
+            <a:endParaRPr lang="de-DE" sz="2000" dirty="0" smtClean="0"/>
           </a:p>
           <a:p>
             <a:pPr lvl="1"/>
             <a:r>
-              <a:rPr lang="en-US" sz="2000" dirty="0" smtClean="0"/>
-              <a:t>Micro deployments </a:t>
-            </a:r>
+              <a:rPr lang="de-DE" sz="2000" dirty="0" smtClean="0"/>
+              <a:t>Multiple Run </a:t>
+            </a:r>
+            <a:r>
+              <a:rPr lang="de-DE" sz="2000" dirty="0" err="1" smtClean="0"/>
+              <a:t>modes</a:t>
+            </a:r>
+            <a:endParaRPr lang="de-DE" sz="2000" dirty="0" smtClean="0"/>
+          </a:p>
+          <a:p>
+            <a:pPr lvl="2"/>
+            <a:r>
+              <a:rPr lang="de-DE" sz="2000" dirty="0" smtClean="0"/>
+              <a:t>In </a:t>
+            </a:r>
+            <a:r>
+              <a:rPr lang="de-DE" sz="2000" dirty="0" err="1" smtClean="0"/>
+              <a:t>container</a:t>
+            </a:r>
+            <a:r>
+              <a:rPr lang="de-DE" sz="2000" dirty="0" smtClean="0"/>
+              <a:t>, </a:t>
+            </a:r>
+            <a:r>
+              <a:rPr lang="de-DE" sz="2000" dirty="0" err="1" smtClean="0"/>
+              <a:t>as</a:t>
+            </a:r>
+            <a:r>
+              <a:rPr lang="de-DE" sz="2000" dirty="0" smtClean="0"/>
+              <a:t> </a:t>
+            </a:r>
+            <a:r>
+              <a:rPr lang="de-DE" sz="2000" dirty="0" err="1" smtClean="0"/>
+              <a:t>client</a:t>
+            </a:r>
+            <a:endParaRPr lang="de-DE" sz="2000" dirty="0" smtClean="0"/>
           </a:p>
           <a:p>
             <a:pPr lvl="1"/>
             <a:r>
-              <a:rPr lang="en-US" sz="2000" dirty="0" smtClean="0"/>
-              <a:t>IDE incremental compilation</a:t>
-            </a:r>
+              <a:rPr lang="de-DE" sz="2000" dirty="0" smtClean="0"/>
+              <a:t>Multiple </a:t>
+            </a:r>
+            <a:r>
+              <a:rPr lang="de-DE" sz="2000" dirty="0" err="1" smtClean="0"/>
+              <a:t>Enrichers</a:t>
+            </a:r>
+            <a:endParaRPr lang="de-DE" sz="2000" dirty="0" smtClean="0"/>
           </a:p>
           <a:p>
             <a:pPr lvl="2"/>
             <a:r>
-              <a:rPr lang="en-US" sz="2000" dirty="0" smtClean="0"/>
-              <a:t>Save and re-run</a:t>
-            </a:r>
-          </a:p>
-          <a:p>
-            <a:pPr lvl="2"/>
-            <a:r>
-              <a:rPr lang="en-US" sz="2000" dirty="0" smtClean="0"/>
-              <a:t>Skip the Build!</a:t>
-            </a:r>
-            <a:endParaRPr lang="de-DE" sz="2000" dirty="0" smtClean="0"/>
+              <a:rPr lang="de-DE" sz="2000" dirty="0" smtClean="0"/>
+              <a:t>CDI, EJB, Resources</a:t>
+            </a:r>
+          </a:p>
+          <a:p>
+            <a:pPr lvl="1"/>
+            <a:r>
+              <a:rPr lang="de-DE" sz="2000" dirty="0" smtClean="0"/>
+              <a:t>Multiple Containers</a:t>
+            </a:r>
           </a:p>
         </p:txBody>
       </p:sp>
@@ -8790,6 +9171,217 @@
           <a:lstStyle/>
           <a:p>
             <a:r>
+              <a:rPr lang="en-US" dirty="0" err="1" smtClean="0"/>
+              <a:t>ShrinkWrap</a:t>
+            </a:r>
+            <a:r>
+              <a:rPr lang="en-US" dirty="0" smtClean="0"/>
+              <a:t> – Skip the Build! </a:t>
+            </a:r>
+            <a:endParaRPr lang="de-DE" dirty="0" smtClean="0"/>
+          </a:p>
+        </p:txBody>
+      </p:sp>
+      <p:sp>
+        <p:nvSpPr>
+          <p:cNvPr id="5130" name="Rectangle 10"/>
+          <p:cNvSpPr>
+            <a:spLocks noGrp="1" noChangeArrowheads="1"/>
+          </p:cNvSpPr>
+          <p:nvPr>
+            <p:ph idx="1"/>
+          </p:nvPr>
+        </p:nvSpPr>
+        <p:spPr/>
+        <p:txBody>
+          <a:bodyPr/>
+          <a:lstStyle/>
+          <a:p>
+            <a:pPr>
+              <a:spcAft>
+                <a:spcPts val="1800"/>
+              </a:spcAft>
+            </a:pPr>
+            <a:r>
+              <a:rPr lang="de-DE" sz="2000" dirty="0" err="1" smtClean="0"/>
+              <a:t>Saving</a:t>
+            </a:r>
+            <a:r>
+              <a:rPr lang="de-DE" sz="2000" dirty="0" smtClean="0"/>
+              <a:t> time…</a:t>
+            </a:r>
+          </a:p>
+          <a:p>
+            <a:pPr lvl="1"/>
+            <a:r>
+              <a:rPr lang="en-US" sz="2000" dirty="0" err="1" smtClean="0"/>
+              <a:t>ShrinkWrap</a:t>
+            </a:r>
+            <a:r>
+              <a:rPr lang="en-US" sz="2000" dirty="0" smtClean="0"/>
+              <a:t> – Programmatic  archive creation </a:t>
+            </a:r>
+          </a:p>
+          <a:p>
+            <a:pPr lvl="1"/>
+            <a:r>
+              <a:rPr lang="en-US" sz="2000" dirty="0" smtClean="0"/>
+              <a:t>Simple API </a:t>
+            </a:r>
+          </a:p>
+          <a:p>
+            <a:pPr lvl="1"/>
+            <a:r>
+              <a:rPr lang="en-US" sz="2000" dirty="0" smtClean="0"/>
+              <a:t>Micro deployments </a:t>
+            </a:r>
+          </a:p>
+          <a:p>
+            <a:pPr lvl="1"/>
+            <a:r>
+              <a:rPr lang="en-US" sz="2000" dirty="0" smtClean="0"/>
+              <a:t>IDE incremental compilation</a:t>
+            </a:r>
+          </a:p>
+          <a:p>
+            <a:pPr lvl="2"/>
+            <a:r>
+              <a:rPr lang="en-US" sz="2000" dirty="0" smtClean="0"/>
+              <a:t>Save and re-run</a:t>
+            </a:r>
+          </a:p>
+          <a:p>
+            <a:pPr lvl="2"/>
+            <a:r>
+              <a:rPr lang="en-US" sz="2000" dirty="0" smtClean="0"/>
+              <a:t>Skip the Build!</a:t>
+            </a:r>
+            <a:endParaRPr lang="de-DE" sz="2000" dirty="0" smtClean="0"/>
+          </a:p>
+        </p:txBody>
+      </p:sp>
+      <p:sp>
+        <p:nvSpPr>
+          <p:cNvPr id="4" name="Foliennummernplatzhalter 3"/>
+          <p:cNvSpPr>
+            <a:spLocks noGrp="1"/>
+          </p:cNvSpPr>
+          <p:nvPr>
+            <p:ph type="sldNum" sz="quarter" idx="4"/>
+          </p:nvPr>
+        </p:nvSpPr>
+        <p:spPr/>
+        <p:txBody>
+          <a:bodyPr/>
+          <a:lstStyle/>
+          <a:p>
+            <a:fld id="{45DCE98C-4068-43B5-93A3-A24C7A23A2DB}" type="slidenum">
+              <a:rPr lang="de-DE" smtClean="0"/>
+              <a:pPr/>
+              <a:t>7</a:t>
+            </a:fld>
+            <a:endParaRPr lang="de-DE"/>
+          </a:p>
+        </p:txBody>
+      </p:sp>
+      <p:sp>
+        <p:nvSpPr>
+          <p:cNvPr id="5" name="Datumsplatzhalter 4"/>
+          <p:cNvSpPr>
+            <a:spLocks noGrp="1"/>
+          </p:cNvSpPr>
+          <p:nvPr>
+            <p:ph type="dt" sz="half" idx="2"/>
+          </p:nvPr>
+        </p:nvSpPr>
+        <p:spPr/>
+        <p:txBody>
+          <a:bodyPr/>
+          <a:lstStyle/>
+          <a:p>
+            <a:fld id="{98405E6C-AB5C-49C6-8300-E0D31946C0F1}" type="datetime1">
+              <a:rPr lang="de-DE" smtClean="0"/>
+              <a:pPr/>
+              <a:t>07.10.2010</a:t>
+            </a:fld>
+            <a:endParaRPr lang="de-DE"/>
+          </a:p>
+        </p:txBody>
+      </p:sp>
+      <p:sp>
+        <p:nvSpPr>
+          <p:cNvPr id="6" name="Fußzeilenplatzhalter 5"/>
+          <p:cNvSpPr>
+            <a:spLocks noGrp="1"/>
+          </p:cNvSpPr>
+          <p:nvPr>
+            <p:ph type="ftr" sz="quarter" idx="3"/>
+          </p:nvPr>
+        </p:nvSpPr>
+        <p:spPr/>
+        <p:txBody>
+          <a:bodyPr/>
+          <a:lstStyle/>
+          <a:p>
+            <a:r>
+              <a:rPr lang="de-DE" smtClean="0"/>
+              <a:t>Copyright © 2010 – akquinet AG</a:t>
+            </a:r>
+            <a:endParaRPr lang="de-DE" dirty="0"/>
+          </a:p>
+        </p:txBody>
+      </p:sp>
+    </p:spTree>
+  </p:cSld>
+  <p:clrMapOvr>
+    <a:masterClrMapping/>
+  </p:clrMapOvr>
+  <p:transition spd="med" advClick="0">
+    <p:wipe dir="r"/>
+  </p:transition>
+  <p:timing>
+    <p:tnLst>
+      <p:par>
+        <p:cTn id="1" dur="indefinite" restart="never" nodeType="tmRoot"/>
+      </p:par>
+    </p:tnLst>
+  </p:timing>
+</p:sld>
+</file>
+
+<file path=ppt/slides/slide8.xml><?xml version="1.0" encoding="utf-8"?>
+<p:sld xmlns:a="http://schemas.openxmlformats.org/drawingml/2006/main" xmlns:r="http://schemas.openxmlformats.org/officeDocument/2006/relationships" xmlns:p="http://schemas.openxmlformats.org/presentationml/2006/main">
+  <p:cSld>
+    <p:spTree>
+      <p:nvGrpSpPr>
+        <p:cNvPr id="1" name=""/>
+        <p:cNvGrpSpPr/>
+        <p:nvPr/>
+      </p:nvGrpSpPr>
+      <p:grpSpPr>
+        <a:xfrm>
+          <a:off x="0" y="0"/>
+          <a:ext cx="0" cy="0"/>
+          <a:chOff x="0" y="0"/>
+          <a:chExt cx="0" cy="0"/>
+        </a:xfrm>
+      </p:grpSpPr>
+      <p:sp>
+        <p:nvSpPr>
+          <p:cNvPr id="5129" name="Rectangle 9"/>
+          <p:cNvSpPr>
+            <a:spLocks noGrp="1" noChangeArrowheads="1"/>
+          </p:cNvSpPr>
+          <p:nvPr>
+            <p:ph type="title"/>
+          </p:nvPr>
+        </p:nvSpPr>
+        <p:spPr/>
+        <p:txBody>
+          <a:bodyPr/>
+          <a:lstStyle/>
+          <a:p>
+            <a:r>
               <a:rPr lang="de-DE" dirty="0" smtClean="0"/>
               <a:t>Java EE </a:t>
             </a:r>
@@ -8882,7 +9474,7 @@
             <a:fld id="{45DCE98C-4068-43B5-93A3-A24C7A23A2DB}" type="slidenum">
               <a:rPr lang="de-DE" smtClean="0"/>
               <a:pPr/>
-              <a:t>7</a:t>
+              <a:t>8</a:t>
             </a:fld>
             <a:endParaRPr lang="de-DE"/>
           </a:p>
@@ -9593,7 +10185,7 @@
 </p:sld>
 </file>
 
-<file path=ppt/slides/slide8.xml><?xml version="1.0" encoding="utf-8"?>
+<file path=ppt/slides/slide9.xml><?xml version="1.0" encoding="utf-8"?>
 <p:sld xmlns:a="http://schemas.openxmlformats.org/drawingml/2006/main" xmlns:r="http://schemas.openxmlformats.org/officeDocument/2006/relationships" xmlns:p="http://schemas.openxmlformats.org/presentationml/2006/main">
   <p:cSld>
     <p:spTree>
@@ -9752,7 +10344,7 @@
             <a:fld id="{45DCE98C-4068-43B5-93A3-A24C7A23A2DB}" type="slidenum">
               <a:rPr lang="de-DE" smtClean="0"/>
               <a:pPr/>
-              <a:t>8</a:t>
+              <a:t>9</a:t>
             </a:fld>
             <a:endParaRPr lang="de-DE"/>
           </a:p>
@@ -10339,11 +10931,7 @@
             </a:pPr>
             <a:r>
               <a:rPr lang="en-US" sz="2000" dirty="0" smtClean="0"/>
-              <a:t>JCA </a:t>
-            </a:r>
-            <a:r>
-              <a:rPr lang="en-US" sz="2000" dirty="0" smtClean="0"/>
-              <a:t>container configuration</a:t>
+              <a:t>JCA container configuration</a:t>
             </a:r>
             <a:endParaRPr lang="de-DE" sz="2000" dirty="0"/>
           </a:p>
@@ -10376,11 +10964,7 @@
             </a:pPr>
             <a:r>
               <a:rPr lang="en-US" sz="2000" dirty="0" smtClean="0"/>
-              <a:t>multiple </a:t>
-            </a:r>
-            <a:r>
-              <a:rPr lang="en-US" sz="2000" dirty="0" smtClean="0"/>
-              <a:t>containers</a:t>
+              <a:t>multiple containers</a:t>
             </a:r>
           </a:p>
           <a:p>
@@ -10392,7 +10976,6 @@
               <a:rPr lang="en-US" sz="2000" dirty="0" smtClean="0"/>
               <a:t> + Cargo</a:t>
             </a:r>
-            <a:endParaRPr lang="en-US" sz="2000" dirty="0" smtClean="0"/>
           </a:p>
           <a:p>
             <a:pPr algn="ctr"/>
@@ -10810,602 +11393,6 @@
       <p:bldP spid="15" grpId="0"/>
       <p:bldP spid="16" grpId="0"/>
     </p:bldLst>
-  </p:timing>
-</p:sld>
-</file>
-
-<file path=ppt/slides/slide9.xml><?xml version="1.0" encoding="utf-8"?>
-<p:sld xmlns:a="http://schemas.openxmlformats.org/drawingml/2006/main" xmlns:r="http://schemas.openxmlformats.org/officeDocument/2006/relationships" xmlns:p="http://schemas.openxmlformats.org/presentationml/2006/main">
-  <p:cSld>
-    <p:spTree>
-      <p:nvGrpSpPr>
-        <p:cNvPr id="1" name=""/>
-        <p:cNvGrpSpPr/>
-        <p:nvPr/>
-      </p:nvGrpSpPr>
-      <p:grpSpPr>
-        <a:xfrm>
-          <a:off x="0" y="0"/>
-          <a:ext cx="0" cy="0"/>
-          <a:chOff x="0" y="0"/>
-          <a:chExt cx="0" cy="0"/>
-        </a:xfrm>
-      </p:grpSpPr>
-      <p:sp>
-        <p:nvSpPr>
-          <p:cNvPr id="10" name="Rechteck 9"/>
-          <p:cNvSpPr/>
-          <p:nvPr/>
-        </p:nvSpPr>
-        <p:spPr>
-          <a:xfrm>
-            <a:off x="428597" y="1571612"/>
-            <a:ext cx="5357850" cy="2071702"/>
-          </a:xfrm>
-          <a:prstGeom prst="rect">
-            <a:avLst/>
-          </a:prstGeom>
-          <a:solidFill>
-            <a:schemeClr val="bg1">
-              <a:lumMod val="95000"/>
-              <a:alpha val="15000"/>
-            </a:schemeClr>
-          </a:solidFill>
-          <a:ln/>
-        </p:spPr>
-        <p:style>
-          <a:lnRef idx="1">
-            <a:schemeClr val="accent1"/>
-          </a:lnRef>
-          <a:fillRef idx="3">
-            <a:schemeClr val="accent1"/>
-          </a:fillRef>
-          <a:effectRef idx="2">
-            <a:schemeClr val="accent1"/>
-          </a:effectRef>
-          <a:fontRef idx="minor">
-            <a:schemeClr val="lt1"/>
-          </a:fontRef>
-        </p:style>
-      </p:sp>
-      <p:sp>
-        <p:nvSpPr>
-          <p:cNvPr id="5129" name="Rectangle 9"/>
-          <p:cNvSpPr>
-            <a:spLocks noGrp="1" noChangeArrowheads="1"/>
-          </p:cNvSpPr>
-          <p:nvPr>
-            <p:ph type="title"/>
-          </p:nvPr>
-        </p:nvSpPr>
-        <p:spPr/>
-        <p:txBody>
-          <a:bodyPr/>
-          <a:lstStyle/>
-          <a:p>
-            <a:r>
-              <a:rPr lang="en-US" dirty="0" smtClean="0"/>
-              <a:t>Practice – Seam 2-Integration</a:t>
-            </a:r>
-            <a:endParaRPr lang="de-DE" dirty="0" smtClean="0"/>
-          </a:p>
-        </p:txBody>
-      </p:sp>
-      <p:sp>
-        <p:nvSpPr>
-          <p:cNvPr id="4" name="Foliennummernplatzhalter 3"/>
-          <p:cNvSpPr>
-            <a:spLocks noGrp="1"/>
-          </p:cNvSpPr>
-          <p:nvPr>
-            <p:ph type="sldNum" sz="quarter" idx="4"/>
-          </p:nvPr>
-        </p:nvSpPr>
-        <p:spPr/>
-        <p:txBody>
-          <a:bodyPr/>
-          <a:lstStyle/>
-          <a:p>
-            <a:fld id="{45DCE98C-4068-43B5-93A3-A24C7A23A2DB}" type="slidenum">
-              <a:rPr lang="de-DE" smtClean="0"/>
-              <a:pPr/>
-              <a:t>9</a:t>
-            </a:fld>
-            <a:endParaRPr lang="de-DE"/>
-          </a:p>
-        </p:txBody>
-      </p:sp>
-      <p:sp>
-        <p:nvSpPr>
-          <p:cNvPr id="5" name="Datumsplatzhalter 4"/>
-          <p:cNvSpPr>
-            <a:spLocks noGrp="1"/>
-          </p:cNvSpPr>
-          <p:nvPr>
-            <p:ph type="dt" sz="half" idx="2"/>
-          </p:nvPr>
-        </p:nvSpPr>
-        <p:spPr/>
-        <p:txBody>
-          <a:bodyPr/>
-          <a:lstStyle/>
-          <a:p>
-            <a:fld id="{98405E6C-AB5C-49C6-8300-E0D31946C0F1}" type="datetime1">
-              <a:rPr lang="de-DE" smtClean="0"/>
-              <a:pPr/>
-              <a:t>07.10.2010</a:t>
-            </a:fld>
-            <a:endParaRPr lang="de-DE"/>
-          </a:p>
-        </p:txBody>
-      </p:sp>
-      <p:sp>
-        <p:nvSpPr>
-          <p:cNvPr id="6" name="Fußzeilenplatzhalter 5"/>
-          <p:cNvSpPr>
-            <a:spLocks noGrp="1"/>
-          </p:cNvSpPr>
-          <p:nvPr>
-            <p:ph type="ftr" sz="quarter" idx="3"/>
-          </p:nvPr>
-        </p:nvSpPr>
-        <p:spPr/>
-        <p:txBody>
-          <a:bodyPr/>
-          <a:lstStyle/>
-          <a:p>
-            <a:r>
-              <a:rPr lang="de-DE" smtClean="0"/>
-              <a:t>Copyright © 2010 – akquinet AG</a:t>
-            </a:r>
-            <a:endParaRPr lang="de-DE" dirty="0"/>
-          </a:p>
-        </p:txBody>
-      </p:sp>
-      <p:sp>
-        <p:nvSpPr>
-          <p:cNvPr id="12" name="Textfeld 11"/>
-          <p:cNvSpPr txBox="1"/>
-          <p:nvPr/>
-        </p:nvSpPr>
-        <p:spPr>
-          <a:xfrm>
-            <a:off x="357158" y="1214422"/>
-            <a:ext cx="4572032" cy="400110"/>
-          </a:xfrm>
-          <a:prstGeom prst="rect">
-            <a:avLst/>
-          </a:prstGeom>
-          <a:noFill/>
-        </p:spPr>
-        <p:txBody>
-          <a:bodyPr wrap="square" rtlCol="0">
-            <a:spAutoFit/>
-          </a:bodyPr>
-          <a:lstStyle/>
-          <a:p>
-            <a:r>
-              <a:rPr lang="de-DE" sz="2000" b="1" i="0" dirty="0" err="1" smtClean="0">
-                <a:solidFill>
-                  <a:schemeClr val="bg2">
-                    <a:lumMod val="50000"/>
-                  </a:schemeClr>
-                </a:solidFill>
-              </a:rPr>
-              <a:t>Local</a:t>
-            </a:r>
-            <a:r>
-              <a:rPr lang="de-DE" sz="2000" b="1" i="0" dirty="0" smtClean="0">
-                <a:solidFill>
-                  <a:schemeClr val="bg2">
-                    <a:lumMod val="50000"/>
-                  </a:schemeClr>
-                </a:solidFill>
-              </a:rPr>
-              <a:t> </a:t>
-            </a:r>
-            <a:r>
-              <a:rPr lang="de-DE" sz="2000" b="1" i="0" dirty="0" err="1" smtClean="0">
-                <a:solidFill>
-                  <a:schemeClr val="bg2">
-                    <a:lumMod val="50000"/>
-                  </a:schemeClr>
-                </a:solidFill>
-              </a:rPr>
-              <a:t>development</a:t>
-            </a:r>
-            <a:endParaRPr lang="de-DE" sz="2000" b="1" i="0" dirty="0" smtClean="0">
-              <a:solidFill>
-                <a:schemeClr val="bg2">
-                  <a:lumMod val="50000"/>
-                </a:schemeClr>
-              </a:solidFill>
-            </a:endParaRPr>
-          </a:p>
-        </p:txBody>
-      </p:sp>
-      <p:sp>
-        <p:nvSpPr>
-          <p:cNvPr id="7" name="Rechteck 6"/>
-          <p:cNvSpPr/>
-          <p:nvPr/>
-        </p:nvSpPr>
-        <p:spPr>
-          <a:xfrm>
-            <a:off x="642910" y="1714488"/>
-            <a:ext cx="1847047" cy="1781326"/>
-          </a:xfrm>
-          <a:prstGeom prst="rect">
-            <a:avLst/>
-          </a:prstGeom>
-          <a:ln/>
-          <a:effectLst>
-            <a:glow rad="63500">
-              <a:schemeClr val="accent1">
-                <a:alpha val="75000"/>
-              </a:schemeClr>
-            </a:glow>
-            <a:outerShdw blurRad="50800" dist="38100" dir="2700000" algn="br" rotWithShape="0">
-              <a:srgbClr val="000000">
-                <a:alpha val="43000"/>
-              </a:srgbClr>
-            </a:outerShdw>
-          </a:effectLst>
-        </p:spPr>
-        <p:style>
-          <a:lnRef idx="1">
-            <a:schemeClr val="accent3"/>
-          </a:lnRef>
-          <a:fillRef idx="3">
-            <a:schemeClr val="accent3"/>
-          </a:fillRef>
-          <a:effectRef idx="2">
-            <a:schemeClr val="accent3"/>
-          </a:effectRef>
-          <a:fontRef idx="minor">
-            <a:schemeClr val="lt1"/>
-          </a:fontRef>
-        </p:style>
-        <p:txBody>
-          <a:bodyPr/>
-          <a:lstStyle/>
-          <a:p>
-            <a:endParaRPr lang="de-DE" sz="2400" dirty="0" smtClean="0"/>
-          </a:p>
-          <a:p>
-            <a:endParaRPr lang="de-DE" sz="2400" dirty="0"/>
-          </a:p>
-        </p:txBody>
-      </p:sp>
-      <p:sp>
-        <p:nvSpPr>
-          <p:cNvPr id="8" name="Textfeld 7"/>
-          <p:cNvSpPr txBox="1"/>
-          <p:nvPr/>
-        </p:nvSpPr>
-        <p:spPr>
-          <a:xfrm>
-            <a:off x="614848" y="3095704"/>
-            <a:ext cx="1875109" cy="400110"/>
-          </a:xfrm>
-          <a:prstGeom prst="rect">
-            <a:avLst/>
-          </a:prstGeom>
-          <a:noFill/>
-        </p:spPr>
-        <p:txBody>
-          <a:bodyPr wrap="square" rtlCol="0">
-            <a:spAutoFit/>
-          </a:bodyPr>
-          <a:lstStyle/>
-          <a:p>
-            <a:pPr algn="ctr"/>
-            <a:r>
-              <a:rPr lang="de-DE" sz="2000" b="1" i="0" dirty="0" smtClean="0"/>
-              <a:t>AS5.1/</a:t>
-            </a:r>
-            <a:r>
-              <a:rPr lang="de-DE" sz="2000" b="1" i="0" dirty="0" err="1" smtClean="0"/>
-              <a:t>GateIn</a:t>
-            </a:r>
-            <a:endParaRPr lang="de-DE" sz="2000" b="1" i="0" dirty="0" smtClean="0"/>
-          </a:p>
-        </p:txBody>
-      </p:sp>
-      <p:sp>
-        <p:nvSpPr>
-          <p:cNvPr id="20" name="Rechteck 19"/>
-          <p:cNvSpPr/>
-          <p:nvPr/>
-        </p:nvSpPr>
-        <p:spPr>
-          <a:xfrm>
-            <a:off x="795311" y="1866888"/>
-            <a:ext cx="1562112" cy="847732"/>
-          </a:xfrm>
-          <a:prstGeom prst="rect">
-            <a:avLst/>
-          </a:prstGeom>
-          <a:ln/>
-          <a:effectLst>
-            <a:glow rad="63500">
-              <a:schemeClr val="accent1">
-                <a:alpha val="75000"/>
-              </a:schemeClr>
-            </a:glow>
-            <a:outerShdw blurRad="50800" dist="38100" dir="2700000" algn="br" rotWithShape="0">
-              <a:srgbClr val="000000">
-                <a:alpha val="43000"/>
-              </a:srgbClr>
-            </a:outerShdw>
-          </a:effectLst>
-        </p:spPr>
-        <p:style>
-          <a:lnRef idx="1">
-            <a:schemeClr val="accent3"/>
-          </a:lnRef>
-          <a:fillRef idx="3">
-            <a:schemeClr val="accent3"/>
-          </a:fillRef>
-          <a:effectRef idx="2">
-            <a:schemeClr val="accent3"/>
-          </a:effectRef>
-          <a:fontRef idx="minor">
-            <a:schemeClr val="lt1"/>
-          </a:fontRef>
-        </p:style>
-        <p:txBody>
-          <a:bodyPr/>
-          <a:lstStyle/>
-          <a:p>
-            <a:endParaRPr lang="de-DE" sz="2400" dirty="0" smtClean="0"/>
-          </a:p>
-          <a:p>
-            <a:endParaRPr lang="de-DE" sz="2400" dirty="0"/>
-          </a:p>
-        </p:txBody>
-      </p:sp>
-      <p:sp>
-        <p:nvSpPr>
-          <p:cNvPr id="22" name="Textfeld 21"/>
-          <p:cNvSpPr txBox="1"/>
-          <p:nvPr/>
-        </p:nvSpPr>
-        <p:spPr>
-          <a:xfrm>
-            <a:off x="614848" y="2085937"/>
-            <a:ext cx="1875109" cy="400110"/>
-          </a:xfrm>
-          <a:prstGeom prst="rect">
-            <a:avLst/>
-          </a:prstGeom>
-          <a:noFill/>
-        </p:spPr>
-        <p:txBody>
-          <a:bodyPr wrap="square" rtlCol="0">
-            <a:spAutoFit/>
-          </a:bodyPr>
-          <a:lstStyle/>
-          <a:p>
-            <a:pPr algn="ctr"/>
-            <a:r>
-              <a:rPr lang="de-DE" sz="2000" b="1" i="0" dirty="0" err="1" smtClean="0"/>
-              <a:t>Seam</a:t>
-            </a:r>
-            <a:endParaRPr lang="de-DE" sz="2000" b="1" i="0" dirty="0" smtClean="0"/>
-          </a:p>
-        </p:txBody>
-      </p:sp>
-      <p:pic>
-        <p:nvPicPr>
-          <p:cNvPr id="34" name="Picture 2" descr="C:\users\nicole\projects_txtr\txtr_praesi\pfeil-links.png"/>
-          <p:cNvPicPr>
-            <a:picLocks noChangeAspect="1" noChangeArrowheads="1"/>
-          </p:cNvPicPr>
-          <p:nvPr/>
-        </p:nvPicPr>
-        <p:blipFill>
-          <a:blip r:embed="rId2" cstate="print"/>
-          <a:srcRect/>
-          <a:stretch>
-            <a:fillRect/>
-          </a:stretch>
-        </p:blipFill>
-        <p:spPr bwMode="auto">
-          <a:xfrm>
-            <a:off x="2489957" y="2220758"/>
-            <a:ext cx="2255512" cy="948642"/>
-          </a:xfrm>
-          <a:prstGeom prst="rect">
-            <a:avLst/>
-          </a:prstGeom>
-          <a:noFill/>
-        </p:spPr>
-      </p:pic>
-      <p:pic>
-        <p:nvPicPr>
-          <p:cNvPr id="35" name="Picture 2" descr="C:\users\nicole\projects_txtr\txtr_praesi\pfeil-links.png"/>
-          <p:cNvPicPr>
-            <a:picLocks noChangeAspect="1" noChangeArrowheads="1"/>
-          </p:cNvPicPr>
-          <p:nvPr/>
-        </p:nvPicPr>
-        <p:blipFill>
-          <a:blip r:embed="rId2" cstate="print"/>
-          <a:srcRect/>
-          <a:stretch>
-            <a:fillRect/>
-          </a:stretch>
-        </p:blipFill>
-        <p:spPr bwMode="auto">
-          <a:xfrm rot="10800000">
-            <a:off x="2928926" y="2220758"/>
-            <a:ext cx="2255512" cy="948642"/>
-          </a:xfrm>
-          <a:prstGeom prst="rect">
-            <a:avLst/>
-          </a:prstGeom>
-          <a:noFill/>
-        </p:spPr>
-      </p:pic>
-      <p:pic>
-        <p:nvPicPr>
-          <p:cNvPr id="36" name="Grafik 35" descr="ear-package.png"/>
-          <p:cNvPicPr>
-            <a:picLocks noChangeAspect="1"/>
-          </p:cNvPicPr>
-          <p:nvPr/>
-        </p:nvPicPr>
-        <p:blipFill>
-          <a:blip r:embed="rId3" cstate="print"/>
-          <a:stretch>
-            <a:fillRect/>
-          </a:stretch>
-        </p:blipFill>
-        <p:spPr>
-          <a:xfrm>
-            <a:off x="3143240" y="1928802"/>
-            <a:ext cx="1424940" cy="1385976"/>
-          </a:xfrm>
-          <a:prstGeom prst="rect">
-            <a:avLst/>
-          </a:prstGeom>
-        </p:spPr>
-      </p:pic>
-      <p:pic>
-        <p:nvPicPr>
-          <p:cNvPr id="24" name="Grafik 23" descr="developer.png"/>
-          <p:cNvPicPr>
-            <a:picLocks noChangeAspect="1"/>
-          </p:cNvPicPr>
-          <p:nvPr/>
-        </p:nvPicPr>
-        <p:blipFill>
-          <a:blip r:embed="rId4" cstate="print"/>
-          <a:stretch>
-            <a:fillRect/>
-          </a:stretch>
-        </p:blipFill>
-        <p:spPr>
-          <a:xfrm>
-            <a:off x="4832888" y="1571612"/>
-            <a:ext cx="2382318" cy="1998253"/>
-          </a:xfrm>
-          <a:prstGeom prst="rect">
-            <a:avLst/>
-          </a:prstGeom>
-        </p:spPr>
-      </p:pic>
-      <p:sp>
-        <p:nvSpPr>
-          <p:cNvPr id="47" name="Rectangle 10"/>
-          <p:cNvSpPr>
-            <a:spLocks noGrp="1" noChangeArrowheads="1"/>
-          </p:cNvSpPr>
-          <p:nvPr>
-            <p:ph idx="1"/>
-          </p:nvPr>
-        </p:nvSpPr>
-        <p:spPr>
-          <a:xfrm>
-            <a:off x="428597" y="4005064"/>
-            <a:ext cx="4752528" cy="1728614"/>
-          </a:xfrm>
-        </p:spPr>
-        <p:txBody>
-          <a:bodyPr/>
-          <a:lstStyle/>
-          <a:p>
-            <a:pPr lvl="1"/>
-            <a:r>
-              <a:rPr lang="de-DE" sz="2000" dirty="0" smtClean="0"/>
-              <a:t>Remote </a:t>
-            </a:r>
-            <a:r>
-              <a:rPr lang="de-DE" sz="2000" dirty="0" err="1" smtClean="0"/>
-              <a:t>container</a:t>
-            </a:r>
-            <a:endParaRPr lang="de-DE" sz="2000" dirty="0" smtClean="0"/>
-          </a:p>
-          <a:p>
-            <a:pPr lvl="1"/>
-            <a:r>
-              <a:rPr lang="de-DE" sz="2000" dirty="0" err="1" smtClean="0"/>
-              <a:t>Deployment</a:t>
-            </a:r>
-            <a:r>
-              <a:rPr lang="de-DE" sz="2000" dirty="0" smtClean="0"/>
-              <a:t> </a:t>
-            </a:r>
-            <a:r>
-              <a:rPr lang="de-DE" sz="2000" dirty="0" err="1" smtClean="0"/>
-              <a:t>against</a:t>
-            </a:r>
-            <a:r>
-              <a:rPr lang="de-DE" sz="2000" dirty="0" smtClean="0"/>
-              <a:t> </a:t>
-            </a:r>
-            <a:r>
-              <a:rPr lang="de-DE" sz="2000" dirty="0" err="1" smtClean="0"/>
-              <a:t>running</a:t>
-            </a:r>
-            <a:r>
-              <a:rPr lang="de-DE" sz="2000" dirty="0" smtClean="0"/>
-              <a:t> </a:t>
-            </a:r>
-            <a:r>
-              <a:rPr lang="de-DE" sz="2000" dirty="0" err="1" smtClean="0"/>
-              <a:t>instance</a:t>
-            </a:r>
-            <a:endParaRPr lang="de-DE" sz="2000" dirty="0" smtClean="0"/>
-          </a:p>
-          <a:p>
-            <a:pPr lvl="1"/>
-            <a:r>
-              <a:rPr lang="de-DE" sz="2000" dirty="0" smtClean="0"/>
-              <a:t>Fast </a:t>
-            </a:r>
-            <a:r>
-              <a:rPr lang="de-DE" sz="2000" dirty="0" err="1" smtClean="0"/>
-              <a:t>feedback</a:t>
-            </a:r>
-            <a:endParaRPr lang="de-DE" sz="2000" dirty="0" smtClean="0"/>
-          </a:p>
-          <a:p>
-            <a:pPr lvl="1"/>
-            <a:r>
-              <a:rPr lang="de-DE" sz="2000" b="1" dirty="0" err="1" smtClean="0"/>
-              <a:t>mvn</a:t>
-            </a:r>
-            <a:r>
-              <a:rPr lang="de-DE" sz="2000" b="1" dirty="0" smtClean="0"/>
-              <a:t> </a:t>
-            </a:r>
-            <a:r>
-              <a:rPr lang="de-DE" sz="2000" b="1" dirty="0" err="1" smtClean="0"/>
-              <a:t>verify</a:t>
-            </a:r>
-            <a:r>
-              <a:rPr lang="de-DE" sz="2000" b="1" dirty="0" smtClean="0"/>
-              <a:t> -Pit,jbossas51_remote</a:t>
-            </a:r>
-          </a:p>
-        </p:txBody>
-      </p:sp>
-    </p:spTree>
-  </p:cSld>
-  <p:clrMapOvr>
-    <a:masterClrMapping/>
-  </p:clrMapOvr>
-  <p:transition spd="med" advClick="0">
-    <p:wipe dir="r"/>
-  </p:transition>
-  <p:timing>
-    <p:tnLst>
-      <p:par>
-        <p:cTn id="1" dur="indefinite" restart="never" nodeType="tmRoot"/>
-      </p:par>
-    </p:tnLst>
   </p:timing>
 </p:sld>
 </file>
@@ -12535,6 +12522,21 @@
 </file>
 
 <file path=customXml/item1.xml><?xml version="1.0" encoding="utf-8"?>
+<p:properties xmlns:p="http://schemas.microsoft.com/office/2006/metadata/properties" xmlns:xsi="http://www.w3.org/2001/XMLSchema-instance">
+  <documentManagement/>
+</p:properties>
+</file>
+
+<file path=customXml/item2.xml><?xml version="1.0" encoding="utf-8"?>
+<?mso-contentType ?>
+<FormTemplates xmlns="http://schemas.microsoft.com/sharepoint/v3/contenttype/forms">
+  <Display>DocumentLibraryForm</Display>
+  <Edit>DocumentLibraryForm</Edit>
+  <New>DocumentLibraryForm</New>
+</FormTemplates>
+</file>
+
+<file path=customXml/item3.xml><?xml version="1.0" encoding="utf-8"?>
 <ct:contentTypeSchema xmlns:ct="http://schemas.microsoft.com/office/2006/metadata/contentType" xmlns:ma="http://schemas.microsoft.com/office/2006/metadata/properties/metaAttributes" ct:_="" ma:_="" ma:contentTypeName="Dokument" ma:contentTypeID="0x01010013E92FB4F0E35945A177EEC2242ABF8A" ma:contentTypeVersion="1" ma:contentTypeDescription="Ein neues Dokument erstellen." ma:contentTypeScope="" ma:versionID="d2cf3a726627425c3604448812c626dc">
   <xsd:schema xmlns:xsd="http://www.w3.org/2001/XMLSchema" xmlns:p="http://schemas.microsoft.com/office/2006/metadata/properties" targetNamespace="http://schemas.microsoft.com/office/2006/metadata/properties" ma:root="true" ma:fieldsID="bf0b6019ab54b64ea4206d6353e55016">
     <xsd:element name="properties">
@@ -12583,32 +12585,10 @@
 </ct:contentTypeSchema>
 </file>
 
-<file path=customXml/item2.xml><?xml version="1.0" encoding="utf-8"?>
-<?mso-contentType ?>
-<FormTemplates xmlns="http://schemas.microsoft.com/sharepoint/v3/contenttype/forms">
-  <Display>DocumentLibraryForm</Display>
-  <Edit>DocumentLibraryForm</Edit>
-  <New>DocumentLibraryForm</New>
-</FormTemplates>
-</file>
-
-<file path=customXml/item3.xml><?xml version="1.0" encoding="utf-8"?>
-<p:properties xmlns:p="http://schemas.microsoft.com/office/2006/metadata/properties" xmlns:xsi="http://www.w3.org/2001/XMLSchema-instance">
-  <documentManagement/>
-</p:properties>
-</file>
-
 <file path=customXml/itemProps1.xml><?xml version="1.0" encoding="utf-8"?>
-<ds:datastoreItem xmlns:ds="http://schemas.openxmlformats.org/officeDocument/2006/customXml" ds:itemID="{9F6416C8-433A-4551-934F-62352999253F}">
+<ds:datastoreItem xmlns:ds="http://schemas.openxmlformats.org/officeDocument/2006/customXml" ds:itemID="{35A4017D-26DD-4BAA-A2EC-766517FD49C2}">
   <ds:schemaRefs>
-    <ds:schemaRef ds:uri="http://schemas.microsoft.com/office/2006/metadata/contentType"/>
-    <ds:schemaRef ds:uri="http://schemas.microsoft.com/office/2006/metadata/properties/metaAttributes"/>
-    <ds:schemaRef ds:uri="http://www.w3.org/2001/XMLSchema"/>
     <ds:schemaRef ds:uri="http://schemas.microsoft.com/office/2006/metadata/properties"/>
-    <ds:schemaRef ds:uri="http://schemas.openxmlformats.org/package/2006/metadata/core-properties"/>
-    <ds:schemaRef ds:uri="http://purl.org/dc/elements/1.1/"/>
-    <ds:schemaRef ds:uri="http://purl.org/dc/terms/"/>
-    <ds:schemaRef ds:uri="http://schemas.microsoft.com/office/internal/2005/internalDocumentation"/>
   </ds:schemaRefs>
 </ds:datastoreItem>
 </file>
@@ -12622,9 +12602,16 @@
 </file>
 
 <file path=customXml/itemProps3.xml><?xml version="1.0" encoding="utf-8"?>
-<ds:datastoreItem xmlns:ds="http://schemas.openxmlformats.org/officeDocument/2006/customXml" ds:itemID="{35A4017D-26DD-4BAA-A2EC-766517FD49C2}">
+<ds:datastoreItem xmlns:ds="http://schemas.openxmlformats.org/officeDocument/2006/customXml" ds:itemID="{9F6416C8-433A-4551-934F-62352999253F}">
   <ds:schemaRefs>
+    <ds:schemaRef ds:uri="http://schemas.microsoft.com/office/2006/metadata/contentType"/>
+    <ds:schemaRef ds:uri="http://schemas.microsoft.com/office/2006/metadata/properties/metaAttributes"/>
+    <ds:schemaRef ds:uri="http://www.w3.org/2001/XMLSchema"/>
     <ds:schemaRef ds:uri="http://schemas.microsoft.com/office/2006/metadata/properties"/>
+    <ds:schemaRef ds:uri="http://schemas.openxmlformats.org/package/2006/metadata/core-properties"/>
+    <ds:schemaRef ds:uri="http://purl.org/dc/elements/1.1/"/>
+    <ds:schemaRef ds:uri="http://purl.org/dc/terms/"/>
+    <ds:schemaRef ds:uri="http://schemas.microsoft.com/office/internal/2005/internalDocumentation"/>
   </ds:schemaRefs>
 </ds:datastoreItem>
 </file>
</xml_diff>

<commit_message>
slides - final version
</commit_message>
<xml_diff>
--- a/doc/judcon_SeamArquillian.pptx
+++ b/doc/judcon_SeamArquillian.pptx
@@ -295,7 +295,7 @@
           </a:ln>
           <a:extLst>
             <a:ext uri="{909E8E84-426E-40DD-AFC4-6F175D3DCCD1}">
-              <a14:hiddenFill xmlns="" xmlns:a14="http://schemas.microsoft.com/office/drawing/2010/main">
+              <a14:hiddenFill xmlns:a14="http://schemas.microsoft.com/office/drawing/2010/main" xmlns="">
                 <a:solidFill>
                   <a:srgbClr val="FFFFFF"/>
                 </a:solidFill>
@@ -469,7 +469,7 @@
     </p:spTree>
     <p:extLst>
       <p:ext uri="{BB962C8B-B14F-4D97-AF65-F5344CB8AC3E}">
-        <p14:creationId xmlns="" xmlns:p14="http://schemas.microsoft.com/office/powerpoint/2010/main" val="2567890474"/>
+        <p14:creationId xmlns:p14="http://schemas.microsoft.com/office/powerpoint/2010/main" xmlns="" val="2567890474"/>
       </p:ext>
     </p:extLst>
   </p:cSld>
@@ -648,7 +648,7 @@
           </a:ln>
           <a:extLst>
             <a:ext uri="{91240B29-F687-4F45-9708-019B960494DF}">
-              <a14:hiddenLine xmlns="" xmlns:a14="http://schemas.microsoft.com/office/drawing/2010/main" w="9525">
+              <a14:hiddenLine xmlns:a14="http://schemas.microsoft.com/office/drawing/2010/main" xmlns="" w="9525">
                 <a:solidFill>
                   <a:srgbClr val="000000"/>
                 </a:solidFill>
@@ -684,7 +684,7 @@
           </a:xfrm>
           <a:extLst>
             <a:ext uri="{91240B29-F687-4F45-9708-019B960494DF}">
-              <a14:hiddenLine xmlns="" xmlns:a14="http://schemas.microsoft.com/office/drawing/2010/main" w="9525" algn="ctr">
+              <a14:hiddenLine xmlns:a14="http://schemas.microsoft.com/office/drawing/2010/main" xmlns="" w="9525" algn="ctr">
                 <a:solidFill>
                   <a:srgbClr val="000000"/>
                 </a:solidFill>
@@ -694,7 +694,7 @@
               </a14:hiddenLine>
             </a:ext>
             <a:ext uri="{AF507438-7753-43E0-B8FC-AC1667EBCBE1}">
-              <a14:hiddenEffects xmlns="" xmlns:a14="http://schemas.microsoft.com/office/drawing/2010/main">
+              <a14:hiddenEffects xmlns:a14="http://schemas.microsoft.com/office/drawing/2010/main" xmlns="">
                 <a:effectLst>
                   <a:outerShdw dist="35921" dir="2700000" algn="ctr" rotWithShape="0">
                     <a:srgbClr val="808080"/>
@@ -740,7 +740,7 @@
           </a:xfrm>
           <a:extLst>
             <a:ext uri="{91240B29-F687-4F45-9708-019B960494DF}">
-              <a14:hiddenLine xmlns="" xmlns:a14="http://schemas.microsoft.com/office/drawing/2010/main" w="9525" algn="ctr">
+              <a14:hiddenLine xmlns:a14="http://schemas.microsoft.com/office/drawing/2010/main" xmlns="" w="9525" algn="ctr">
                 <a:solidFill>
                   <a:srgbClr val="000000"/>
                 </a:solidFill>
@@ -750,7 +750,7 @@
               </a14:hiddenLine>
             </a:ext>
             <a:ext uri="{AF507438-7753-43E0-B8FC-AC1667EBCBE1}">
-              <a14:hiddenEffects xmlns="" xmlns:a14="http://schemas.microsoft.com/office/drawing/2010/main">
+              <a14:hiddenEffects xmlns:a14="http://schemas.microsoft.com/office/drawing/2010/main" xmlns="">
                 <a:effectLst>
                   <a:outerShdw dist="35921" dir="2700000" algn="ctr" rotWithShape="0">
                     <a:srgbClr val="808080"/>
@@ -790,7 +790,7 @@
           <a:blip r:embed="rId2" cstate="print">
             <a:extLst>
               <a:ext uri="{28A0092B-C50C-407E-A947-70E740481C1C}">
-                <a14:useLocalDpi xmlns="" xmlns:a14="http://schemas.microsoft.com/office/drawing/2010/main" val="0"/>
+                <a14:useLocalDpi xmlns:a14="http://schemas.microsoft.com/office/drawing/2010/main" xmlns="" val="0"/>
               </a:ext>
             </a:extLst>
           </a:blip>
@@ -813,14 +813,14 @@
           </a:ln>
           <a:extLst>
             <a:ext uri="{909E8E84-426E-40DD-AFC4-6F175D3DCCD1}">
-              <a14:hiddenFill xmlns="" xmlns:a14="http://schemas.microsoft.com/office/drawing/2010/main">
+              <a14:hiddenFill xmlns:a14="http://schemas.microsoft.com/office/drawing/2010/main" xmlns="">
                 <a:solidFill>
                   <a:srgbClr val="FFFFFF"/>
                 </a:solidFill>
               </a14:hiddenFill>
             </a:ext>
             <a:ext uri="{91240B29-F687-4F45-9708-019B960494DF}">
-              <a14:hiddenLine xmlns="" xmlns:a14="http://schemas.microsoft.com/office/drawing/2010/main" w="9525">
+              <a14:hiddenLine xmlns:a14="http://schemas.microsoft.com/office/drawing/2010/main" xmlns="" w="9525">
                 <a:solidFill>
                   <a:srgbClr val="000000"/>
                 </a:solidFill>
@@ -885,7 +885,7 @@
             <a:effectLst/>
             <a:extLst>
               <a:ext uri="{91240B29-F687-4F45-9708-019B960494DF}">
-                <a14:hiddenLine xmlns="" xmlns:a14="http://schemas.microsoft.com/office/drawing/2010/main" w="9525">
+                <a14:hiddenLine xmlns:a14="http://schemas.microsoft.com/office/drawing/2010/main" xmlns="" w="9525">
                   <a:solidFill>
                     <a:schemeClr val="tx1"/>
                   </a:solidFill>
@@ -895,7 +895,7 @@
                 </a14:hiddenLine>
               </a:ext>
               <a:ext uri="{AF507438-7753-43E0-B8FC-AC1667EBCBE1}">
-                <a14:hiddenEffects xmlns="" xmlns:a14="http://schemas.microsoft.com/office/drawing/2010/main">
+                <a14:hiddenEffects xmlns:a14="http://schemas.microsoft.com/office/drawing/2010/main" xmlns="">
                   <a:effectLst>
                     <a:outerShdw dist="35921" dir="2700000" algn="ctr" rotWithShape="0">
                       <a:schemeClr val="bg2"/>
@@ -987,7 +987,7 @@
             <a:effectLst/>
             <a:extLst>
               <a:ext uri="{91240B29-F687-4F45-9708-019B960494DF}">
-                <a14:hiddenLine xmlns="" xmlns:a14="http://schemas.microsoft.com/office/drawing/2010/main" w="9525">
+                <a14:hiddenLine xmlns:a14="http://schemas.microsoft.com/office/drawing/2010/main" xmlns="" w="9525">
                   <a:solidFill>
                     <a:schemeClr val="tx1"/>
                   </a:solidFill>
@@ -997,7 +997,7 @@
                 </a14:hiddenLine>
               </a:ext>
               <a:ext uri="{AF507438-7753-43E0-B8FC-AC1667EBCBE1}">
-                <a14:hiddenEffects xmlns="" xmlns:a14="http://schemas.microsoft.com/office/drawing/2010/main">
+                <a14:hiddenEffects xmlns:a14="http://schemas.microsoft.com/office/drawing/2010/main" xmlns="">
                   <a:effectLst>
                     <a:outerShdw dist="35921" dir="2700000" algn="ctr" rotWithShape="0">
                       <a:schemeClr val="bg2"/>
@@ -1089,7 +1089,7 @@
             <a:effectLst/>
             <a:extLst>
               <a:ext uri="{91240B29-F687-4F45-9708-019B960494DF}">
-                <a14:hiddenLine xmlns="" xmlns:a14="http://schemas.microsoft.com/office/drawing/2010/main" w="9525">
+                <a14:hiddenLine xmlns:a14="http://schemas.microsoft.com/office/drawing/2010/main" xmlns="" w="9525">
                   <a:solidFill>
                     <a:schemeClr val="tx1"/>
                   </a:solidFill>
@@ -1099,7 +1099,7 @@
                 </a14:hiddenLine>
               </a:ext>
               <a:ext uri="{AF507438-7753-43E0-B8FC-AC1667EBCBE1}">
-                <a14:hiddenEffects xmlns="" xmlns:a14="http://schemas.microsoft.com/office/drawing/2010/main">
+                <a14:hiddenEffects xmlns:a14="http://schemas.microsoft.com/office/drawing/2010/main" xmlns="">
                   <a:effectLst>
                     <a:outerShdw dist="35921" dir="2700000" algn="ctr" rotWithShape="0">
                       <a:schemeClr val="bg2"/>
@@ -1191,7 +1191,7 @@
             <a:effectLst/>
             <a:extLst>
               <a:ext uri="{91240B29-F687-4F45-9708-019B960494DF}">
-                <a14:hiddenLine xmlns="" xmlns:a14="http://schemas.microsoft.com/office/drawing/2010/main" w="9525">
+                <a14:hiddenLine xmlns:a14="http://schemas.microsoft.com/office/drawing/2010/main" xmlns="" w="9525">
                   <a:solidFill>
                     <a:schemeClr val="tx1"/>
                   </a:solidFill>
@@ -1201,7 +1201,7 @@
                 </a14:hiddenLine>
               </a:ext>
               <a:ext uri="{AF507438-7753-43E0-B8FC-AC1667EBCBE1}">
-                <a14:hiddenEffects xmlns="" xmlns:a14="http://schemas.microsoft.com/office/drawing/2010/main">
+                <a14:hiddenEffects xmlns:a14="http://schemas.microsoft.com/office/drawing/2010/main" xmlns="">
                   <a:effectLst>
                     <a:outerShdw dist="35921" dir="2700000" algn="ctr" rotWithShape="0">
                       <a:schemeClr val="bg2"/>
@@ -1293,7 +1293,7 @@
             <a:effectLst/>
             <a:extLst>
               <a:ext uri="{91240B29-F687-4F45-9708-019B960494DF}">
-                <a14:hiddenLine xmlns="" xmlns:a14="http://schemas.microsoft.com/office/drawing/2010/main" w="9525">
+                <a14:hiddenLine xmlns:a14="http://schemas.microsoft.com/office/drawing/2010/main" xmlns="" w="9525">
                   <a:solidFill>
                     <a:schemeClr val="tx1"/>
                   </a:solidFill>
@@ -1303,7 +1303,7 @@
                 </a14:hiddenLine>
               </a:ext>
               <a:ext uri="{AF507438-7753-43E0-B8FC-AC1667EBCBE1}">
-                <a14:hiddenEffects xmlns="" xmlns:a14="http://schemas.microsoft.com/office/drawing/2010/main">
+                <a14:hiddenEffects xmlns:a14="http://schemas.microsoft.com/office/drawing/2010/main" xmlns="">
                   <a:effectLst>
                     <a:outerShdw dist="35921" dir="2700000" algn="ctr" rotWithShape="0">
                       <a:schemeClr val="bg2"/>
@@ -1396,7 +1396,7 @@
             <a:effectLst/>
             <a:extLst>
               <a:ext uri="{91240B29-F687-4F45-9708-019B960494DF}">
-                <a14:hiddenLine xmlns="" xmlns:a14="http://schemas.microsoft.com/office/drawing/2010/main" w="9525">
+                <a14:hiddenLine xmlns:a14="http://schemas.microsoft.com/office/drawing/2010/main" xmlns="" w="9525">
                   <a:solidFill>
                     <a:schemeClr val="tx1"/>
                   </a:solidFill>
@@ -1406,7 +1406,7 @@
                 </a14:hiddenLine>
               </a:ext>
               <a:ext uri="{AF507438-7753-43E0-B8FC-AC1667EBCBE1}">
-                <a14:hiddenEffects xmlns="" xmlns:a14="http://schemas.microsoft.com/office/drawing/2010/main">
+                <a14:hiddenEffects xmlns:a14="http://schemas.microsoft.com/office/drawing/2010/main" xmlns="">
                   <a:effectLst>
                     <a:outerShdw dist="35921" dir="2700000" algn="ctr" rotWithShape="0">
                       <a:schemeClr val="bg2"/>
@@ -1990,7 +1990,7 @@
     </p:spTree>
     <p:extLst>
       <p:ext uri="{BB962C8B-B14F-4D97-AF65-F5344CB8AC3E}">
-        <p14:creationId xmlns="" xmlns:p14="http://schemas.microsoft.com/office/powerpoint/2010/main" val="4188007517"/>
+        <p14:creationId xmlns:p14="http://schemas.microsoft.com/office/powerpoint/2010/main" xmlns="" val="4188007517"/>
       </p:ext>
     </p:extLst>
   </p:cSld>
@@ -2050,7 +2050,7 @@
           </a:ln>
           <a:extLst>
             <a:ext uri="{91240B29-F687-4F45-9708-019B960494DF}">
-              <a14:hiddenLine xmlns="" xmlns:a14="http://schemas.microsoft.com/office/drawing/2010/main" w="9525" algn="ctr">
+              <a14:hiddenLine xmlns:a14="http://schemas.microsoft.com/office/drawing/2010/main" xmlns="" w="9525" algn="ctr">
                 <a:solidFill>
                   <a:srgbClr val="000000"/>
                 </a:solidFill>
@@ -2145,14 +2145,14 @@
           </a:ln>
           <a:extLst>
             <a:ext uri="{909E8E84-426E-40DD-AFC4-6F175D3DCCD1}">
-              <a14:hiddenFill xmlns="" xmlns:a14="http://schemas.microsoft.com/office/drawing/2010/main">
+              <a14:hiddenFill xmlns:a14="http://schemas.microsoft.com/office/drawing/2010/main" xmlns="">
                 <a:solidFill>
                   <a:srgbClr val="FFFFFF"/>
                 </a:solidFill>
               </a14:hiddenFill>
             </a:ext>
             <a:ext uri="{91240B29-F687-4F45-9708-019B960494DF}">
-              <a14:hiddenLine xmlns="" xmlns:a14="http://schemas.microsoft.com/office/drawing/2010/main" w="9525">
+              <a14:hiddenLine xmlns:a14="http://schemas.microsoft.com/office/drawing/2010/main" xmlns="" w="9525">
                 <a:solidFill>
                   <a:srgbClr val="000000"/>
                 </a:solidFill>
@@ -2203,14 +2203,14 @@
           </a:ln>
           <a:extLst>
             <a:ext uri="{909E8E84-426E-40DD-AFC4-6F175D3DCCD1}">
-              <a14:hiddenFill xmlns="" xmlns:a14="http://schemas.microsoft.com/office/drawing/2010/main">
+              <a14:hiddenFill xmlns:a14="http://schemas.microsoft.com/office/drawing/2010/main" xmlns="">
                 <a:solidFill>
                   <a:srgbClr val="FFFFFF"/>
                 </a:solidFill>
               </a14:hiddenFill>
             </a:ext>
             <a:ext uri="{91240B29-F687-4F45-9708-019B960494DF}">
-              <a14:hiddenLine xmlns="" xmlns:a14="http://schemas.microsoft.com/office/drawing/2010/main" w="9525">
+              <a14:hiddenLine xmlns:a14="http://schemas.microsoft.com/office/drawing/2010/main" xmlns="" w="9525">
                 <a:solidFill>
                   <a:srgbClr val="000000"/>
                 </a:solidFill>
@@ -2638,7 +2638,7 @@
           <a:blip r:embed="rId4" cstate="print">
             <a:extLst>
               <a:ext uri="{28A0092B-C50C-407E-A947-70E740481C1C}">
-                <a14:useLocalDpi xmlns="" xmlns:a14="http://schemas.microsoft.com/office/drawing/2010/main" val="0"/>
+                <a14:useLocalDpi xmlns:a14="http://schemas.microsoft.com/office/drawing/2010/main" xmlns="" val="0"/>
               </a:ext>
             </a:extLst>
           </a:blip>
@@ -2661,14 +2661,14 @@
           </a:ln>
           <a:extLst>
             <a:ext uri="{909E8E84-426E-40DD-AFC4-6F175D3DCCD1}">
-              <a14:hiddenFill xmlns="" xmlns:a14="http://schemas.microsoft.com/office/drawing/2010/main">
+              <a14:hiddenFill xmlns:a14="http://schemas.microsoft.com/office/drawing/2010/main" xmlns="">
                 <a:solidFill>
                   <a:srgbClr val="FFFFFF"/>
                 </a:solidFill>
               </a14:hiddenFill>
             </a:ext>
             <a:ext uri="{91240B29-F687-4F45-9708-019B960494DF}">
-              <a14:hiddenLine xmlns="" xmlns:a14="http://schemas.microsoft.com/office/drawing/2010/main" w="9525">
+              <a14:hiddenLine xmlns:a14="http://schemas.microsoft.com/office/drawing/2010/main" xmlns="" w="9525">
                 <a:solidFill>
                   <a:srgbClr val="000000"/>
                 </a:solidFill>
@@ -2733,7 +2733,7 @@
             <a:effectLst/>
             <a:extLst>
               <a:ext uri="{91240B29-F687-4F45-9708-019B960494DF}">
-                <a14:hiddenLine xmlns="" xmlns:a14="http://schemas.microsoft.com/office/drawing/2010/main" w="9525">
+                <a14:hiddenLine xmlns:a14="http://schemas.microsoft.com/office/drawing/2010/main" xmlns="" w="9525">
                   <a:solidFill>
                     <a:schemeClr val="tx1"/>
                   </a:solidFill>
@@ -2743,7 +2743,7 @@
                 </a14:hiddenLine>
               </a:ext>
               <a:ext uri="{AF507438-7753-43E0-B8FC-AC1667EBCBE1}">
-                <a14:hiddenEffects xmlns="" xmlns:a14="http://schemas.microsoft.com/office/drawing/2010/main">
+                <a14:hiddenEffects xmlns:a14="http://schemas.microsoft.com/office/drawing/2010/main" xmlns="">
                   <a:effectLst>
                     <a:outerShdw dist="35921" dir="2700000" algn="ctr" rotWithShape="0">
                       <a:schemeClr val="bg2"/>
@@ -2835,7 +2835,7 @@
             <a:effectLst/>
             <a:extLst>
               <a:ext uri="{91240B29-F687-4F45-9708-019B960494DF}">
-                <a14:hiddenLine xmlns="" xmlns:a14="http://schemas.microsoft.com/office/drawing/2010/main" w="9525">
+                <a14:hiddenLine xmlns:a14="http://schemas.microsoft.com/office/drawing/2010/main" xmlns="" w="9525">
                   <a:solidFill>
                     <a:schemeClr val="tx1"/>
                   </a:solidFill>
@@ -2845,7 +2845,7 @@
                 </a14:hiddenLine>
               </a:ext>
               <a:ext uri="{AF507438-7753-43E0-B8FC-AC1667EBCBE1}">
-                <a14:hiddenEffects xmlns="" xmlns:a14="http://schemas.microsoft.com/office/drawing/2010/main">
+                <a14:hiddenEffects xmlns:a14="http://schemas.microsoft.com/office/drawing/2010/main" xmlns="">
                   <a:effectLst>
                     <a:outerShdw dist="35921" dir="2700000" algn="ctr" rotWithShape="0">
                       <a:schemeClr val="bg2"/>
@@ -2937,7 +2937,7 @@
             <a:effectLst/>
             <a:extLst>
               <a:ext uri="{91240B29-F687-4F45-9708-019B960494DF}">
-                <a14:hiddenLine xmlns="" xmlns:a14="http://schemas.microsoft.com/office/drawing/2010/main" w="9525">
+                <a14:hiddenLine xmlns:a14="http://schemas.microsoft.com/office/drawing/2010/main" xmlns="" w="9525">
                   <a:solidFill>
                     <a:schemeClr val="tx1"/>
                   </a:solidFill>
@@ -2947,7 +2947,7 @@
                 </a14:hiddenLine>
               </a:ext>
               <a:ext uri="{AF507438-7753-43E0-B8FC-AC1667EBCBE1}">
-                <a14:hiddenEffects xmlns="" xmlns:a14="http://schemas.microsoft.com/office/drawing/2010/main">
+                <a14:hiddenEffects xmlns:a14="http://schemas.microsoft.com/office/drawing/2010/main" xmlns="">
                   <a:effectLst>
                     <a:outerShdw dist="35921" dir="2700000" algn="ctr" rotWithShape="0">
                       <a:schemeClr val="bg2"/>
@@ -3039,7 +3039,7 @@
             <a:effectLst/>
             <a:extLst>
               <a:ext uri="{91240B29-F687-4F45-9708-019B960494DF}">
-                <a14:hiddenLine xmlns="" xmlns:a14="http://schemas.microsoft.com/office/drawing/2010/main" w="9525">
+                <a14:hiddenLine xmlns:a14="http://schemas.microsoft.com/office/drawing/2010/main" xmlns="" w="9525">
                   <a:solidFill>
                     <a:schemeClr val="tx1"/>
                   </a:solidFill>
@@ -3049,7 +3049,7 @@
                 </a14:hiddenLine>
               </a:ext>
               <a:ext uri="{AF507438-7753-43E0-B8FC-AC1667EBCBE1}">
-                <a14:hiddenEffects xmlns="" xmlns:a14="http://schemas.microsoft.com/office/drawing/2010/main">
+                <a14:hiddenEffects xmlns:a14="http://schemas.microsoft.com/office/drawing/2010/main" xmlns="">
                   <a:effectLst>
                     <a:outerShdw dist="35921" dir="2700000" algn="ctr" rotWithShape="0">
                       <a:schemeClr val="bg2"/>
@@ -3141,7 +3141,7 @@
             <a:effectLst/>
             <a:extLst>
               <a:ext uri="{91240B29-F687-4F45-9708-019B960494DF}">
-                <a14:hiddenLine xmlns="" xmlns:a14="http://schemas.microsoft.com/office/drawing/2010/main" w="9525">
+                <a14:hiddenLine xmlns:a14="http://schemas.microsoft.com/office/drawing/2010/main" xmlns="" w="9525">
                   <a:solidFill>
                     <a:schemeClr val="tx1"/>
                   </a:solidFill>
@@ -3151,7 +3151,7 @@
                 </a14:hiddenLine>
               </a:ext>
               <a:ext uri="{AF507438-7753-43E0-B8FC-AC1667EBCBE1}">
-                <a14:hiddenEffects xmlns="" xmlns:a14="http://schemas.microsoft.com/office/drawing/2010/main">
+                <a14:hiddenEffects xmlns:a14="http://schemas.microsoft.com/office/drawing/2010/main" xmlns="">
                   <a:effectLst>
                     <a:outerShdw dist="35921" dir="2700000" algn="ctr" rotWithShape="0">
                       <a:schemeClr val="bg2"/>
@@ -3244,7 +3244,7 @@
             <a:effectLst/>
             <a:extLst>
               <a:ext uri="{91240B29-F687-4F45-9708-019B960494DF}">
-                <a14:hiddenLine xmlns="" xmlns:a14="http://schemas.microsoft.com/office/drawing/2010/main" w="9525">
+                <a14:hiddenLine xmlns:a14="http://schemas.microsoft.com/office/drawing/2010/main" xmlns="" w="9525">
                   <a:solidFill>
                     <a:schemeClr val="tx1"/>
                   </a:solidFill>
@@ -3254,7 +3254,7 @@
                 </a14:hiddenLine>
               </a:ext>
               <a:ext uri="{AF507438-7753-43E0-B8FC-AC1667EBCBE1}">
-                <a14:hiddenEffects xmlns="" xmlns:a14="http://schemas.microsoft.com/office/drawing/2010/main">
+                <a14:hiddenEffects xmlns:a14="http://schemas.microsoft.com/office/drawing/2010/main" xmlns="">
                   <a:effectLst>
                     <a:outerShdw dist="35921" dir="2700000" algn="ctr" rotWithShape="0">
                       <a:schemeClr val="bg2"/>
@@ -5540,8 +5540,8 @@
         </p:blipFill>
         <p:spPr>
           <a:xfrm>
-            <a:off x="323850" y="3573016"/>
-            <a:ext cx="7848550" cy="2336457"/>
+            <a:off x="0" y="4166027"/>
+            <a:ext cx="9144000" cy="2336457"/>
           </a:xfrm>
           <a:prstGeom prst="rect">
             <a:avLst/>
@@ -6796,14 +6796,14 @@
           </a:ln>
           <a:extLst>
             <a:ext uri="{909E8E84-426E-40DD-AFC4-6F175D3DCCD1}">
-              <a14:hiddenFill xmlns="" xmlns:a14="http://schemas.microsoft.com/office/drawing/2010/main">
+              <a14:hiddenFill xmlns:a14="http://schemas.microsoft.com/office/drawing/2010/main" xmlns="">
                 <a:solidFill>
                   <a:srgbClr val="FFFFFF"/>
                 </a:solidFill>
               </a14:hiddenFill>
             </a:ext>
             <a:ext uri="{91240B29-F687-4F45-9708-019B960494DF}">
-              <a14:hiddenLine xmlns="" xmlns:a14="http://schemas.microsoft.com/office/drawing/2010/main" w="9525">
+              <a14:hiddenLine xmlns:a14="http://schemas.microsoft.com/office/drawing/2010/main" xmlns="" w="9525">
                 <a:solidFill>
                   <a:srgbClr val="000000"/>
                 </a:solidFill>
@@ -6893,14 +6893,14 @@
           </a:ln>
           <a:extLst>
             <a:ext uri="{909E8E84-426E-40DD-AFC4-6F175D3DCCD1}">
-              <a14:hiddenFill xmlns="" xmlns:a14="http://schemas.microsoft.com/office/drawing/2010/main">
+              <a14:hiddenFill xmlns:a14="http://schemas.microsoft.com/office/drawing/2010/main" xmlns="">
                 <a:solidFill>
                   <a:srgbClr val="FFFFFF"/>
                 </a:solidFill>
               </a14:hiddenFill>
             </a:ext>
             <a:ext uri="{91240B29-F687-4F45-9708-019B960494DF}">
-              <a14:hiddenLine xmlns="" xmlns:a14="http://schemas.microsoft.com/office/drawing/2010/main" w="9525">
+              <a14:hiddenLine xmlns:a14="http://schemas.microsoft.com/office/drawing/2010/main" xmlns="" w="9525">
                 <a:solidFill>
                   <a:srgbClr val="000000"/>
                 </a:solidFill>
@@ -6977,14 +6977,14 @@
           </a:ln>
           <a:extLst>
             <a:ext uri="{909E8E84-426E-40DD-AFC4-6F175D3DCCD1}">
-              <a14:hiddenFill xmlns="" xmlns:a14="http://schemas.microsoft.com/office/drawing/2010/main">
+              <a14:hiddenFill xmlns:a14="http://schemas.microsoft.com/office/drawing/2010/main" xmlns="">
                 <a:solidFill>
                   <a:srgbClr val="FFFFFF"/>
                 </a:solidFill>
               </a14:hiddenFill>
             </a:ext>
             <a:ext uri="{91240B29-F687-4F45-9708-019B960494DF}">
-              <a14:hiddenLine xmlns="" xmlns:a14="http://schemas.microsoft.com/office/drawing/2010/main" w="9525">
+              <a14:hiddenLine xmlns:a14="http://schemas.microsoft.com/office/drawing/2010/main" xmlns="" w="9525">
                 <a:solidFill>
                   <a:srgbClr val="000000"/>
                 </a:solidFill>
@@ -7090,14 +7090,14 @@
           </a:ln>
           <a:extLst>
             <a:ext uri="{909E8E84-426E-40DD-AFC4-6F175D3DCCD1}">
-              <a14:hiddenFill xmlns="" xmlns:a14="http://schemas.microsoft.com/office/drawing/2010/main">
+              <a14:hiddenFill xmlns:a14="http://schemas.microsoft.com/office/drawing/2010/main" xmlns="">
                 <a:solidFill>
                   <a:srgbClr val="FFFFFF"/>
                 </a:solidFill>
               </a14:hiddenFill>
             </a:ext>
             <a:ext uri="{91240B29-F687-4F45-9708-019B960494DF}">
-              <a14:hiddenLine xmlns="" xmlns:a14="http://schemas.microsoft.com/office/drawing/2010/main" w="9525">
+              <a14:hiddenLine xmlns:a14="http://schemas.microsoft.com/office/drawing/2010/main" xmlns="" w="9525">
                 <a:solidFill>
                   <a:srgbClr val="000000"/>
                 </a:solidFill>
@@ -8376,406 +8376,7 @@
   <p:timing>
     <p:tnLst>
       <p:par>
-        <p:cTn id="1" dur="indefinite" restart="never" nodeType="tmRoot">
-          <p:childTnLst>
-            <p:seq concurrent="1" nextAc="seek">
-              <p:cTn id="2" dur="indefinite" nodeType="mainSeq">
-                <p:childTnLst>
-                  <p:par>
-                    <p:cTn id="3" fill="hold">
-                      <p:stCondLst>
-                        <p:cond delay="indefinite"/>
-                        <p:cond evt="onBegin" delay="0">
-                          <p:tn val="2"/>
-                        </p:cond>
-                      </p:stCondLst>
-                      <p:childTnLst>
-                        <p:par>
-                          <p:cTn id="4" fill="hold">
-                            <p:stCondLst>
-                              <p:cond delay="0"/>
-                            </p:stCondLst>
-                            <p:childTnLst>
-                              <p:par>
-                                <p:cTn id="5" presetID="10" presetClass="entr" presetSubtype="0" fill="hold" nodeType="afterEffect">
-                                  <p:stCondLst>
-                                    <p:cond delay="0"/>
-                                  </p:stCondLst>
-                                  <p:childTnLst>
-                                    <p:set>
-                                      <p:cBhvr>
-                                        <p:cTn id="6" dur="1" fill="hold">
-                                          <p:stCondLst>
-                                            <p:cond delay="0"/>
-                                          </p:stCondLst>
-                                        </p:cTn>
-                                        <p:tgtEl>
-                                          <p:spTgt spid="5130">
-                                            <p:txEl>
-                                              <p:pRg st="1" end="1"/>
-                                            </p:txEl>
-                                          </p:spTgt>
-                                        </p:tgtEl>
-                                        <p:attrNameLst>
-                                          <p:attrName>style.visibility</p:attrName>
-                                        </p:attrNameLst>
-                                      </p:cBhvr>
-                                      <p:to>
-                                        <p:strVal val="visible"/>
-                                      </p:to>
-                                    </p:set>
-                                    <p:animEffect transition="in" filter="fade">
-                                      <p:cBhvr>
-                                        <p:cTn id="7" dur="2000"/>
-                                        <p:tgtEl>
-                                          <p:spTgt spid="5130">
-                                            <p:txEl>
-                                              <p:pRg st="1" end="1"/>
-                                            </p:txEl>
-                                          </p:spTgt>
-                                        </p:tgtEl>
-                                      </p:cBhvr>
-                                    </p:animEffect>
-                                  </p:childTnLst>
-                                </p:cTn>
-                              </p:par>
-                            </p:childTnLst>
-                          </p:cTn>
-                        </p:par>
-                        <p:par>
-                          <p:cTn id="8" fill="hold">
-                            <p:stCondLst>
-                              <p:cond delay="2000"/>
-                            </p:stCondLst>
-                            <p:childTnLst>
-                              <p:par>
-                                <p:cTn id="9" presetID="10" presetClass="entr" presetSubtype="0" fill="hold" nodeType="afterEffect">
-                                  <p:stCondLst>
-                                    <p:cond delay="0"/>
-                                  </p:stCondLst>
-                                  <p:childTnLst>
-                                    <p:set>
-                                      <p:cBhvr>
-                                        <p:cTn id="10" dur="1" fill="hold">
-                                          <p:stCondLst>
-                                            <p:cond delay="0"/>
-                                          </p:stCondLst>
-                                        </p:cTn>
-                                        <p:tgtEl>
-                                          <p:spTgt spid="5130">
-                                            <p:txEl>
-                                              <p:pRg st="2" end="2"/>
-                                            </p:txEl>
-                                          </p:spTgt>
-                                        </p:tgtEl>
-                                        <p:attrNameLst>
-                                          <p:attrName>style.visibility</p:attrName>
-                                        </p:attrNameLst>
-                                      </p:cBhvr>
-                                      <p:to>
-                                        <p:strVal val="visible"/>
-                                      </p:to>
-                                    </p:set>
-                                    <p:animEffect transition="in" filter="fade">
-                                      <p:cBhvr>
-                                        <p:cTn id="11" dur="2000"/>
-                                        <p:tgtEl>
-                                          <p:spTgt spid="5130">
-                                            <p:txEl>
-                                              <p:pRg st="2" end="2"/>
-                                            </p:txEl>
-                                          </p:spTgt>
-                                        </p:tgtEl>
-                                      </p:cBhvr>
-                                    </p:animEffect>
-                                  </p:childTnLst>
-                                </p:cTn>
-                              </p:par>
-                            </p:childTnLst>
-                          </p:cTn>
-                        </p:par>
-                        <p:par>
-                          <p:cTn id="12" fill="hold">
-                            <p:stCondLst>
-                              <p:cond delay="4000"/>
-                            </p:stCondLst>
-                            <p:childTnLst>
-                              <p:par>
-                                <p:cTn id="13" presetID="10" presetClass="entr" presetSubtype="0" fill="hold" nodeType="afterEffect">
-                                  <p:stCondLst>
-                                    <p:cond delay="0"/>
-                                  </p:stCondLst>
-                                  <p:childTnLst>
-                                    <p:set>
-                                      <p:cBhvr>
-                                        <p:cTn id="14" dur="1" fill="hold">
-                                          <p:stCondLst>
-                                            <p:cond delay="0"/>
-                                          </p:stCondLst>
-                                        </p:cTn>
-                                        <p:tgtEl>
-                                          <p:spTgt spid="5130">
-                                            <p:txEl>
-                                              <p:pRg st="3" end="3"/>
-                                            </p:txEl>
-                                          </p:spTgt>
-                                        </p:tgtEl>
-                                        <p:attrNameLst>
-                                          <p:attrName>style.visibility</p:attrName>
-                                        </p:attrNameLst>
-                                      </p:cBhvr>
-                                      <p:to>
-                                        <p:strVal val="visible"/>
-                                      </p:to>
-                                    </p:set>
-                                    <p:animEffect transition="in" filter="fade">
-                                      <p:cBhvr>
-                                        <p:cTn id="15" dur="2000"/>
-                                        <p:tgtEl>
-                                          <p:spTgt spid="5130">
-                                            <p:txEl>
-                                              <p:pRg st="3" end="3"/>
-                                            </p:txEl>
-                                          </p:spTgt>
-                                        </p:tgtEl>
-                                      </p:cBhvr>
-                                    </p:animEffect>
-                                  </p:childTnLst>
-                                </p:cTn>
-                              </p:par>
-                            </p:childTnLst>
-                          </p:cTn>
-                        </p:par>
-                        <p:par>
-                          <p:cTn id="16" fill="hold">
-                            <p:stCondLst>
-                              <p:cond delay="6000"/>
-                            </p:stCondLst>
-                            <p:childTnLst>
-                              <p:par>
-                                <p:cTn id="17" presetID="10" presetClass="entr" presetSubtype="0" fill="hold" nodeType="afterEffect">
-                                  <p:stCondLst>
-                                    <p:cond delay="0"/>
-                                  </p:stCondLst>
-                                  <p:childTnLst>
-                                    <p:set>
-                                      <p:cBhvr>
-                                        <p:cTn id="18" dur="1" fill="hold">
-                                          <p:stCondLst>
-                                            <p:cond delay="0"/>
-                                          </p:stCondLst>
-                                        </p:cTn>
-                                        <p:tgtEl>
-                                          <p:spTgt spid="5130">
-                                            <p:txEl>
-                                              <p:pRg st="4" end="4"/>
-                                            </p:txEl>
-                                          </p:spTgt>
-                                        </p:tgtEl>
-                                        <p:attrNameLst>
-                                          <p:attrName>style.visibility</p:attrName>
-                                        </p:attrNameLst>
-                                      </p:cBhvr>
-                                      <p:to>
-                                        <p:strVal val="visible"/>
-                                      </p:to>
-                                    </p:set>
-                                    <p:animEffect transition="in" filter="fade">
-                                      <p:cBhvr>
-                                        <p:cTn id="19" dur="2000"/>
-                                        <p:tgtEl>
-                                          <p:spTgt spid="5130">
-                                            <p:txEl>
-                                              <p:pRg st="4" end="4"/>
-                                            </p:txEl>
-                                          </p:spTgt>
-                                        </p:tgtEl>
-                                      </p:cBhvr>
-                                    </p:animEffect>
-                                  </p:childTnLst>
-                                </p:cTn>
-                              </p:par>
-                            </p:childTnLst>
-                          </p:cTn>
-                        </p:par>
-                        <p:par>
-                          <p:cTn id="20" fill="hold">
-                            <p:stCondLst>
-                              <p:cond delay="8000"/>
-                            </p:stCondLst>
-                            <p:childTnLst>
-                              <p:par>
-                                <p:cTn id="21" presetID="10" presetClass="entr" presetSubtype="0" fill="hold" nodeType="afterEffect">
-                                  <p:stCondLst>
-                                    <p:cond delay="0"/>
-                                  </p:stCondLst>
-                                  <p:childTnLst>
-                                    <p:set>
-                                      <p:cBhvr>
-                                        <p:cTn id="22" dur="1" fill="hold">
-                                          <p:stCondLst>
-                                            <p:cond delay="0"/>
-                                          </p:stCondLst>
-                                        </p:cTn>
-                                        <p:tgtEl>
-                                          <p:spTgt spid="5130">
-                                            <p:txEl>
-                                              <p:pRg st="5" end="5"/>
-                                            </p:txEl>
-                                          </p:spTgt>
-                                        </p:tgtEl>
-                                        <p:attrNameLst>
-                                          <p:attrName>style.visibility</p:attrName>
-                                        </p:attrNameLst>
-                                      </p:cBhvr>
-                                      <p:to>
-                                        <p:strVal val="visible"/>
-                                      </p:to>
-                                    </p:set>
-                                    <p:animEffect transition="in" filter="fade">
-                                      <p:cBhvr>
-                                        <p:cTn id="23" dur="2000"/>
-                                        <p:tgtEl>
-                                          <p:spTgt spid="5130">
-                                            <p:txEl>
-                                              <p:pRg st="5" end="5"/>
-                                            </p:txEl>
-                                          </p:spTgt>
-                                        </p:tgtEl>
-                                      </p:cBhvr>
-                                    </p:animEffect>
-                                  </p:childTnLst>
-                                </p:cTn>
-                              </p:par>
-                            </p:childTnLst>
-                          </p:cTn>
-                        </p:par>
-                        <p:par>
-                          <p:cTn id="24" fill="hold">
-                            <p:stCondLst>
-                              <p:cond delay="10000"/>
-                            </p:stCondLst>
-                            <p:childTnLst>
-                              <p:par>
-                                <p:cTn id="25" presetID="10" presetClass="entr" presetSubtype="0" fill="hold" nodeType="afterEffect">
-                                  <p:stCondLst>
-                                    <p:cond delay="0"/>
-                                  </p:stCondLst>
-                                  <p:childTnLst>
-                                    <p:set>
-                                      <p:cBhvr>
-                                        <p:cTn id="26" dur="1" fill="hold">
-                                          <p:stCondLst>
-                                            <p:cond delay="0"/>
-                                          </p:stCondLst>
-                                        </p:cTn>
-                                        <p:tgtEl>
-                                          <p:spTgt spid="5130">
-                                            <p:txEl>
-                                              <p:pRg st="6" end="6"/>
-                                            </p:txEl>
-                                          </p:spTgt>
-                                        </p:tgtEl>
-                                        <p:attrNameLst>
-                                          <p:attrName>style.visibility</p:attrName>
-                                        </p:attrNameLst>
-                                      </p:cBhvr>
-                                      <p:to>
-                                        <p:strVal val="visible"/>
-                                      </p:to>
-                                    </p:set>
-                                    <p:animEffect transition="in" filter="fade">
-                                      <p:cBhvr>
-                                        <p:cTn id="27" dur="2000"/>
-                                        <p:tgtEl>
-                                          <p:spTgt spid="5130">
-                                            <p:txEl>
-                                              <p:pRg st="6" end="6"/>
-                                            </p:txEl>
-                                          </p:spTgt>
-                                        </p:tgtEl>
-                                      </p:cBhvr>
-                                    </p:animEffect>
-                                  </p:childTnLst>
-                                </p:cTn>
-                              </p:par>
-                            </p:childTnLst>
-                          </p:cTn>
-                        </p:par>
-                        <p:par>
-                          <p:cTn id="28" fill="hold">
-                            <p:stCondLst>
-                              <p:cond delay="12000"/>
-                            </p:stCondLst>
-                            <p:childTnLst>
-                              <p:par>
-                                <p:cTn id="29" presetID="10" presetClass="entr" presetSubtype="0" fill="hold" nodeType="afterEffect">
-                                  <p:stCondLst>
-                                    <p:cond delay="0"/>
-                                  </p:stCondLst>
-                                  <p:childTnLst>
-                                    <p:set>
-                                      <p:cBhvr>
-                                        <p:cTn id="30" dur="1" fill="hold">
-                                          <p:stCondLst>
-                                            <p:cond delay="0"/>
-                                          </p:stCondLst>
-                                        </p:cTn>
-                                        <p:tgtEl>
-                                          <p:spTgt spid="5130">
-                                            <p:txEl>
-                                              <p:pRg st="8" end="8"/>
-                                            </p:txEl>
-                                          </p:spTgt>
-                                        </p:tgtEl>
-                                        <p:attrNameLst>
-                                          <p:attrName>style.visibility</p:attrName>
-                                        </p:attrNameLst>
-                                      </p:cBhvr>
-                                      <p:to>
-                                        <p:strVal val="visible"/>
-                                      </p:to>
-                                    </p:set>
-                                    <p:animEffect transition="in" filter="fade">
-                                      <p:cBhvr>
-                                        <p:cTn id="31" dur="2000"/>
-                                        <p:tgtEl>
-                                          <p:spTgt spid="5130">
-                                            <p:txEl>
-                                              <p:pRg st="8" end="8"/>
-                                            </p:txEl>
-                                          </p:spTgt>
-                                        </p:tgtEl>
-                                      </p:cBhvr>
-                                    </p:animEffect>
-                                  </p:childTnLst>
-                                </p:cTn>
-                              </p:par>
-                            </p:childTnLst>
-                          </p:cTn>
-                        </p:par>
-                      </p:childTnLst>
-                    </p:cTn>
-                  </p:par>
-                </p:childTnLst>
-              </p:cTn>
-              <p:prevCondLst>
-                <p:cond evt="onPrev" delay="0">
-                  <p:tgtEl>
-                    <p:sldTgt/>
-                  </p:tgtEl>
-                </p:cond>
-              </p:prevCondLst>
-              <p:nextCondLst>
-                <p:cond evt="onNext" delay="0">
-                  <p:tgtEl>
-                    <p:sldTgt/>
-                  </p:tgtEl>
-                </p:cond>
-              </p:nextCondLst>
-            </p:seq>
-          </p:childTnLst>
-        </p:cTn>
+        <p:cTn id="1" dur="indefinite" restart="never" nodeType="tmRoot"/>
       </p:par>
     </p:tnLst>
   </p:timing>
@@ -10925,13 +10526,14 @@
           </a:bodyPr>
           <a:lstStyle/>
           <a:p>
-            <a:pPr algn="ctr">
-              <a:buFont typeface="Arial" pitchFamily="34" charset="0"/>
-              <a:buChar char="•"/>
-            </a:pPr>
+            <a:pPr algn="ctr"/>
             <a:r>
               <a:rPr lang="en-US" sz="2000" dirty="0" smtClean="0"/>
-              <a:t>JCA container configuration</a:t>
+              <a:t>JCA </a:t>
+            </a:r>
+            <a:r>
+              <a:rPr lang="en-US" sz="2000" dirty="0" smtClean="0"/>
+              <a:t>container configuration</a:t>
             </a:r>
             <a:endParaRPr lang="de-DE" sz="2000" dirty="0"/>
           </a:p>
@@ -10945,8 +10547,8 @@
         </p:nvSpPr>
         <p:spPr>
           <a:xfrm>
-            <a:off x="3324810" y="4500570"/>
-            <a:ext cx="2265236" cy="1015663"/>
+            <a:off x="3003409" y="4500570"/>
+            <a:ext cx="2908040" cy="707886"/>
           </a:xfrm>
           <a:prstGeom prst="rect">
             <a:avLst/>
@@ -10958,24 +10560,12 @@
           </a:bodyPr>
           <a:lstStyle/>
           <a:p>
-            <a:pPr algn="ctr">
-              <a:buFont typeface="Arial" pitchFamily="34" charset="0"/>
-              <a:buChar char="•"/>
-            </a:pPr>
+            <a:pPr algn="ctr"/>
             <a:r>
               <a:rPr lang="en-US" sz="2000" dirty="0" smtClean="0"/>
-              <a:t>multiple containers</a:t>
-            </a:r>
-          </a:p>
-          <a:p>
-            <a:pPr algn="ctr">
-              <a:buFont typeface="Arial" pitchFamily="34" charset="0"/>
-              <a:buChar char="•"/>
-            </a:pPr>
-            <a:r>
-              <a:rPr lang="en-US" sz="2000" dirty="0" smtClean="0"/>
-              <a:t> + Cargo</a:t>
-            </a:r>
+              <a:t>multiple containers, Cargo</a:t>
+            </a:r>
+            <a:endParaRPr lang="en-US" sz="2000" dirty="0" smtClean="0"/>
           </a:p>
           <a:p>
             <a:pPr algn="ctr"/>
@@ -12522,21 +12112,6 @@
 </file>
 
 <file path=customXml/item1.xml><?xml version="1.0" encoding="utf-8"?>
-<p:properties xmlns:p="http://schemas.microsoft.com/office/2006/metadata/properties" xmlns:xsi="http://www.w3.org/2001/XMLSchema-instance">
-  <documentManagement/>
-</p:properties>
-</file>
-
-<file path=customXml/item2.xml><?xml version="1.0" encoding="utf-8"?>
-<?mso-contentType ?>
-<FormTemplates xmlns="http://schemas.microsoft.com/sharepoint/v3/contenttype/forms">
-  <Display>DocumentLibraryForm</Display>
-  <Edit>DocumentLibraryForm</Edit>
-  <New>DocumentLibraryForm</New>
-</FormTemplates>
-</file>
-
-<file path=customXml/item3.xml><?xml version="1.0" encoding="utf-8"?>
 <ct:contentTypeSchema xmlns:ct="http://schemas.microsoft.com/office/2006/metadata/contentType" xmlns:ma="http://schemas.microsoft.com/office/2006/metadata/properties/metaAttributes" ct:_="" ma:_="" ma:contentTypeName="Dokument" ma:contentTypeID="0x01010013E92FB4F0E35945A177EEC2242ABF8A" ma:contentTypeVersion="1" ma:contentTypeDescription="Ein neues Dokument erstellen." ma:contentTypeScope="" ma:versionID="d2cf3a726627425c3604448812c626dc">
   <xsd:schema xmlns:xsd="http://www.w3.org/2001/XMLSchema" xmlns:p="http://schemas.microsoft.com/office/2006/metadata/properties" targetNamespace="http://schemas.microsoft.com/office/2006/metadata/properties" ma:root="true" ma:fieldsID="bf0b6019ab54b64ea4206d6353e55016">
     <xsd:element name="properties">
@@ -12585,10 +12160,32 @@
 </ct:contentTypeSchema>
 </file>
 
+<file path=customXml/item2.xml><?xml version="1.0" encoding="utf-8"?>
+<?mso-contentType ?>
+<FormTemplates xmlns="http://schemas.microsoft.com/sharepoint/v3/contenttype/forms">
+  <Display>DocumentLibraryForm</Display>
+  <Edit>DocumentLibraryForm</Edit>
+  <New>DocumentLibraryForm</New>
+</FormTemplates>
+</file>
+
+<file path=customXml/item3.xml><?xml version="1.0" encoding="utf-8"?>
+<p:properties xmlns:p="http://schemas.microsoft.com/office/2006/metadata/properties" xmlns:xsi="http://www.w3.org/2001/XMLSchema-instance">
+  <documentManagement/>
+</p:properties>
+</file>
+
 <file path=customXml/itemProps1.xml><?xml version="1.0" encoding="utf-8"?>
-<ds:datastoreItem xmlns:ds="http://schemas.openxmlformats.org/officeDocument/2006/customXml" ds:itemID="{35A4017D-26DD-4BAA-A2EC-766517FD49C2}">
+<ds:datastoreItem xmlns:ds="http://schemas.openxmlformats.org/officeDocument/2006/customXml" ds:itemID="{9F6416C8-433A-4551-934F-62352999253F}">
   <ds:schemaRefs>
+    <ds:schemaRef ds:uri="http://schemas.microsoft.com/office/2006/metadata/contentType"/>
+    <ds:schemaRef ds:uri="http://schemas.microsoft.com/office/2006/metadata/properties/metaAttributes"/>
+    <ds:schemaRef ds:uri="http://www.w3.org/2001/XMLSchema"/>
     <ds:schemaRef ds:uri="http://schemas.microsoft.com/office/2006/metadata/properties"/>
+    <ds:schemaRef ds:uri="http://schemas.openxmlformats.org/package/2006/metadata/core-properties"/>
+    <ds:schemaRef ds:uri="http://purl.org/dc/elements/1.1/"/>
+    <ds:schemaRef ds:uri="http://purl.org/dc/terms/"/>
+    <ds:schemaRef ds:uri="http://schemas.microsoft.com/office/internal/2005/internalDocumentation"/>
   </ds:schemaRefs>
 </ds:datastoreItem>
 </file>
@@ -12602,16 +12199,9 @@
 </file>
 
 <file path=customXml/itemProps3.xml><?xml version="1.0" encoding="utf-8"?>
-<ds:datastoreItem xmlns:ds="http://schemas.openxmlformats.org/officeDocument/2006/customXml" ds:itemID="{9F6416C8-433A-4551-934F-62352999253F}">
+<ds:datastoreItem xmlns:ds="http://schemas.openxmlformats.org/officeDocument/2006/customXml" ds:itemID="{35A4017D-26DD-4BAA-A2EC-766517FD49C2}">
   <ds:schemaRefs>
-    <ds:schemaRef ds:uri="http://schemas.microsoft.com/office/2006/metadata/contentType"/>
-    <ds:schemaRef ds:uri="http://schemas.microsoft.com/office/2006/metadata/properties/metaAttributes"/>
-    <ds:schemaRef ds:uri="http://www.w3.org/2001/XMLSchema"/>
     <ds:schemaRef ds:uri="http://schemas.microsoft.com/office/2006/metadata/properties"/>
-    <ds:schemaRef ds:uri="http://schemas.openxmlformats.org/package/2006/metadata/core-properties"/>
-    <ds:schemaRef ds:uri="http://purl.org/dc/elements/1.1/"/>
-    <ds:schemaRef ds:uri="http://purl.org/dc/terms/"/>
-    <ds:schemaRef ds:uri="http://schemas.microsoft.com/office/internal/2005/internalDocumentation"/>
   </ds:schemaRefs>
 </ds:datastoreItem>
 </file>
</xml_diff>

<commit_message>
tweaking slides and live demo
</commit_message>
<xml_diff>
--- a/doc/judcon_SeamArquillian.pptx
+++ b/doc/judcon_SeamArquillian.pptx
@@ -295,7 +295,7 @@
           </a:ln>
           <a:extLst>
             <a:ext uri="{909E8E84-426E-40DD-AFC4-6F175D3DCCD1}">
-              <a14:hiddenFill xmlns:a14="http://schemas.microsoft.com/office/drawing/2010/main" xmlns="">
+              <a14:hiddenFill xmlns="" xmlns:a14="http://schemas.microsoft.com/office/drawing/2010/main">
                 <a:solidFill>
                   <a:srgbClr val="FFFFFF"/>
                 </a:solidFill>
@@ -469,7 +469,7 @@
     </p:spTree>
     <p:extLst>
       <p:ext uri="{BB962C8B-B14F-4D97-AF65-F5344CB8AC3E}">
-        <p14:creationId xmlns:p14="http://schemas.microsoft.com/office/powerpoint/2010/main" xmlns="" val="2567890474"/>
+        <p14:creationId xmlns="" xmlns:p14="http://schemas.microsoft.com/office/powerpoint/2010/main" val="2567890474"/>
       </p:ext>
     </p:extLst>
   </p:cSld>
@@ -648,7 +648,7 @@
           </a:ln>
           <a:extLst>
             <a:ext uri="{91240B29-F687-4F45-9708-019B960494DF}">
-              <a14:hiddenLine xmlns:a14="http://schemas.microsoft.com/office/drawing/2010/main" xmlns="" w="9525">
+              <a14:hiddenLine xmlns="" xmlns:a14="http://schemas.microsoft.com/office/drawing/2010/main" w="9525">
                 <a:solidFill>
                   <a:srgbClr val="000000"/>
                 </a:solidFill>
@@ -684,7 +684,7 @@
           </a:xfrm>
           <a:extLst>
             <a:ext uri="{91240B29-F687-4F45-9708-019B960494DF}">
-              <a14:hiddenLine xmlns:a14="http://schemas.microsoft.com/office/drawing/2010/main" xmlns="" w="9525" algn="ctr">
+              <a14:hiddenLine xmlns="" xmlns:a14="http://schemas.microsoft.com/office/drawing/2010/main" w="9525" algn="ctr">
                 <a:solidFill>
                   <a:srgbClr val="000000"/>
                 </a:solidFill>
@@ -694,7 +694,7 @@
               </a14:hiddenLine>
             </a:ext>
             <a:ext uri="{AF507438-7753-43E0-B8FC-AC1667EBCBE1}">
-              <a14:hiddenEffects xmlns:a14="http://schemas.microsoft.com/office/drawing/2010/main" xmlns="">
+              <a14:hiddenEffects xmlns="" xmlns:a14="http://schemas.microsoft.com/office/drawing/2010/main">
                 <a:effectLst>
                   <a:outerShdw dist="35921" dir="2700000" algn="ctr" rotWithShape="0">
                     <a:srgbClr val="808080"/>
@@ -740,7 +740,7 @@
           </a:xfrm>
           <a:extLst>
             <a:ext uri="{91240B29-F687-4F45-9708-019B960494DF}">
-              <a14:hiddenLine xmlns:a14="http://schemas.microsoft.com/office/drawing/2010/main" xmlns="" w="9525" algn="ctr">
+              <a14:hiddenLine xmlns="" xmlns:a14="http://schemas.microsoft.com/office/drawing/2010/main" w="9525" algn="ctr">
                 <a:solidFill>
                   <a:srgbClr val="000000"/>
                 </a:solidFill>
@@ -750,7 +750,7 @@
               </a14:hiddenLine>
             </a:ext>
             <a:ext uri="{AF507438-7753-43E0-B8FC-AC1667EBCBE1}">
-              <a14:hiddenEffects xmlns:a14="http://schemas.microsoft.com/office/drawing/2010/main" xmlns="">
+              <a14:hiddenEffects xmlns="" xmlns:a14="http://schemas.microsoft.com/office/drawing/2010/main">
                 <a:effectLst>
                   <a:outerShdw dist="35921" dir="2700000" algn="ctr" rotWithShape="0">
                     <a:srgbClr val="808080"/>
@@ -790,7 +790,7 @@
           <a:blip r:embed="rId2" cstate="print">
             <a:extLst>
               <a:ext uri="{28A0092B-C50C-407E-A947-70E740481C1C}">
-                <a14:useLocalDpi xmlns:a14="http://schemas.microsoft.com/office/drawing/2010/main" xmlns="" val="0"/>
+                <a14:useLocalDpi xmlns="" xmlns:a14="http://schemas.microsoft.com/office/drawing/2010/main" val="0"/>
               </a:ext>
             </a:extLst>
           </a:blip>
@@ -813,14 +813,14 @@
           </a:ln>
           <a:extLst>
             <a:ext uri="{909E8E84-426E-40DD-AFC4-6F175D3DCCD1}">
-              <a14:hiddenFill xmlns:a14="http://schemas.microsoft.com/office/drawing/2010/main" xmlns="">
+              <a14:hiddenFill xmlns="" xmlns:a14="http://schemas.microsoft.com/office/drawing/2010/main">
                 <a:solidFill>
                   <a:srgbClr val="FFFFFF"/>
                 </a:solidFill>
               </a14:hiddenFill>
             </a:ext>
             <a:ext uri="{91240B29-F687-4F45-9708-019B960494DF}">
-              <a14:hiddenLine xmlns:a14="http://schemas.microsoft.com/office/drawing/2010/main" xmlns="" w="9525">
+              <a14:hiddenLine xmlns="" xmlns:a14="http://schemas.microsoft.com/office/drawing/2010/main" w="9525">
                 <a:solidFill>
                   <a:srgbClr val="000000"/>
                 </a:solidFill>
@@ -885,7 +885,7 @@
             <a:effectLst/>
             <a:extLst>
               <a:ext uri="{91240B29-F687-4F45-9708-019B960494DF}">
-                <a14:hiddenLine xmlns:a14="http://schemas.microsoft.com/office/drawing/2010/main" xmlns="" w="9525">
+                <a14:hiddenLine xmlns="" xmlns:a14="http://schemas.microsoft.com/office/drawing/2010/main" w="9525">
                   <a:solidFill>
                     <a:schemeClr val="tx1"/>
                   </a:solidFill>
@@ -895,7 +895,7 @@
                 </a14:hiddenLine>
               </a:ext>
               <a:ext uri="{AF507438-7753-43E0-B8FC-AC1667EBCBE1}">
-                <a14:hiddenEffects xmlns:a14="http://schemas.microsoft.com/office/drawing/2010/main" xmlns="">
+                <a14:hiddenEffects xmlns="" xmlns:a14="http://schemas.microsoft.com/office/drawing/2010/main">
                   <a:effectLst>
                     <a:outerShdw dist="35921" dir="2700000" algn="ctr" rotWithShape="0">
                       <a:schemeClr val="bg2"/>
@@ -987,7 +987,7 @@
             <a:effectLst/>
             <a:extLst>
               <a:ext uri="{91240B29-F687-4F45-9708-019B960494DF}">
-                <a14:hiddenLine xmlns:a14="http://schemas.microsoft.com/office/drawing/2010/main" xmlns="" w="9525">
+                <a14:hiddenLine xmlns="" xmlns:a14="http://schemas.microsoft.com/office/drawing/2010/main" w="9525">
                   <a:solidFill>
                     <a:schemeClr val="tx1"/>
                   </a:solidFill>
@@ -997,7 +997,7 @@
                 </a14:hiddenLine>
               </a:ext>
               <a:ext uri="{AF507438-7753-43E0-B8FC-AC1667EBCBE1}">
-                <a14:hiddenEffects xmlns:a14="http://schemas.microsoft.com/office/drawing/2010/main" xmlns="">
+                <a14:hiddenEffects xmlns="" xmlns:a14="http://schemas.microsoft.com/office/drawing/2010/main">
                   <a:effectLst>
                     <a:outerShdw dist="35921" dir="2700000" algn="ctr" rotWithShape="0">
                       <a:schemeClr val="bg2"/>
@@ -1089,7 +1089,7 @@
             <a:effectLst/>
             <a:extLst>
               <a:ext uri="{91240B29-F687-4F45-9708-019B960494DF}">
-                <a14:hiddenLine xmlns:a14="http://schemas.microsoft.com/office/drawing/2010/main" xmlns="" w="9525">
+                <a14:hiddenLine xmlns="" xmlns:a14="http://schemas.microsoft.com/office/drawing/2010/main" w="9525">
                   <a:solidFill>
                     <a:schemeClr val="tx1"/>
                   </a:solidFill>
@@ -1099,7 +1099,7 @@
                 </a14:hiddenLine>
               </a:ext>
               <a:ext uri="{AF507438-7753-43E0-B8FC-AC1667EBCBE1}">
-                <a14:hiddenEffects xmlns:a14="http://schemas.microsoft.com/office/drawing/2010/main" xmlns="">
+                <a14:hiddenEffects xmlns="" xmlns:a14="http://schemas.microsoft.com/office/drawing/2010/main">
                   <a:effectLst>
                     <a:outerShdw dist="35921" dir="2700000" algn="ctr" rotWithShape="0">
                       <a:schemeClr val="bg2"/>
@@ -1191,7 +1191,7 @@
             <a:effectLst/>
             <a:extLst>
               <a:ext uri="{91240B29-F687-4F45-9708-019B960494DF}">
-                <a14:hiddenLine xmlns:a14="http://schemas.microsoft.com/office/drawing/2010/main" xmlns="" w="9525">
+                <a14:hiddenLine xmlns="" xmlns:a14="http://schemas.microsoft.com/office/drawing/2010/main" w="9525">
                   <a:solidFill>
                     <a:schemeClr val="tx1"/>
                   </a:solidFill>
@@ -1201,7 +1201,7 @@
                 </a14:hiddenLine>
               </a:ext>
               <a:ext uri="{AF507438-7753-43E0-B8FC-AC1667EBCBE1}">
-                <a14:hiddenEffects xmlns:a14="http://schemas.microsoft.com/office/drawing/2010/main" xmlns="">
+                <a14:hiddenEffects xmlns="" xmlns:a14="http://schemas.microsoft.com/office/drawing/2010/main">
                   <a:effectLst>
                     <a:outerShdw dist="35921" dir="2700000" algn="ctr" rotWithShape="0">
                       <a:schemeClr val="bg2"/>
@@ -1293,7 +1293,7 @@
             <a:effectLst/>
             <a:extLst>
               <a:ext uri="{91240B29-F687-4F45-9708-019B960494DF}">
-                <a14:hiddenLine xmlns:a14="http://schemas.microsoft.com/office/drawing/2010/main" xmlns="" w="9525">
+                <a14:hiddenLine xmlns="" xmlns:a14="http://schemas.microsoft.com/office/drawing/2010/main" w="9525">
                   <a:solidFill>
                     <a:schemeClr val="tx1"/>
                   </a:solidFill>
@@ -1303,7 +1303,7 @@
                 </a14:hiddenLine>
               </a:ext>
               <a:ext uri="{AF507438-7753-43E0-B8FC-AC1667EBCBE1}">
-                <a14:hiddenEffects xmlns:a14="http://schemas.microsoft.com/office/drawing/2010/main" xmlns="">
+                <a14:hiddenEffects xmlns="" xmlns:a14="http://schemas.microsoft.com/office/drawing/2010/main">
                   <a:effectLst>
                     <a:outerShdw dist="35921" dir="2700000" algn="ctr" rotWithShape="0">
                       <a:schemeClr val="bg2"/>
@@ -1396,7 +1396,7 @@
             <a:effectLst/>
             <a:extLst>
               <a:ext uri="{91240B29-F687-4F45-9708-019B960494DF}">
-                <a14:hiddenLine xmlns:a14="http://schemas.microsoft.com/office/drawing/2010/main" xmlns="" w="9525">
+                <a14:hiddenLine xmlns="" xmlns:a14="http://schemas.microsoft.com/office/drawing/2010/main" w="9525">
                   <a:solidFill>
                     <a:schemeClr val="tx1"/>
                   </a:solidFill>
@@ -1406,7 +1406,7 @@
                 </a14:hiddenLine>
               </a:ext>
               <a:ext uri="{AF507438-7753-43E0-B8FC-AC1667EBCBE1}">
-                <a14:hiddenEffects xmlns:a14="http://schemas.microsoft.com/office/drawing/2010/main" xmlns="">
+                <a14:hiddenEffects xmlns="" xmlns:a14="http://schemas.microsoft.com/office/drawing/2010/main">
                   <a:effectLst>
                     <a:outerShdw dist="35921" dir="2700000" algn="ctr" rotWithShape="0">
                       <a:schemeClr val="bg2"/>
@@ -1930,7 +1930,7 @@
             <a:fld id="{E21178D3-6FDC-4B0B-8625-5740BE2FAF02}" type="datetime1">
               <a:rPr lang="de-DE"/>
               <a:pPr/>
-              <a:t>07.10.2010</a:t>
+              <a:t>08.10.2010</a:t>
             </a:fld>
             <a:endParaRPr lang="de-DE"/>
           </a:p>
@@ -1990,7 +1990,7 @@
     </p:spTree>
     <p:extLst>
       <p:ext uri="{BB962C8B-B14F-4D97-AF65-F5344CB8AC3E}">
-        <p14:creationId xmlns:p14="http://schemas.microsoft.com/office/powerpoint/2010/main" xmlns="" val="4188007517"/>
+        <p14:creationId xmlns="" xmlns:p14="http://schemas.microsoft.com/office/powerpoint/2010/main" val="4188007517"/>
       </p:ext>
     </p:extLst>
   </p:cSld>
@@ -2050,7 +2050,7 @@
           </a:ln>
           <a:extLst>
             <a:ext uri="{91240B29-F687-4F45-9708-019B960494DF}">
-              <a14:hiddenLine xmlns:a14="http://schemas.microsoft.com/office/drawing/2010/main" xmlns="" w="9525" algn="ctr">
+              <a14:hiddenLine xmlns="" xmlns:a14="http://schemas.microsoft.com/office/drawing/2010/main" w="9525" algn="ctr">
                 <a:solidFill>
                   <a:srgbClr val="000000"/>
                 </a:solidFill>
@@ -2145,14 +2145,14 @@
           </a:ln>
           <a:extLst>
             <a:ext uri="{909E8E84-426E-40DD-AFC4-6F175D3DCCD1}">
-              <a14:hiddenFill xmlns:a14="http://schemas.microsoft.com/office/drawing/2010/main" xmlns="">
+              <a14:hiddenFill xmlns="" xmlns:a14="http://schemas.microsoft.com/office/drawing/2010/main">
                 <a:solidFill>
                   <a:srgbClr val="FFFFFF"/>
                 </a:solidFill>
               </a14:hiddenFill>
             </a:ext>
             <a:ext uri="{91240B29-F687-4F45-9708-019B960494DF}">
-              <a14:hiddenLine xmlns:a14="http://schemas.microsoft.com/office/drawing/2010/main" xmlns="" w="9525">
+              <a14:hiddenLine xmlns="" xmlns:a14="http://schemas.microsoft.com/office/drawing/2010/main" w="9525">
                 <a:solidFill>
                   <a:srgbClr val="000000"/>
                 </a:solidFill>
@@ -2203,14 +2203,14 @@
           </a:ln>
           <a:extLst>
             <a:ext uri="{909E8E84-426E-40DD-AFC4-6F175D3DCCD1}">
-              <a14:hiddenFill xmlns:a14="http://schemas.microsoft.com/office/drawing/2010/main" xmlns="">
+              <a14:hiddenFill xmlns="" xmlns:a14="http://schemas.microsoft.com/office/drawing/2010/main">
                 <a:solidFill>
                   <a:srgbClr val="FFFFFF"/>
                 </a:solidFill>
               </a14:hiddenFill>
             </a:ext>
             <a:ext uri="{91240B29-F687-4F45-9708-019B960494DF}">
-              <a14:hiddenLine xmlns:a14="http://schemas.microsoft.com/office/drawing/2010/main" xmlns="" w="9525">
+              <a14:hiddenLine xmlns="" xmlns:a14="http://schemas.microsoft.com/office/drawing/2010/main" w="9525">
                 <a:solidFill>
                   <a:srgbClr val="000000"/>
                 </a:solidFill>
@@ -2312,7 +2312,7 @@
             <a:fld id="{E21178D3-6FDC-4B0B-8625-5740BE2FAF02}" type="datetime1">
               <a:rPr lang="de-DE"/>
               <a:pPr/>
-              <a:t>07.10.2010</a:t>
+              <a:t>08.10.2010</a:t>
             </a:fld>
             <a:endParaRPr lang="de-DE"/>
           </a:p>
@@ -2638,7 +2638,7 @@
           <a:blip r:embed="rId4" cstate="print">
             <a:extLst>
               <a:ext uri="{28A0092B-C50C-407E-A947-70E740481C1C}">
-                <a14:useLocalDpi xmlns:a14="http://schemas.microsoft.com/office/drawing/2010/main" xmlns="" val="0"/>
+                <a14:useLocalDpi xmlns="" xmlns:a14="http://schemas.microsoft.com/office/drawing/2010/main" val="0"/>
               </a:ext>
             </a:extLst>
           </a:blip>
@@ -2661,14 +2661,14 @@
           </a:ln>
           <a:extLst>
             <a:ext uri="{909E8E84-426E-40DD-AFC4-6F175D3DCCD1}">
-              <a14:hiddenFill xmlns:a14="http://schemas.microsoft.com/office/drawing/2010/main" xmlns="">
+              <a14:hiddenFill xmlns="" xmlns:a14="http://schemas.microsoft.com/office/drawing/2010/main">
                 <a:solidFill>
                   <a:srgbClr val="FFFFFF"/>
                 </a:solidFill>
               </a14:hiddenFill>
             </a:ext>
             <a:ext uri="{91240B29-F687-4F45-9708-019B960494DF}">
-              <a14:hiddenLine xmlns:a14="http://schemas.microsoft.com/office/drawing/2010/main" xmlns="" w="9525">
+              <a14:hiddenLine xmlns="" xmlns:a14="http://schemas.microsoft.com/office/drawing/2010/main" w="9525">
                 <a:solidFill>
                   <a:srgbClr val="000000"/>
                 </a:solidFill>
@@ -2733,7 +2733,7 @@
             <a:effectLst/>
             <a:extLst>
               <a:ext uri="{91240B29-F687-4F45-9708-019B960494DF}">
-                <a14:hiddenLine xmlns:a14="http://schemas.microsoft.com/office/drawing/2010/main" xmlns="" w="9525">
+                <a14:hiddenLine xmlns="" xmlns:a14="http://schemas.microsoft.com/office/drawing/2010/main" w="9525">
                   <a:solidFill>
                     <a:schemeClr val="tx1"/>
                   </a:solidFill>
@@ -2743,7 +2743,7 @@
                 </a14:hiddenLine>
               </a:ext>
               <a:ext uri="{AF507438-7753-43E0-B8FC-AC1667EBCBE1}">
-                <a14:hiddenEffects xmlns:a14="http://schemas.microsoft.com/office/drawing/2010/main" xmlns="">
+                <a14:hiddenEffects xmlns="" xmlns:a14="http://schemas.microsoft.com/office/drawing/2010/main">
                   <a:effectLst>
                     <a:outerShdw dist="35921" dir="2700000" algn="ctr" rotWithShape="0">
                       <a:schemeClr val="bg2"/>
@@ -2835,7 +2835,7 @@
             <a:effectLst/>
             <a:extLst>
               <a:ext uri="{91240B29-F687-4F45-9708-019B960494DF}">
-                <a14:hiddenLine xmlns:a14="http://schemas.microsoft.com/office/drawing/2010/main" xmlns="" w="9525">
+                <a14:hiddenLine xmlns="" xmlns:a14="http://schemas.microsoft.com/office/drawing/2010/main" w="9525">
                   <a:solidFill>
                     <a:schemeClr val="tx1"/>
                   </a:solidFill>
@@ -2845,7 +2845,7 @@
                 </a14:hiddenLine>
               </a:ext>
               <a:ext uri="{AF507438-7753-43E0-B8FC-AC1667EBCBE1}">
-                <a14:hiddenEffects xmlns:a14="http://schemas.microsoft.com/office/drawing/2010/main" xmlns="">
+                <a14:hiddenEffects xmlns="" xmlns:a14="http://schemas.microsoft.com/office/drawing/2010/main">
                   <a:effectLst>
                     <a:outerShdw dist="35921" dir="2700000" algn="ctr" rotWithShape="0">
                       <a:schemeClr val="bg2"/>
@@ -2937,7 +2937,7 @@
             <a:effectLst/>
             <a:extLst>
               <a:ext uri="{91240B29-F687-4F45-9708-019B960494DF}">
-                <a14:hiddenLine xmlns:a14="http://schemas.microsoft.com/office/drawing/2010/main" xmlns="" w="9525">
+                <a14:hiddenLine xmlns="" xmlns:a14="http://schemas.microsoft.com/office/drawing/2010/main" w="9525">
                   <a:solidFill>
                     <a:schemeClr val="tx1"/>
                   </a:solidFill>
@@ -2947,7 +2947,7 @@
                 </a14:hiddenLine>
               </a:ext>
               <a:ext uri="{AF507438-7753-43E0-B8FC-AC1667EBCBE1}">
-                <a14:hiddenEffects xmlns:a14="http://schemas.microsoft.com/office/drawing/2010/main" xmlns="">
+                <a14:hiddenEffects xmlns="" xmlns:a14="http://schemas.microsoft.com/office/drawing/2010/main">
                   <a:effectLst>
                     <a:outerShdw dist="35921" dir="2700000" algn="ctr" rotWithShape="0">
                       <a:schemeClr val="bg2"/>
@@ -3039,7 +3039,7 @@
             <a:effectLst/>
             <a:extLst>
               <a:ext uri="{91240B29-F687-4F45-9708-019B960494DF}">
-                <a14:hiddenLine xmlns:a14="http://schemas.microsoft.com/office/drawing/2010/main" xmlns="" w="9525">
+                <a14:hiddenLine xmlns="" xmlns:a14="http://schemas.microsoft.com/office/drawing/2010/main" w="9525">
                   <a:solidFill>
                     <a:schemeClr val="tx1"/>
                   </a:solidFill>
@@ -3049,7 +3049,7 @@
                 </a14:hiddenLine>
               </a:ext>
               <a:ext uri="{AF507438-7753-43E0-B8FC-AC1667EBCBE1}">
-                <a14:hiddenEffects xmlns:a14="http://schemas.microsoft.com/office/drawing/2010/main" xmlns="">
+                <a14:hiddenEffects xmlns="" xmlns:a14="http://schemas.microsoft.com/office/drawing/2010/main">
                   <a:effectLst>
                     <a:outerShdw dist="35921" dir="2700000" algn="ctr" rotWithShape="0">
                       <a:schemeClr val="bg2"/>
@@ -3141,7 +3141,7 @@
             <a:effectLst/>
             <a:extLst>
               <a:ext uri="{91240B29-F687-4F45-9708-019B960494DF}">
-                <a14:hiddenLine xmlns:a14="http://schemas.microsoft.com/office/drawing/2010/main" xmlns="" w="9525">
+                <a14:hiddenLine xmlns="" xmlns:a14="http://schemas.microsoft.com/office/drawing/2010/main" w="9525">
                   <a:solidFill>
                     <a:schemeClr val="tx1"/>
                   </a:solidFill>
@@ -3151,7 +3151,7 @@
                 </a14:hiddenLine>
               </a:ext>
               <a:ext uri="{AF507438-7753-43E0-B8FC-AC1667EBCBE1}">
-                <a14:hiddenEffects xmlns:a14="http://schemas.microsoft.com/office/drawing/2010/main" xmlns="">
+                <a14:hiddenEffects xmlns="" xmlns:a14="http://schemas.microsoft.com/office/drawing/2010/main">
                   <a:effectLst>
                     <a:outerShdw dist="35921" dir="2700000" algn="ctr" rotWithShape="0">
                       <a:schemeClr val="bg2"/>
@@ -3244,7 +3244,7 @@
             <a:effectLst/>
             <a:extLst>
               <a:ext uri="{91240B29-F687-4F45-9708-019B960494DF}">
-                <a14:hiddenLine xmlns:a14="http://schemas.microsoft.com/office/drawing/2010/main" xmlns="" w="9525">
+                <a14:hiddenLine xmlns="" xmlns:a14="http://schemas.microsoft.com/office/drawing/2010/main" w="9525">
                   <a:solidFill>
                     <a:schemeClr val="tx1"/>
                   </a:solidFill>
@@ -3254,7 +3254,7 @@
                 </a14:hiddenLine>
               </a:ext>
               <a:ext uri="{AF507438-7753-43E0-B8FC-AC1667EBCBE1}">
-                <a14:hiddenEffects xmlns:a14="http://schemas.microsoft.com/office/drawing/2010/main" xmlns="">
+                <a14:hiddenEffects xmlns="" xmlns:a14="http://schemas.microsoft.com/office/drawing/2010/main">
                   <a:effectLst>
                     <a:outerShdw dist="35921" dir="2700000" algn="ctr" rotWithShape="0">
                       <a:schemeClr val="bg2"/>
@@ -3925,7 +3925,7 @@
             <a:fld id="{98405E6C-AB5C-49C6-8300-E0D31946C0F1}" type="datetime1">
               <a:rPr lang="de-DE" smtClean="0"/>
               <a:pPr/>
-              <a:t>07.10.2010</a:t>
+              <a:t>08.10.2010</a:t>
             </a:fld>
             <a:endParaRPr lang="de-DE"/>
           </a:p>
@@ -4484,7 +4484,7 @@
             <a:fld id="{98405E6C-AB5C-49C6-8300-E0D31946C0F1}" type="datetime1">
               <a:rPr lang="de-DE" smtClean="0"/>
               <a:pPr/>
-              <a:t>07.10.2010</a:t>
+              <a:t>08.10.2010</a:t>
             </a:fld>
             <a:endParaRPr lang="de-DE"/>
           </a:p>
@@ -5280,7 +5280,7 @@
             <a:fld id="{98405E6C-AB5C-49C6-8300-E0D31946C0F1}" type="datetime1">
               <a:rPr lang="de-DE" smtClean="0"/>
               <a:pPr/>
-              <a:t>07.10.2010</a:t>
+              <a:t>08.10.2010</a:t>
             </a:fld>
             <a:endParaRPr lang="de-DE"/>
           </a:p>
@@ -5425,14 +5425,47 @@
             <a:pPr lvl="1"/>
             <a:r>
               <a:rPr lang="en-US" sz="2000" dirty="0" smtClean="0"/>
-              <a:t>API support --&gt; where to put it? </a:t>
-            </a:r>
+              <a:t>API support </a:t>
+            </a:r>
+            <a:r>
+              <a:rPr lang="en-US" sz="2000" dirty="0" smtClean="0">
+                <a:sym typeface="Wingdings" pitchFamily="2" charset="2"/>
+              </a:rPr>
+              <a:t></a:t>
+            </a:r>
+            <a:r>
+              <a:rPr lang="en-US" sz="2000" dirty="0" smtClean="0"/>
+              <a:t> as </a:t>
+            </a:r>
+            <a:r>
+              <a:rPr lang="en-US" sz="2000" dirty="0" err="1" smtClean="0"/>
+              <a:t>Arquillian</a:t>
+            </a:r>
+            <a:r>
+              <a:rPr lang="en-US" sz="2000" dirty="0" smtClean="0"/>
+              <a:t> extension? </a:t>
+            </a:r>
+            <a:endParaRPr lang="en-US" sz="2000" dirty="0" smtClean="0"/>
           </a:p>
           <a:p>
             <a:pPr lvl="1"/>
             <a:r>
               <a:rPr lang="en-US" sz="2000" dirty="0" smtClean="0"/>
-              <a:t>Extending --&gt; @In </a:t>
+              <a:t>Extending </a:t>
+            </a:r>
+            <a:r>
+              <a:rPr lang="en-US" sz="2000" dirty="0" smtClean="0">
+                <a:sym typeface="Wingdings" pitchFamily="2" charset="2"/>
+              </a:rPr>
+              <a:t></a:t>
+            </a:r>
+            <a:r>
+              <a:rPr lang="en-US" sz="2000" dirty="0" smtClean="0"/>
+              <a:t> </a:t>
+            </a:r>
+            <a:r>
+              <a:rPr lang="en-US" sz="2000" dirty="0" smtClean="0"/>
+              <a:t>@In </a:t>
             </a:r>
             <a:r>
               <a:rPr lang="en-US" sz="2000" dirty="0" err="1" smtClean="0"/>
@@ -5442,12 +5475,55 @@
               <a:rPr lang="en-US" sz="2000" dirty="0" smtClean="0"/>
               <a:t> </a:t>
             </a:r>
+            <a:endParaRPr lang="en-US" sz="2000" dirty="0" smtClean="0"/>
+          </a:p>
+          <a:p>
+            <a:pPr lvl="1"/>
+            <a:r>
+              <a:rPr lang="en-US" sz="2000" dirty="0" err="1" smtClean="0"/>
+              <a:t>MavenArtifactResolver</a:t>
+            </a:r>
+            <a:r>
+              <a:rPr lang="en-US" sz="2000" dirty="0" smtClean="0"/>
+              <a:t> </a:t>
+            </a:r>
+            <a:r>
+              <a:rPr lang="en-US" sz="2000" dirty="0" smtClean="0">
+                <a:sym typeface="Wingdings" pitchFamily="2" charset="2"/>
+              </a:rPr>
+              <a:t> </a:t>
+            </a:r>
+            <a:r>
+              <a:rPr lang="en-US" sz="2000" dirty="0" err="1" smtClean="0">
+                <a:sym typeface="Wingdings" pitchFamily="2" charset="2"/>
+              </a:rPr>
+              <a:t>ShrinkWrap</a:t>
+            </a:r>
+            <a:r>
+              <a:rPr lang="en-US" sz="2000" dirty="0" smtClean="0">
+                <a:sym typeface="Wingdings" pitchFamily="2" charset="2"/>
+              </a:rPr>
+              <a:t> API</a:t>
+            </a:r>
+            <a:endParaRPr lang="en-US" sz="2000" dirty="0" smtClean="0"/>
           </a:p>
           <a:p>
             <a:pPr lvl="1"/>
             <a:r>
               <a:rPr lang="en-US" sz="2000" dirty="0" err="1" smtClean="0"/>
               <a:t>JSFUnit</a:t>
+            </a:r>
+            <a:r>
+              <a:rPr lang="en-US" sz="2000" dirty="0" smtClean="0"/>
+              <a:t> </a:t>
+            </a:r>
+            <a:r>
+              <a:rPr lang="en-US" sz="2000" dirty="0" err="1" smtClean="0"/>
+              <a:t>Arquillian</a:t>
+            </a:r>
+            <a:r>
+              <a:rPr lang="en-US" sz="2000" dirty="0" smtClean="0"/>
+              <a:t> integration</a:t>
             </a:r>
             <a:endParaRPr lang="de-DE" sz="2000" dirty="0" smtClean="0"/>
           </a:p>
@@ -5495,7 +5571,7 @@
             <a:fld id="{98405E6C-AB5C-49C6-8300-E0D31946C0F1}" type="datetime1">
               <a:rPr lang="de-DE" smtClean="0"/>
               <a:pPr/>
-              <a:t>07.10.2010</a:t>
+              <a:t>08.10.2010</a:t>
             </a:fld>
             <a:endParaRPr lang="de-DE"/>
           </a:p>
@@ -5652,7 +5728,7 @@
             <a:fld id="{98405E6C-AB5C-49C6-8300-E0D31946C0F1}" type="datetime1">
               <a:rPr lang="de-DE" smtClean="0"/>
               <a:pPr/>
-              <a:t>07.10.2010</a:t>
+              <a:t>08.10.2010</a:t>
             </a:fld>
             <a:endParaRPr lang="de-DE"/>
           </a:p>
@@ -6095,7 +6171,7 @@
             <a:fld id="{98405E6C-AB5C-49C6-8300-E0D31946C0F1}" type="datetime1">
               <a:rPr lang="de-DE" smtClean="0"/>
               <a:pPr/>
-              <a:t>07.10.2010</a:t>
+              <a:t>08.10.2010</a:t>
             </a:fld>
             <a:endParaRPr lang="de-DE"/>
           </a:p>
@@ -6310,7 +6386,7 @@
             <a:fld id="{98405E6C-AB5C-49C6-8300-E0D31946C0F1}" type="datetime1">
               <a:rPr lang="de-DE" smtClean="0"/>
               <a:pPr/>
-              <a:t>07.10.2010</a:t>
+              <a:t>08.10.2010</a:t>
             </a:fld>
             <a:endParaRPr lang="de-DE"/>
           </a:p>
@@ -6683,7 +6759,7 @@
             <a:fld id="{98405E6C-AB5C-49C6-8300-E0D31946C0F1}" type="datetime1">
               <a:rPr lang="de-DE" smtClean="0"/>
               <a:pPr/>
-              <a:t>07.10.2010</a:t>
+              <a:t>08.10.2010</a:t>
             </a:fld>
             <a:endParaRPr lang="de-DE"/>
           </a:p>
@@ -6796,14 +6872,14 @@
           </a:ln>
           <a:extLst>
             <a:ext uri="{909E8E84-426E-40DD-AFC4-6F175D3DCCD1}">
-              <a14:hiddenFill xmlns:a14="http://schemas.microsoft.com/office/drawing/2010/main" xmlns="">
+              <a14:hiddenFill xmlns="" xmlns:a14="http://schemas.microsoft.com/office/drawing/2010/main">
                 <a:solidFill>
                   <a:srgbClr val="FFFFFF"/>
                 </a:solidFill>
               </a14:hiddenFill>
             </a:ext>
             <a:ext uri="{91240B29-F687-4F45-9708-019B960494DF}">
-              <a14:hiddenLine xmlns:a14="http://schemas.microsoft.com/office/drawing/2010/main" xmlns="" w="9525">
+              <a14:hiddenLine xmlns="" xmlns:a14="http://schemas.microsoft.com/office/drawing/2010/main" w="9525">
                 <a:solidFill>
                   <a:srgbClr val="000000"/>
                 </a:solidFill>
@@ -6893,14 +6969,14 @@
           </a:ln>
           <a:extLst>
             <a:ext uri="{909E8E84-426E-40DD-AFC4-6F175D3DCCD1}">
-              <a14:hiddenFill xmlns:a14="http://schemas.microsoft.com/office/drawing/2010/main" xmlns="">
+              <a14:hiddenFill xmlns="" xmlns:a14="http://schemas.microsoft.com/office/drawing/2010/main">
                 <a:solidFill>
                   <a:srgbClr val="FFFFFF"/>
                 </a:solidFill>
               </a14:hiddenFill>
             </a:ext>
             <a:ext uri="{91240B29-F687-4F45-9708-019B960494DF}">
-              <a14:hiddenLine xmlns:a14="http://schemas.microsoft.com/office/drawing/2010/main" xmlns="" w="9525">
+              <a14:hiddenLine xmlns="" xmlns:a14="http://schemas.microsoft.com/office/drawing/2010/main" w="9525">
                 <a:solidFill>
                   <a:srgbClr val="000000"/>
                 </a:solidFill>
@@ -6977,14 +7053,14 @@
           </a:ln>
           <a:extLst>
             <a:ext uri="{909E8E84-426E-40DD-AFC4-6F175D3DCCD1}">
-              <a14:hiddenFill xmlns:a14="http://schemas.microsoft.com/office/drawing/2010/main" xmlns="">
+              <a14:hiddenFill xmlns="" xmlns:a14="http://schemas.microsoft.com/office/drawing/2010/main">
                 <a:solidFill>
                   <a:srgbClr val="FFFFFF"/>
                 </a:solidFill>
               </a14:hiddenFill>
             </a:ext>
             <a:ext uri="{91240B29-F687-4F45-9708-019B960494DF}">
-              <a14:hiddenLine xmlns:a14="http://schemas.microsoft.com/office/drawing/2010/main" xmlns="" w="9525">
+              <a14:hiddenLine xmlns="" xmlns:a14="http://schemas.microsoft.com/office/drawing/2010/main" w="9525">
                 <a:solidFill>
                   <a:srgbClr val="000000"/>
                 </a:solidFill>
@@ -7090,14 +7166,14 @@
           </a:ln>
           <a:extLst>
             <a:ext uri="{909E8E84-426E-40DD-AFC4-6F175D3DCCD1}">
-              <a14:hiddenFill xmlns:a14="http://schemas.microsoft.com/office/drawing/2010/main" xmlns="">
+              <a14:hiddenFill xmlns="" xmlns:a14="http://schemas.microsoft.com/office/drawing/2010/main">
                 <a:solidFill>
                   <a:srgbClr val="FFFFFF"/>
                 </a:solidFill>
               </a14:hiddenFill>
             </a:ext>
             <a:ext uri="{91240B29-F687-4F45-9708-019B960494DF}">
-              <a14:hiddenLine xmlns:a14="http://schemas.microsoft.com/office/drawing/2010/main" xmlns="" w="9525">
+              <a14:hiddenLine xmlns="" xmlns:a14="http://schemas.microsoft.com/office/drawing/2010/main" w="9525">
                 <a:solidFill>
                   <a:srgbClr val="000000"/>
                 </a:solidFill>
@@ -7744,7 +7820,7 @@
             <a:fld id="{98405E6C-AB5C-49C6-8300-E0D31946C0F1}" type="datetime1">
               <a:rPr lang="de-DE" smtClean="0"/>
               <a:pPr/>
-              <a:t>07.10.2010</a:t>
+              <a:t>08.10.2010</a:t>
             </a:fld>
             <a:endParaRPr lang="de-DE"/>
           </a:p>
@@ -8289,8 +8365,33 @@
             <a:pPr lvl="1"/>
             <a:r>
               <a:rPr lang="en-US" sz="2000" dirty="0" smtClean="0"/>
-              <a:t>JBossAS6M5 – final about end of year</a:t>
-            </a:r>
+              <a:t>No JSF 2 </a:t>
+            </a:r>
+            <a:r>
+              <a:rPr lang="en-US" sz="2000" dirty="0" err="1" smtClean="0"/>
+              <a:t>Portlet</a:t>
+            </a:r>
+            <a:r>
+              <a:rPr lang="en-US" sz="2000" dirty="0" smtClean="0"/>
+              <a:t> Bridge ready to use</a:t>
+            </a:r>
+          </a:p>
+          <a:p>
+            <a:pPr lvl="1"/>
+            <a:r>
+              <a:rPr lang="en-US" sz="2000" dirty="0" smtClean="0"/>
+              <a:t>JBossAS6M5 </a:t>
+            </a:r>
+            <a:r>
+              <a:rPr lang="en-US" sz="2000" dirty="0" smtClean="0"/>
+              <a:t>– final about end of year</a:t>
+            </a:r>
+          </a:p>
+          <a:p>
+            <a:pPr lvl="1">
+              <a:buNone/>
+            </a:pPr>
+            <a:endParaRPr lang="en-US" sz="2000" dirty="0" smtClean="0"/>
           </a:p>
         </p:txBody>
       </p:sp>
@@ -8336,7 +8437,7 @@
             <a:fld id="{98405E6C-AB5C-49C6-8300-E0D31946C0F1}" type="datetime1">
               <a:rPr lang="de-DE" smtClean="0"/>
               <a:pPr/>
-              <a:t>07.10.2010</a:t>
+              <a:t>08.10.2010</a:t>
             </a:fld>
             <a:endParaRPr lang="de-DE"/>
           </a:p>
@@ -8692,7 +8793,7 @@
             <a:fld id="{98405E6C-AB5C-49C6-8300-E0D31946C0F1}" type="datetime1">
               <a:rPr lang="de-DE" smtClean="0"/>
               <a:pPr/>
-              <a:t>07.10.2010</a:t>
+              <a:t>08.10.2010</a:t>
             </a:fld>
             <a:endParaRPr lang="de-DE"/>
           </a:p>
@@ -8903,7 +9004,7 @@
             <a:fld id="{98405E6C-AB5C-49C6-8300-E0D31946C0F1}" type="datetime1">
               <a:rPr lang="de-DE" smtClean="0"/>
               <a:pPr/>
-              <a:t>07.10.2010</a:t>
+              <a:t>08.10.2010</a:t>
             </a:fld>
             <a:endParaRPr lang="de-DE"/>
           </a:p>
@@ -9099,7 +9200,7 @@
             <a:fld id="{98405E6C-AB5C-49C6-8300-E0D31946C0F1}" type="datetime1">
               <a:rPr lang="de-DE" smtClean="0"/>
               <a:pPr/>
-              <a:t>07.10.2010</a:t>
+              <a:t>08.10.2010</a:t>
             </a:fld>
             <a:endParaRPr lang="de-DE"/>
           </a:p>
@@ -9969,7 +10070,7 @@
             <a:fld id="{98405E6C-AB5C-49C6-8300-E0D31946C0F1}" type="datetime1">
               <a:rPr lang="de-DE" smtClean="0"/>
               <a:pPr/>
-              <a:t>07.10.2010</a:t>
+              <a:t>08.10.2010</a:t>
             </a:fld>
             <a:endParaRPr lang="de-DE"/>
           </a:p>
@@ -10528,8 +10629,8 @@
           <a:p>
             <a:pPr algn="ctr"/>
             <a:r>
-              <a:rPr lang="en-US" sz="2000" dirty="0" smtClean="0"/>
-              <a:t>JCA </a:t>
+              <a:rPr lang="en-US" sz="2000" smtClean="0"/>
+              <a:t>EJB3, JCA </a:t>
             </a:r>
             <a:r>
               <a:rPr lang="en-US" sz="2000" dirty="0" smtClean="0"/>
@@ -10565,7 +10666,6 @@
               <a:rPr lang="en-US" sz="2000" dirty="0" smtClean="0"/>
               <a:t>multiple containers, Cargo</a:t>
             </a:r>
-            <a:endParaRPr lang="en-US" sz="2000" dirty="0" smtClean="0"/>
           </a:p>
           <a:p>
             <a:pPr algn="ctr"/>
@@ -12112,6 +12212,21 @@
 </file>
 
 <file path=customXml/item1.xml><?xml version="1.0" encoding="utf-8"?>
+<p:properties xmlns:p="http://schemas.microsoft.com/office/2006/metadata/properties" xmlns:xsi="http://www.w3.org/2001/XMLSchema-instance">
+  <documentManagement/>
+</p:properties>
+</file>
+
+<file path=customXml/item2.xml><?xml version="1.0" encoding="utf-8"?>
+<?mso-contentType ?>
+<FormTemplates xmlns="http://schemas.microsoft.com/sharepoint/v3/contenttype/forms">
+  <Display>DocumentLibraryForm</Display>
+  <Edit>DocumentLibraryForm</Edit>
+  <New>DocumentLibraryForm</New>
+</FormTemplates>
+</file>
+
+<file path=customXml/item3.xml><?xml version="1.0" encoding="utf-8"?>
 <ct:contentTypeSchema xmlns:ct="http://schemas.microsoft.com/office/2006/metadata/contentType" xmlns:ma="http://schemas.microsoft.com/office/2006/metadata/properties/metaAttributes" ct:_="" ma:_="" ma:contentTypeName="Dokument" ma:contentTypeID="0x01010013E92FB4F0E35945A177EEC2242ABF8A" ma:contentTypeVersion="1" ma:contentTypeDescription="Ein neues Dokument erstellen." ma:contentTypeScope="" ma:versionID="d2cf3a726627425c3604448812c626dc">
   <xsd:schema xmlns:xsd="http://www.w3.org/2001/XMLSchema" xmlns:p="http://schemas.microsoft.com/office/2006/metadata/properties" targetNamespace="http://schemas.microsoft.com/office/2006/metadata/properties" ma:root="true" ma:fieldsID="bf0b6019ab54b64ea4206d6353e55016">
     <xsd:element name="properties">
@@ -12160,32 +12275,10 @@
 </ct:contentTypeSchema>
 </file>
 
-<file path=customXml/item2.xml><?xml version="1.0" encoding="utf-8"?>
-<?mso-contentType ?>
-<FormTemplates xmlns="http://schemas.microsoft.com/sharepoint/v3/contenttype/forms">
-  <Display>DocumentLibraryForm</Display>
-  <Edit>DocumentLibraryForm</Edit>
-  <New>DocumentLibraryForm</New>
-</FormTemplates>
-</file>
-
-<file path=customXml/item3.xml><?xml version="1.0" encoding="utf-8"?>
-<p:properties xmlns:p="http://schemas.microsoft.com/office/2006/metadata/properties" xmlns:xsi="http://www.w3.org/2001/XMLSchema-instance">
-  <documentManagement/>
-</p:properties>
-</file>
-
 <file path=customXml/itemProps1.xml><?xml version="1.0" encoding="utf-8"?>
-<ds:datastoreItem xmlns:ds="http://schemas.openxmlformats.org/officeDocument/2006/customXml" ds:itemID="{9F6416C8-433A-4551-934F-62352999253F}">
+<ds:datastoreItem xmlns:ds="http://schemas.openxmlformats.org/officeDocument/2006/customXml" ds:itemID="{35A4017D-26DD-4BAA-A2EC-766517FD49C2}">
   <ds:schemaRefs>
-    <ds:schemaRef ds:uri="http://schemas.microsoft.com/office/2006/metadata/contentType"/>
-    <ds:schemaRef ds:uri="http://schemas.microsoft.com/office/2006/metadata/properties/metaAttributes"/>
-    <ds:schemaRef ds:uri="http://www.w3.org/2001/XMLSchema"/>
     <ds:schemaRef ds:uri="http://schemas.microsoft.com/office/2006/metadata/properties"/>
-    <ds:schemaRef ds:uri="http://schemas.openxmlformats.org/package/2006/metadata/core-properties"/>
-    <ds:schemaRef ds:uri="http://purl.org/dc/elements/1.1/"/>
-    <ds:schemaRef ds:uri="http://purl.org/dc/terms/"/>
-    <ds:schemaRef ds:uri="http://schemas.microsoft.com/office/internal/2005/internalDocumentation"/>
   </ds:schemaRefs>
 </ds:datastoreItem>
 </file>
@@ -12199,9 +12292,16 @@
 </file>
 
 <file path=customXml/itemProps3.xml><?xml version="1.0" encoding="utf-8"?>
-<ds:datastoreItem xmlns:ds="http://schemas.openxmlformats.org/officeDocument/2006/customXml" ds:itemID="{35A4017D-26DD-4BAA-A2EC-766517FD49C2}">
+<ds:datastoreItem xmlns:ds="http://schemas.openxmlformats.org/officeDocument/2006/customXml" ds:itemID="{9F6416C8-433A-4551-934F-62352999253F}">
   <ds:schemaRefs>
+    <ds:schemaRef ds:uri="http://schemas.microsoft.com/office/2006/metadata/contentType"/>
+    <ds:schemaRef ds:uri="http://schemas.microsoft.com/office/2006/metadata/properties/metaAttributes"/>
+    <ds:schemaRef ds:uri="http://www.w3.org/2001/XMLSchema"/>
     <ds:schemaRef ds:uri="http://schemas.microsoft.com/office/2006/metadata/properties"/>
+    <ds:schemaRef ds:uri="http://schemas.openxmlformats.org/package/2006/metadata/core-properties"/>
+    <ds:schemaRef ds:uri="http://purl.org/dc/elements/1.1/"/>
+    <ds:schemaRef ds:uri="http://purl.org/dc/terms/"/>
+    <ds:schemaRef ds:uri="http://schemas.microsoft.com/office/internal/2005/internalDocumentation"/>
   </ds:schemaRefs>
 </ds:datastoreItem>
 </file>
</xml_diff>